<commit_message>
Updated lM Foundstions Slides
</commit_message>
<xml_diff>
--- a/modules/LMFoundations/PPT.pptx
+++ b/modules/LMFoundations/PPT.pptx
@@ -39,8 +39,8 @@
     <p:sldId id="278" r:id="rId30"/>
     <p:sldId id="290" r:id="rId31"/>
     <p:sldId id="296" r:id="rId32"/>
-    <p:sldId id="280" r:id="rId33"/>
-    <p:sldId id="287" r:id="rId34"/>
+    <p:sldId id="287" r:id="rId33"/>
+    <p:sldId id="280" r:id="rId34"/>
   </p:sldIdLst>
   <p:sldSz cx="9144000" cy="6858000" type="screen4x3"/>
   <p:notesSz cx="6858000" cy="9144000"/>
@@ -661,7 +661,7 @@
             <a:fld id="{0895F6ED-6644-4B80-8BAB-DF3A941B6440}" type="slidenum">
               <a:rPr lang="en-US"/>
               <a:pPr/>
-              <a:t>33</a:t>
+              <a:t>32</a:t>
             </a:fld>
             <a:endParaRPr lang="en-US"/>
           </a:p>
@@ -13778,7 +13778,7 @@
           <a:graphicData uri="http://schemas.openxmlformats.org/presentationml/2006/ole">
             <mc:AlternateContent xmlns:mc="http://schemas.openxmlformats.org/markup-compatibility/2006">
               <mc:Choice xmlns:v="urn:schemas-microsoft-com:vml" Requires="v">
-                <p:oleObj spid="_x0000_s186401" name="Equation" r:id="rId3" imgW="571320" imgH="393480" progId="Equation.3">
+                <p:oleObj spid="_x0000_s186402" name="Equation" r:id="rId3" imgW="571320" imgH="393480" progId="Equation.3">
                   <p:embed/>
                 </p:oleObj>
               </mc:Choice>
@@ -14349,7 +14349,7 @@
           <a:graphicData uri="http://schemas.openxmlformats.org/presentationml/2006/ole">
             <mc:AlternateContent xmlns:mc="http://schemas.openxmlformats.org/markup-compatibility/2006">
               <mc:Choice xmlns:v="urn:schemas-microsoft-com:vml" Requires="v">
-                <p:oleObj spid="_x0000_s190489" name="Equation" r:id="rId4" imgW="838080" imgH="444240" progId="Equation.3">
+                <p:oleObj spid="_x0000_s190490" name="Equation" r:id="rId4" imgW="838080" imgH="444240" progId="Equation.3">
                   <p:embed/>
                 </p:oleObj>
               </mc:Choice>
@@ -15129,7 +15129,7 @@
           <a:graphicData uri="http://schemas.openxmlformats.org/presentationml/2006/ole">
             <mc:AlternateContent xmlns:mc="http://schemas.openxmlformats.org/markup-compatibility/2006">
               <mc:Choice xmlns:v="urn:schemas-microsoft-com:vml" Requires="v">
-                <p:oleObj spid="_x0000_s189496" name="Equation" r:id="rId4" imgW="838080" imgH="444240" progId="Equation.3">
+                <p:oleObj spid="_x0000_s189498" name="Equation" r:id="rId4" imgW="838080" imgH="444240" progId="Equation.3">
                   <p:embed/>
                 </p:oleObj>
               </mc:Choice>
@@ -15245,7 +15245,7 @@
           <a:graphicData uri="http://schemas.openxmlformats.org/presentationml/2006/ole">
             <mc:AlternateContent xmlns:mc="http://schemas.openxmlformats.org/markup-compatibility/2006">
               <mc:Choice xmlns:v="urn:schemas-microsoft-com:vml" Requires="v">
-                <p:oleObj spid="_x0000_s189497" name="Equation" r:id="rId7" imgW="1168200" imgH="457200" progId="Equation.3">
+                <p:oleObj spid="_x0000_s189499" name="Equation" r:id="rId7" imgW="1168200" imgH="457200" progId="Equation.3">
                   <p:embed/>
                 </p:oleObj>
               </mc:Choice>
@@ -16691,6 +16691,28 @@
       </p:grpSpPr>
       <p:sp>
         <p:nvSpPr>
+          <p:cNvPr id="4" name="Footer Placeholder 3"/>
+          <p:cNvSpPr>
+            <a:spLocks noGrp="1"/>
+          </p:cNvSpPr>
+          <p:nvPr>
+            <p:ph type="ftr" sz="quarter" idx="10"/>
+          </p:nvPr>
+        </p:nvSpPr>
+        <p:spPr/>
+        <p:txBody>
+          <a:bodyPr/>
+          <a:lstStyle/>
+          <a:p>
+            <a:r>
+              <a:rPr lang="en-US"/>
+              <a:t>LM Foundation</a:t>
+            </a:r>
+          </a:p>
+        </p:txBody>
+      </p:sp>
+      <p:sp>
+        <p:nvSpPr>
           <p:cNvPr id="5" name="Slide Number Placeholder 4"/>
           <p:cNvSpPr>
             <a:spLocks noGrp="1"/>
@@ -16704,10 +16726,220 @@
           <a:bodyPr/>
           <a:lstStyle/>
           <a:p>
+            <a:fld id="{56D5F94E-8960-465E-B857-832C70378C5A}" type="slidenum">
+              <a:rPr lang="en-US"/>
+              <a:pPr/>
+              <a:t>32</a:t>
+            </a:fld>
+            <a:endParaRPr lang="en-US"/>
+          </a:p>
+        </p:txBody>
+      </p:sp>
+      <p:sp>
+        <p:nvSpPr>
+          <p:cNvPr id="190466" name="Rectangle 2"/>
+          <p:cNvSpPr>
+            <a:spLocks noGrp="1" noChangeArrowheads="1"/>
+          </p:cNvSpPr>
+          <p:nvPr>
+            <p:ph type="title"/>
+          </p:nvPr>
+        </p:nvSpPr>
+        <p:spPr/>
+        <p:txBody>
+          <a:bodyPr/>
+          <a:lstStyle/>
+          <a:p>
+            <a:r>
+              <a:rPr lang="en-US" dirty="0"/>
+              <a:t>Linear Models in </a:t>
+            </a:r>
+            <a:r>
+              <a:rPr lang="en-US" dirty="0" smtClean="0"/>
+              <a:t>R – HO</a:t>
+            </a:r>
+            <a:endParaRPr lang="en-US" dirty="0"/>
+          </a:p>
+        </p:txBody>
+      </p:sp>
+      <p:sp>
+        <p:nvSpPr>
+          <p:cNvPr id="190467" name="Rectangle 3"/>
+          <p:cNvSpPr>
+            <a:spLocks noGrp="1" noChangeArrowheads="1"/>
+          </p:cNvSpPr>
+          <p:nvPr>
+            <p:ph type="body" idx="1"/>
+          </p:nvPr>
+        </p:nvSpPr>
+        <p:spPr>
+          <a:xfrm>
+            <a:off x="381000" y="1143000"/>
+            <a:ext cx="8610600" cy="5334000"/>
+          </a:xfrm>
+        </p:spPr>
+        <p:txBody>
+          <a:bodyPr/>
+          <a:lstStyle/>
+          <a:p>
+            <a:r>
+              <a:rPr lang="en-US" dirty="0" smtClean="0"/>
+              <a:t>Note use of </a:t>
+            </a:r>
+          </a:p>
+          <a:p>
+            <a:pPr lvl="1"/>
+            <a:r>
+              <a:rPr lang="en-US" b="1" dirty="0" smtClean="0">
+                <a:solidFill>
+                  <a:srgbClr val="FF0000"/>
+                </a:solidFill>
+                <a:latin typeface="Courier New" pitchFamily="49" charset="0"/>
+                <a:cs typeface="Courier New" pitchFamily="49" charset="0"/>
+              </a:rPr>
+              <a:t>lm()</a:t>
+            </a:r>
+          </a:p>
+          <a:p>
+            <a:pPr lvl="1"/>
+            <a:r>
+              <a:rPr lang="en-US" b="1" dirty="0" smtClean="0">
+                <a:solidFill>
+                  <a:srgbClr val="FF0000"/>
+                </a:solidFill>
+                <a:latin typeface="Courier New" pitchFamily="49" charset="0"/>
+                <a:cs typeface="Courier New" pitchFamily="49" charset="0"/>
+              </a:rPr>
+              <a:t>summary()</a:t>
+            </a:r>
+          </a:p>
+          <a:p>
+            <a:pPr lvl="1"/>
+            <a:r>
+              <a:rPr lang="en-US" b="1" dirty="0" err="1" smtClean="0">
+                <a:solidFill>
+                  <a:srgbClr val="FF0000"/>
+                </a:solidFill>
+                <a:latin typeface="Courier New" pitchFamily="49" charset="0"/>
+                <a:cs typeface="Courier New" pitchFamily="49" charset="0"/>
+              </a:rPr>
+              <a:t>confint</a:t>
+            </a:r>
+            <a:r>
+              <a:rPr lang="en-US" b="1" dirty="0" smtClean="0">
+                <a:solidFill>
+                  <a:srgbClr val="FF0000"/>
+                </a:solidFill>
+                <a:latin typeface="Courier New" pitchFamily="49" charset="0"/>
+                <a:cs typeface="Courier New" pitchFamily="49" charset="0"/>
+              </a:rPr>
+              <a:t>()</a:t>
+            </a:r>
+          </a:p>
+          <a:p>
+            <a:pPr lvl="1"/>
+            <a:r>
+              <a:rPr lang="en-US" b="1" dirty="0" err="1" smtClean="0">
+                <a:solidFill>
+                  <a:srgbClr val="FF0000"/>
+                </a:solidFill>
+                <a:latin typeface="Courier New" pitchFamily="49" charset="0"/>
+                <a:cs typeface="Courier New" pitchFamily="49" charset="0"/>
+              </a:rPr>
+              <a:t>fitPlot</a:t>
+            </a:r>
+            <a:r>
+              <a:rPr lang="en-US" b="1" dirty="0" smtClean="0">
+                <a:solidFill>
+                  <a:srgbClr val="FF0000"/>
+                </a:solidFill>
+                <a:latin typeface="Courier New" pitchFamily="49" charset="0"/>
+                <a:cs typeface="Courier New" pitchFamily="49" charset="0"/>
+              </a:rPr>
+              <a:t>()</a:t>
+            </a:r>
+          </a:p>
+          <a:p>
+            <a:pPr lvl="1"/>
+            <a:r>
+              <a:rPr lang="en-US" b="1" dirty="0" err="1" smtClean="0">
+                <a:solidFill>
+                  <a:srgbClr val="FF0000"/>
+                </a:solidFill>
+                <a:latin typeface="Courier New" pitchFamily="49" charset="0"/>
+                <a:cs typeface="Courier New" pitchFamily="49" charset="0"/>
+              </a:rPr>
+              <a:t>anova</a:t>
+            </a:r>
+            <a:r>
+              <a:rPr lang="en-US" b="1" dirty="0" smtClean="0">
+                <a:solidFill>
+                  <a:srgbClr val="FF0000"/>
+                </a:solidFill>
+                <a:latin typeface="Courier New" pitchFamily="49" charset="0"/>
+                <a:cs typeface="Courier New" pitchFamily="49" charset="0"/>
+              </a:rPr>
+              <a:t>()</a:t>
+            </a:r>
+            <a:r>
+              <a:rPr lang="en-US" dirty="0" smtClean="0"/>
+              <a:t> </a:t>
+            </a:r>
+            <a:endParaRPr lang="en-US" dirty="0"/>
+          </a:p>
+        </p:txBody>
+      </p:sp>
+    </p:spTree>
+  </p:cSld>
+  <p:clrMapOvr>
+    <a:masterClrMapping/>
+  </p:clrMapOvr>
+  <p:timing>
+    <p:tnLst>
+      <p:par>
+        <p:cTn id="1" dur="indefinite" restart="never" nodeType="tmRoot"/>
+      </p:par>
+    </p:tnLst>
+  </p:timing>
+</p:sld>
+</file>
+
+<file path=ppt/slides/slide33.xml><?xml version="1.0" encoding="utf-8"?>
+<p:sld xmlns:a="http://schemas.openxmlformats.org/drawingml/2006/main" xmlns:r="http://schemas.openxmlformats.org/officeDocument/2006/relationships" xmlns:p="http://schemas.openxmlformats.org/presentationml/2006/main">
+  <p:cSld>
+    <p:spTree>
+      <p:nvGrpSpPr>
+        <p:cNvPr id="1" name=""/>
+        <p:cNvGrpSpPr/>
+        <p:nvPr/>
+      </p:nvGrpSpPr>
+      <p:grpSpPr>
+        <a:xfrm>
+          <a:off x="0" y="0"/>
+          <a:ext cx="0" cy="0"/>
+          <a:chOff x="0" y="0"/>
+          <a:chExt cx="0" cy="0"/>
+        </a:xfrm>
+      </p:grpSpPr>
+      <p:sp>
+        <p:nvSpPr>
+          <p:cNvPr id="5" name="Slide Number Placeholder 4"/>
+          <p:cNvSpPr>
+            <a:spLocks noGrp="1"/>
+          </p:cNvSpPr>
+          <p:nvPr>
+            <p:ph type="sldNum" sz="quarter" idx="11"/>
+          </p:nvPr>
+        </p:nvSpPr>
+        <p:spPr/>
+        <p:txBody>
+          <a:bodyPr/>
+          <a:lstStyle/>
+          <a:p>
             <a:fld id="{69D7B0D6-DB4A-4EB6-A95E-79586D88CC6B}" type="slidenum">
               <a:rPr lang="en-US"/>
               <a:pPr/>
-              <a:t>32</a:t>
+              <a:t>33</a:t>
             </a:fld>
             <a:endParaRPr lang="en-US"/>
           </a:p>
@@ -17679,238 +17911,6 @@
     <p:bldLst>
       <p:bldP spid="189443" grpId="0" uiExpand="1" build="p"/>
     </p:bldLst>
-  </p:timing>
-</p:sld>
-</file>
-
-<file path=ppt/slides/slide33.xml><?xml version="1.0" encoding="utf-8"?>
-<p:sld xmlns:a="http://schemas.openxmlformats.org/drawingml/2006/main" xmlns:r="http://schemas.openxmlformats.org/officeDocument/2006/relationships" xmlns:p="http://schemas.openxmlformats.org/presentationml/2006/main">
-  <p:cSld>
-    <p:spTree>
-      <p:nvGrpSpPr>
-        <p:cNvPr id="1" name=""/>
-        <p:cNvGrpSpPr/>
-        <p:nvPr/>
-      </p:nvGrpSpPr>
-      <p:grpSpPr>
-        <a:xfrm>
-          <a:off x="0" y="0"/>
-          <a:ext cx="0" cy="0"/>
-          <a:chOff x="0" y="0"/>
-          <a:chExt cx="0" cy="0"/>
-        </a:xfrm>
-      </p:grpSpPr>
-      <p:sp>
-        <p:nvSpPr>
-          <p:cNvPr id="4" name="Footer Placeholder 3"/>
-          <p:cNvSpPr>
-            <a:spLocks noGrp="1"/>
-          </p:cNvSpPr>
-          <p:nvPr>
-            <p:ph type="ftr" sz="quarter" idx="10"/>
-          </p:nvPr>
-        </p:nvSpPr>
-        <p:spPr/>
-        <p:txBody>
-          <a:bodyPr/>
-          <a:lstStyle/>
-          <a:p>
-            <a:r>
-              <a:rPr lang="en-US"/>
-              <a:t>LM Foundation</a:t>
-            </a:r>
-          </a:p>
-        </p:txBody>
-      </p:sp>
-      <p:sp>
-        <p:nvSpPr>
-          <p:cNvPr id="5" name="Slide Number Placeholder 4"/>
-          <p:cNvSpPr>
-            <a:spLocks noGrp="1"/>
-          </p:cNvSpPr>
-          <p:nvPr>
-            <p:ph type="sldNum" sz="quarter" idx="11"/>
-          </p:nvPr>
-        </p:nvSpPr>
-        <p:spPr/>
-        <p:txBody>
-          <a:bodyPr/>
-          <a:lstStyle/>
-          <a:p>
-            <a:fld id="{56D5F94E-8960-465E-B857-832C70378C5A}" type="slidenum">
-              <a:rPr lang="en-US"/>
-              <a:pPr/>
-              <a:t>33</a:t>
-            </a:fld>
-            <a:endParaRPr lang="en-US"/>
-          </a:p>
-        </p:txBody>
-      </p:sp>
-      <p:sp>
-        <p:nvSpPr>
-          <p:cNvPr id="190466" name="Rectangle 2"/>
-          <p:cNvSpPr>
-            <a:spLocks noGrp="1" noChangeArrowheads="1"/>
-          </p:cNvSpPr>
-          <p:nvPr>
-            <p:ph type="title"/>
-          </p:nvPr>
-        </p:nvSpPr>
-        <p:spPr/>
-        <p:txBody>
-          <a:bodyPr/>
-          <a:lstStyle/>
-          <a:p>
-            <a:r>
-              <a:rPr lang="en-US" dirty="0"/>
-              <a:t>Linear Models in </a:t>
-            </a:r>
-            <a:r>
-              <a:rPr lang="en-US" dirty="0" smtClean="0"/>
-              <a:t>R – HO</a:t>
-            </a:r>
-            <a:endParaRPr lang="en-US" dirty="0"/>
-          </a:p>
-        </p:txBody>
-      </p:sp>
-      <p:sp>
-        <p:nvSpPr>
-          <p:cNvPr id="190467" name="Rectangle 3"/>
-          <p:cNvSpPr>
-            <a:spLocks noGrp="1" noChangeArrowheads="1"/>
-          </p:cNvSpPr>
-          <p:nvPr>
-            <p:ph type="body" idx="1"/>
-          </p:nvPr>
-        </p:nvSpPr>
-        <p:spPr>
-          <a:xfrm>
-            <a:off x="381000" y="1143000"/>
-            <a:ext cx="8610600" cy="5334000"/>
-          </a:xfrm>
-        </p:spPr>
-        <p:txBody>
-          <a:bodyPr/>
-          <a:lstStyle/>
-          <a:p>
-            <a:r>
-              <a:rPr lang="en-US" dirty="0" smtClean="0"/>
-              <a:t>Note use of </a:t>
-            </a:r>
-          </a:p>
-          <a:p>
-            <a:pPr lvl="1"/>
-            <a:r>
-              <a:rPr lang="en-US" b="1" dirty="0" smtClean="0">
-                <a:solidFill>
-                  <a:srgbClr val="FF0000"/>
-                </a:solidFill>
-                <a:latin typeface="Courier New" pitchFamily="49" charset="0"/>
-                <a:cs typeface="Courier New" pitchFamily="49" charset="0"/>
-              </a:rPr>
-              <a:t>lm()</a:t>
-            </a:r>
-          </a:p>
-          <a:p>
-            <a:pPr lvl="1"/>
-            <a:r>
-              <a:rPr lang="en-US" b="1" dirty="0" smtClean="0">
-                <a:solidFill>
-                  <a:srgbClr val="FF0000"/>
-                </a:solidFill>
-                <a:latin typeface="Courier New" pitchFamily="49" charset="0"/>
-                <a:cs typeface="Courier New" pitchFamily="49" charset="0"/>
-              </a:rPr>
-              <a:t>summary()</a:t>
-            </a:r>
-          </a:p>
-          <a:p>
-            <a:pPr lvl="1"/>
-            <a:r>
-              <a:rPr lang="en-US" b="1" dirty="0" err="1" smtClean="0">
-                <a:solidFill>
-                  <a:srgbClr val="FF0000"/>
-                </a:solidFill>
-                <a:latin typeface="Courier New" pitchFamily="49" charset="0"/>
-                <a:cs typeface="Courier New" pitchFamily="49" charset="0"/>
-              </a:rPr>
-              <a:t>confint</a:t>
-            </a:r>
-            <a:r>
-              <a:rPr lang="en-US" b="1" dirty="0" smtClean="0">
-                <a:solidFill>
-                  <a:srgbClr val="FF0000"/>
-                </a:solidFill>
-                <a:latin typeface="Courier New" pitchFamily="49" charset="0"/>
-                <a:cs typeface="Courier New" pitchFamily="49" charset="0"/>
-              </a:rPr>
-              <a:t>()</a:t>
-            </a:r>
-          </a:p>
-          <a:p>
-            <a:pPr lvl="1"/>
-            <a:r>
-              <a:rPr lang="en-US" b="1" dirty="0" err="1" smtClean="0">
-                <a:solidFill>
-                  <a:srgbClr val="FF0000"/>
-                </a:solidFill>
-                <a:latin typeface="Courier New" pitchFamily="49" charset="0"/>
-                <a:cs typeface="Courier New" pitchFamily="49" charset="0"/>
-              </a:rPr>
-              <a:t>fitPlot</a:t>
-            </a:r>
-            <a:r>
-              <a:rPr lang="en-US" b="1" dirty="0" smtClean="0">
-                <a:solidFill>
-                  <a:srgbClr val="FF0000"/>
-                </a:solidFill>
-                <a:latin typeface="Courier New" pitchFamily="49" charset="0"/>
-                <a:cs typeface="Courier New" pitchFamily="49" charset="0"/>
-              </a:rPr>
-              <a:t>()</a:t>
-            </a:r>
-          </a:p>
-          <a:p>
-            <a:pPr lvl="1"/>
-            <a:r>
-              <a:rPr lang="en-US" b="1" dirty="0" err="1" smtClean="0">
-                <a:solidFill>
-                  <a:srgbClr val="FF0000"/>
-                </a:solidFill>
-                <a:latin typeface="Courier New" pitchFamily="49" charset="0"/>
-                <a:cs typeface="Courier New" pitchFamily="49" charset="0"/>
-              </a:rPr>
-              <a:t>anova</a:t>
-            </a:r>
-            <a:r>
-              <a:rPr lang="en-US" b="1" dirty="0" smtClean="0">
-                <a:solidFill>
-                  <a:srgbClr val="FF0000"/>
-                </a:solidFill>
-                <a:latin typeface="Courier New" pitchFamily="49" charset="0"/>
-                <a:cs typeface="Courier New" pitchFamily="49" charset="0"/>
-              </a:rPr>
-              <a:t>()</a:t>
-            </a:r>
-            <a:r>
-              <a:rPr lang="en-US" dirty="0" smtClean="0"/>
-              <a:t> </a:t>
-            </a:r>
-            <a:endParaRPr lang="en-US" dirty="0"/>
-          </a:p>
-        </p:txBody>
-      </p:sp>
-    </p:spTree>
-  </p:cSld>
-  <p:clrMapOvr>
-    <a:masterClrMapping/>
-  </p:clrMapOvr>
-  <p:timing>
-    <p:tnLst>
-      <p:par>
-        <p:cTn id="1" dur="indefinite" restart="never" nodeType="tmRoot"/>
-      </p:par>
-    </p:tnLst>
   </p:timing>
 </p:sld>
 </file>

</xml_diff>

<commit_message>
Update PPT for LMFoundations
</commit_message>
<xml_diff>
--- a/modules/LMFoundations/PPT.pptx
+++ b/modules/LMFoundations/PPT.pptx
@@ -4480,9 +4480,27 @@
                 <a:tableStyleId>{00A15C55-8517-42AA-B614-E9B94910E393}</a:tableStyleId>
               </a:tblPr>
               <a:tblGrid>
-                <a:gridCol w="2743200"/>
-                <a:gridCol w="2743200"/>
-                <a:gridCol w="2743200"/>
+                <a:gridCol w="2743200">
+                  <a:extLst>
+                    <a:ext uri="{9D8B030D-6E8A-4147-A177-3AD203B41FA5}">
+                      <a16:colId xmlns:a16="http://schemas.microsoft.com/office/drawing/2014/main" val="20000"/>
+                    </a:ext>
+                  </a:extLst>
+                </a:gridCol>
+                <a:gridCol w="2743200">
+                  <a:extLst>
+                    <a:ext uri="{9D8B030D-6E8A-4147-A177-3AD203B41FA5}">
+                      <a16:colId xmlns:a16="http://schemas.microsoft.com/office/drawing/2014/main" val="20001"/>
+                    </a:ext>
+                  </a:extLst>
+                </a:gridCol>
+                <a:gridCol w="2743200">
+                  <a:extLst>
+                    <a:ext uri="{9D8B030D-6E8A-4147-A177-3AD203B41FA5}">
+                      <a16:colId xmlns:a16="http://schemas.microsoft.com/office/drawing/2014/main" val="20002"/>
+                    </a:ext>
+                  </a:extLst>
+                </a:gridCol>
               </a:tblGrid>
               <a:tr h="370840">
                 <a:tc>
@@ -4530,6 +4548,11 @@
                   </a:txBody>
                   <a:tcPr/>
                 </a:tc>
+                <a:extLst>
+                  <a:ext uri="{0D108BD9-81ED-4DB2-BD59-A6C34878D82A}">
+                    <a16:rowId xmlns:a16="http://schemas.microsoft.com/office/drawing/2014/main" val="10000"/>
+                  </a:ext>
+                </a:extLst>
               </a:tr>
               <a:tr h="370840">
                 <a:tc>
@@ -4565,6 +4588,11 @@
                   </a:txBody>
                   <a:tcPr/>
                 </a:tc>
+                <a:extLst>
+                  <a:ext uri="{0D108BD9-81ED-4DB2-BD59-A6C34878D82A}">
+                    <a16:rowId xmlns:a16="http://schemas.microsoft.com/office/drawing/2014/main" val="10001"/>
+                  </a:ext>
+                </a:extLst>
               </a:tr>
               <a:tr h="370840">
                 <a:tc>
@@ -4600,6 +4628,11 @@
                   </a:txBody>
                   <a:tcPr/>
                 </a:tc>
+                <a:extLst>
+                  <a:ext uri="{0D108BD9-81ED-4DB2-BD59-A6C34878D82A}">
+                    <a16:rowId xmlns:a16="http://schemas.microsoft.com/office/drawing/2014/main" val="10002"/>
+                  </a:ext>
+                </a:extLst>
               </a:tr>
               <a:tr h="370840">
                 <a:tc>
@@ -4635,6 +4668,11 @@
                   </a:txBody>
                   <a:tcPr/>
                 </a:tc>
+                <a:extLst>
+                  <a:ext uri="{0D108BD9-81ED-4DB2-BD59-A6C34878D82A}">
+                    <a16:rowId xmlns:a16="http://schemas.microsoft.com/office/drawing/2014/main" val="10003"/>
+                  </a:ext>
+                </a:extLst>
               </a:tr>
             </a:tbl>
           </a:graphicData>
@@ -5642,8 +5680,20 @@
                 <a:tableStyleId>{00A15C55-8517-42AA-B614-E9B94910E393}</a:tableStyleId>
               </a:tblPr>
               <a:tblGrid>
-                <a:gridCol w="1828800"/>
-                <a:gridCol w="1828800"/>
+                <a:gridCol w="1828800">
+                  <a:extLst>
+                    <a:ext uri="{9D8B030D-6E8A-4147-A177-3AD203B41FA5}">
+                      <a16:colId xmlns:a16="http://schemas.microsoft.com/office/drawing/2014/main" val="20000"/>
+                    </a:ext>
+                  </a:extLst>
+                </a:gridCol>
+                <a:gridCol w="1828800">
+                  <a:extLst>
+                    <a:ext uri="{9D8B030D-6E8A-4147-A177-3AD203B41FA5}">
+                      <a16:colId xmlns:a16="http://schemas.microsoft.com/office/drawing/2014/main" val="20001"/>
+                    </a:ext>
+                  </a:extLst>
+                </a:gridCol>
               </a:tblGrid>
               <a:tr h="370840">
                 <a:tc>
@@ -5676,6 +5726,11 @@
                   </a:txBody>
                   <a:tcPr/>
                 </a:tc>
+                <a:extLst>
+                  <a:ext uri="{0D108BD9-81ED-4DB2-BD59-A6C34878D82A}">
+                    <a16:rowId xmlns:a16="http://schemas.microsoft.com/office/drawing/2014/main" val="10000"/>
+                  </a:ext>
+                </a:extLst>
               </a:tr>
               <a:tr h="487680">
                 <a:tc>
@@ -5700,6 +5755,11 @@
                   </a:txBody>
                   <a:tcPr/>
                 </a:tc>
+                <a:extLst>
+                  <a:ext uri="{0D108BD9-81ED-4DB2-BD59-A6C34878D82A}">
+                    <a16:rowId xmlns:a16="http://schemas.microsoft.com/office/drawing/2014/main" val="10001"/>
+                  </a:ext>
+                </a:extLst>
               </a:tr>
               <a:tr h="370840">
                 <a:tc>
@@ -5724,6 +5784,11 @@
                   </a:txBody>
                   <a:tcPr/>
                 </a:tc>
+                <a:extLst>
+                  <a:ext uri="{0D108BD9-81ED-4DB2-BD59-A6C34878D82A}">
+                    <a16:rowId xmlns:a16="http://schemas.microsoft.com/office/drawing/2014/main" val="10002"/>
+                  </a:ext>
+                </a:extLst>
               </a:tr>
               <a:tr h="370840">
                 <a:tc>
@@ -5748,6 +5813,11 @@
                   </a:txBody>
                   <a:tcPr/>
                 </a:tc>
+                <a:extLst>
+                  <a:ext uri="{0D108BD9-81ED-4DB2-BD59-A6C34878D82A}">
+                    <a16:rowId xmlns:a16="http://schemas.microsoft.com/office/drawing/2014/main" val="10003"/>
+                  </a:ext>
+                </a:extLst>
               </a:tr>
             </a:tbl>
           </a:graphicData>
@@ -6958,9 +7028,27 @@
                 <a:tableStyleId>{00A15C55-8517-42AA-B614-E9B94910E393}</a:tableStyleId>
               </a:tblPr>
               <a:tblGrid>
-                <a:gridCol w="2743200"/>
-                <a:gridCol w="2743200"/>
-                <a:gridCol w="2743200"/>
+                <a:gridCol w="2743200">
+                  <a:extLst>
+                    <a:ext uri="{9D8B030D-6E8A-4147-A177-3AD203B41FA5}">
+                      <a16:colId xmlns:a16="http://schemas.microsoft.com/office/drawing/2014/main" val="20000"/>
+                    </a:ext>
+                  </a:extLst>
+                </a:gridCol>
+                <a:gridCol w="2743200">
+                  <a:extLst>
+                    <a:ext uri="{9D8B030D-6E8A-4147-A177-3AD203B41FA5}">
+                      <a16:colId xmlns:a16="http://schemas.microsoft.com/office/drawing/2014/main" val="20001"/>
+                    </a:ext>
+                  </a:extLst>
+                </a:gridCol>
+                <a:gridCol w="2743200">
+                  <a:extLst>
+                    <a:ext uri="{9D8B030D-6E8A-4147-A177-3AD203B41FA5}">
+                      <a16:colId xmlns:a16="http://schemas.microsoft.com/office/drawing/2014/main" val="20002"/>
+                    </a:ext>
+                  </a:extLst>
+                </a:gridCol>
               </a:tblGrid>
               <a:tr h="370840">
                 <a:tc>
@@ -7008,6 +7096,11 @@
                   </a:txBody>
                   <a:tcPr/>
                 </a:tc>
+                <a:extLst>
+                  <a:ext uri="{0D108BD9-81ED-4DB2-BD59-A6C34878D82A}">
+                    <a16:rowId xmlns:a16="http://schemas.microsoft.com/office/drawing/2014/main" val="10000"/>
+                  </a:ext>
+                </a:extLst>
               </a:tr>
               <a:tr h="370840">
                 <a:tc>
@@ -7043,6 +7136,11 @@
                   </a:txBody>
                   <a:tcPr/>
                 </a:tc>
+                <a:extLst>
+                  <a:ext uri="{0D108BD9-81ED-4DB2-BD59-A6C34878D82A}">
+                    <a16:rowId xmlns:a16="http://schemas.microsoft.com/office/drawing/2014/main" val="10001"/>
+                  </a:ext>
+                </a:extLst>
               </a:tr>
               <a:tr h="370840">
                 <a:tc>
@@ -7078,6 +7176,11 @@
                   </a:txBody>
                   <a:tcPr/>
                 </a:tc>
+                <a:extLst>
+                  <a:ext uri="{0D108BD9-81ED-4DB2-BD59-A6C34878D82A}">
+                    <a16:rowId xmlns:a16="http://schemas.microsoft.com/office/drawing/2014/main" val="10002"/>
+                  </a:ext>
+                </a:extLst>
               </a:tr>
               <a:tr h="370840">
                 <a:tc>
@@ -7113,6 +7216,11 @@
                   </a:txBody>
                   <a:tcPr/>
                 </a:tc>
+                <a:extLst>
+                  <a:ext uri="{0D108BD9-81ED-4DB2-BD59-A6C34878D82A}">
+                    <a16:rowId xmlns:a16="http://schemas.microsoft.com/office/drawing/2014/main" val="10003"/>
+                  </a:ext>
+                </a:extLst>
               </a:tr>
             </a:tbl>
           </a:graphicData>
@@ -13850,7 +13958,7 @@
           <a:graphicData uri="http://schemas.openxmlformats.org/presentationml/2006/ole">
             <mc:AlternateContent xmlns:mc="http://schemas.openxmlformats.org/markup-compatibility/2006">
               <mc:Choice xmlns:v="urn:schemas-microsoft-com:vml" Requires="v">
-                <p:oleObj spid="_x0000_s186403" name="Equation" r:id="rId3" imgW="571320" imgH="393480" progId="Equation.3">
+                <p:oleObj spid="_x0000_s186404" name="Equation" r:id="rId3" imgW="571320" imgH="393480" progId="Equation.3">
                   <p:embed/>
                 </p:oleObj>
               </mc:Choice>
@@ -14421,7 +14529,7 @@
           <a:graphicData uri="http://schemas.openxmlformats.org/presentationml/2006/ole">
             <mc:AlternateContent xmlns:mc="http://schemas.openxmlformats.org/markup-compatibility/2006">
               <mc:Choice xmlns:v="urn:schemas-microsoft-com:vml" Requires="v">
-                <p:oleObj spid="_x0000_s190491" name="Equation" r:id="rId4" imgW="838080" imgH="444240" progId="Equation.3">
+                <p:oleObj spid="_x0000_s190492" name="Equation" r:id="rId4" imgW="838080" imgH="444240" progId="Equation.3">
                   <p:embed/>
                 </p:oleObj>
               </mc:Choice>
@@ -15201,7 +15309,7 @@
           <a:graphicData uri="http://schemas.openxmlformats.org/presentationml/2006/ole">
             <mc:AlternateContent xmlns:mc="http://schemas.openxmlformats.org/markup-compatibility/2006">
               <mc:Choice xmlns:v="urn:schemas-microsoft-com:vml" Requires="v">
-                <p:oleObj spid="_x0000_s189500" name="Equation" r:id="rId4" imgW="838080" imgH="444240" progId="Equation.3">
+                <p:oleObj spid="_x0000_s189502" name="Equation" r:id="rId4" imgW="838080" imgH="444240" progId="Equation.3">
                   <p:embed/>
                 </p:oleObj>
               </mc:Choice>
@@ -15317,7 +15425,7 @@
           <a:graphicData uri="http://schemas.openxmlformats.org/presentationml/2006/ole">
             <mc:AlternateContent xmlns:mc="http://schemas.openxmlformats.org/markup-compatibility/2006">
               <mc:Choice xmlns:v="urn:schemas-microsoft-com:vml" Requires="v">
-                <p:oleObj spid="_x0000_s189501" name="Equation" r:id="rId7" imgW="1168200" imgH="457200" progId="Equation.3">
+                <p:oleObj spid="_x0000_s189503" name="Equation" r:id="rId7" imgW="1168200" imgH="457200" progId="Equation.3">
                   <p:embed/>
                 </p:oleObj>
               </mc:Choice>
@@ -16882,8 +16990,48 @@
                 <a:latin typeface="Courier New" pitchFamily="49" charset="0"/>
                 <a:cs typeface="Courier New" pitchFamily="49" charset="0"/>
               </a:rPr>
-              <a:t>summary()</a:t>
-            </a:r>
+              <a:t>summary</a:t>
+            </a:r>
+            <a:r>
+              <a:rPr lang="en-US" b="1" dirty="0" smtClean="0">
+                <a:solidFill>
+                  <a:srgbClr val="FF0000"/>
+                </a:solidFill>
+                <a:latin typeface="Courier New" pitchFamily="49" charset="0"/>
+                <a:cs typeface="Courier New" pitchFamily="49" charset="0"/>
+              </a:rPr>
+              <a:t>()</a:t>
+            </a:r>
+          </a:p>
+          <a:p>
+            <a:pPr lvl="1"/>
+            <a:r>
+              <a:rPr lang="en-US" b="1" smtClean="0">
+                <a:solidFill>
+                  <a:srgbClr val="FF0000"/>
+                </a:solidFill>
+                <a:latin typeface="Courier New" pitchFamily="49" charset="0"/>
+                <a:cs typeface="Courier New" pitchFamily="49" charset="0"/>
+              </a:rPr>
+              <a:t>coef</a:t>
+            </a:r>
+            <a:r>
+              <a:rPr lang="en-US" b="1" dirty="0" smtClean="0">
+                <a:solidFill>
+                  <a:srgbClr val="FF0000"/>
+                </a:solidFill>
+                <a:latin typeface="Courier New" pitchFamily="49" charset="0"/>
+                <a:cs typeface="Courier New" pitchFamily="49" charset="0"/>
+              </a:rPr>
+              <a:t>()</a:t>
+            </a:r>
+            <a:endParaRPr lang="en-US" b="1" dirty="0" smtClean="0">
+              <a:solidFill>
+                <a:srgbClr val="FF0000"/>
+              </a:solidFill>
+              <a:latin typeface="Courier New" pitchFamily="49" charset="0"/>
+              <a:cs typeface="Courier New" pitchFamily="49" charset="0"/>
+            </a:endParaRPr>
           </a:p>
           <a:p>
             <a:pPr lvl="1"/>
@@ -18027,7 +18175,7 @@
         </p:blipFill>
         <p:spPr bwMode="auto">
           <a:xfrm>
-            <a:off x="76200" y="2108022"/>
+            <a:off x="76200" y="2305026"/>
             <a:ext cx="9017000" cy="2540178"/>
           </a:xfrm>
           <a:prstGeom prst="rect">
@@ -18196,7 +18344,7 @@
         </p:nvSpPr>
         <p:spPr bwMode="auto">
           <a:xfrm>
-            <a:off x="2438400" y="3124200"/>
+            <a:off x="2514600" y="3168804"/>
             <a:ext cx="457200" cy="381000"/>
           </a:xfrm>
           <a:prstGeom prst="star8">
@@ -18243,7 +18391,7 @@
         </p:nvSpPr>
         <p:spPr bwMode="auto">
           <a:xfrm>
-            <a:off x="2590800" y="3657600"/>
+            <a:off x="3276600" y="3168804"/>
             <a:ext cx="457200" cy="381000"/>
           </a:xfrm>
           <a:prstGeom prst="star8">
@@ -18290,7 +18438,7 @@
         </p:nvSpPr>
         <p:spPr bwMode="auto">
           <a:xfrm>
-            <a:off x="1905000" y="4191000"/>
+            <a:off x="2667000" y="3778404"/>
             <a:ext cx="457200" cy="381000"/>
           </a:xfrm>
           <a:prstGeom prst="star8">
@@ -18317,7 +18465,7 @@
           <a:p>
             <a:pPr algn="ctr"/>
             <a:r>
-              <a:rPr lang="en-US" b="1">
+              <a:rPr lang="en-US" b="1" dirty="0">
                 <a:solidFill>
                   <a:srgbClr val="CC0000"/>
                 </a:solidFill>
@@ -18337,7 +18485,7 @@
         </p:nvSpPr>
         <p:spPr bwMode="auto">
           <a:xfrm>
-            <a:off x="6096000" y="3962400"/>
+            <a:off x="1981200" y="4159404"/>
             <a:ext cx="457200" cy="381000"/>
           </a:xfrm>
           <a:prstGeom prst="star8">
@@ -18382,7 +18530,7 @@
         </p:nvSpPr>
         <p:spPr>
           <a:xfrm>
-            <a:off x="3691054" y="1572763"/>
+            <a:off x="3691054" y="1769767"/>
             <a:ext cx="1566746" cy="457200"/>
           </a:xfrm>
           <a:prstGeom prst="borderCallout1">
@@ -18444,7 +18592,7 @@
         </p:nvSpPr>
         <p:spPr>
           <a:xfrm>
-            <a:off x="5900854" y="1555596"/>
+            <a:off x="5900854" y="1752600"/>
             <a:ext cx="1719146" cy="457200"/>
           </a:xfrm>
           <a:prstGeom prst="borderCallout1">
@@ -18493,6 +18641,58 @@
             <a:endParaRPr lang="en-US" dirty="0">
               <a:solidFill>
                 <a:srgbClr val="FF0000"/>
+              </a:solidFill>
+            </a:endParaRPr>
+          </a:p>
+        </p:txBody>
+      </p:sp>
+      <p:sp>
+        <p:nvSpPr>
+          <p:cNvPr id="13" name="AutoShape 8"/>
+          <p:cNvSpPr>
+            <a:spLocks noChangeArrowheads="1"/>
+          </p:cNvSpPr>
+          <p:nvPr/>
+        </p:nvSpPr>
+        <p:spPr bwMode="auto">
+          <a:xfrm>
+            <a:off x="6019800" y="4159404"/>
+            <a:ext cx="457200" cy="381000"/>
+          </a:xfrm>
+          <a:prstGeom prst="star8">
+            <a:avLst>
+              <a:gd name="adj" fmla="val 38250"/>
+            </a:avLst>
+          </a:prstGeom>
+          <a:solidFill>
+            <a:srgbClr val="FFFF66"/>
+          </a:solidFill>
+          <a:ln w="3175">
+            <a:solidFill>
+              <a:schemeClr val="tx1"/>
+            </a:solidFill>
+            <a:miter lim="800000"/>
+            <a:headEnd/>
+            <a:tailEnd/>
+          </a:ln>
+          <a:effectLst/>
+        </p:spPr>
+        <p:txBody>
+          <a:bodyPr wrap="none" anchor="ctr"/>
+          <a:lstStyle/>
+          <a:p>
+            <a:pPr algn="ctr"/>
+            <a:r>
+              <a:rPr lang="en-US" b="1" dirty="0" smtClean="0">
+                <a:solidFill>
+                  <a:srgbClr val="CC0000"/>
+                </a:solidFill>
+              </a:rPr>
+              <a:t>5</a:t>
+            </a:r>
+            <a:endParaRPr lang="en-US" b="1" dirty="0">
+              <a:solidFill>
+                <a:srgbClr val="CC0000"/>
               </a:solidFill>
             </a:endParaRPr>
           </a:p>
@@ -18570,7 +18770,7 @@
                               <p:par>
                                 <p:cTn id="9" presetID="22" presetClass="entr" presetSubtype="4" fill="hold" grpId="0" nodeType="afterEffect">
                                   <p:stCondLst>
-                                    <p:cond delay="2000"/>
+                                    <p:cond delay="500"/>
                                   </p:stCondLst>
                                   <p:childTnLst>
                                     <p:set>
@@ -18605,21 +18805,74 @@
                             </p:childTnLst>
                           </p:cTn>
                         </p:par>
+                      </p:childTnLst>
+                    </p:cTn>
+                  </p:par>
+                  <p:par>
+                    <p:cTn id="12" fill="hold">
+                      <p:stCondLst>
+                        <p:cond delay="indefinite"/>
+                      </p:stCondLst>
+                      <p:childTnLst>
                         <p:par>
-                          <p:cTn id="12" fill="hold">
+                          <p:cTn id="13" fill="hold">
                             <p:stCondLst>
-                              <p:cond delay="3000"/>
+                              <p:cond delay="0"/>
                             </p:stCondLst>
                             <p:childTnLst>
                               <p:par>
-                                <p:cTn id="13" presetID="22" presetClass="entr" presetSubtype="4" fill="hold" grpId="0" nodeType="afterEffect">
+                                <p:cTn id="14" presetID="8" presetClass="entr" presetSubtype="16" fill="hold" grpId="0" nodeType="clickEffect">
                                   <p:stCondLst>
-                                    <p:cond delay="1000"/>
+                                    <p:cond delay="0"/>
                                   </p:stCondLst>
                                   <p:childTnLst>
                                     <p:set>
                                       <p:cBhvr>
-                                        <p:cTn id="14" dur="1" fill="hold">
+                                        <p:cTn id="15" dur="1" fill="hold">
+                                          <p:stCondLst>
+                                            <p:cond delay="0"/>
+                                          </p:stCondLst>
+                                        </p:cTn>
+                                        <p:tgtEl>
+                                          <p:spTgt spid="165894"/>
+                                        </p:tgtEl>
+                                        <p:attrNameLst>
+                                          <p:attrName>style.visibility</p:attrName>
+                                        </p:attrNameLst>
+                                      </p:cBhvr>
+                                      <p:to>
+                                        <p:strVal val="visible"/>
+                                      </p:to>
+                                    </p:set>
+                                    <p:animEffect transition="in" filter="diamond(in)">
+                                      <p:cBhvr>
+                                        <p:cTn id="16" dur="500"/>
+                                        <p:tgtEl>
+                                          <p:spTgt spid="165894"/>
+                                        </p:tgtEl>
+                                      </p:cBhvr>
+                                    </p:animEffect>
+                                  </p:childTnLst>
+                                </p:cTn>
+                              </p:par>
+                            </p:childTnLst>
+                          </p:cTn>
+                        </p:par>
+                        <p:par>
+                          <p:cTn id="17" fill="hold">
+                            <p:stCondLst>
+                              <p:cond delay="500"/>
+                            </p:stCondLst>
+                            <p:childTnLst>
+                              <p:par>
+                                <p:cTn id="18" presetID="22" presetClass="entr" presetSubtype="4" fill="hold" grpId="0" nodeType="afterEffect">
+                                  <p:stCondLst>
+                                    <p:cond delay="500"/>
+                                  </p:stCondLst>
+                                  <p:childTnLst>
+                                    <p:set>
+                                      <p:cBhvr>
+                                        <p:cTn id="19" dur="1" fill="hold">
                                           <p:stCondLst>
                                             <p:cond delay="0"/>
                                           </p:stCondLst>
@@ -18637,7 +18890,7 @@
                                     </p:set>
                                     <p:animEffect transition="in" filter="wipe(down)">
                                       <p:cBhvr>
-                                        <p:cTn id="15" dur="500"/>
+                                        <p:cTn id="20" dur="500"/>
                                         <p:tgtEl>
                                           <p:spTgt spid="12"/>
                                         </p:tgtEl>
@@ -18653,26 +18906,26 @@
                     </p:cTn>
                   </p:par>
                   <p:par>
-                    <p:cTn id="16" fill="hold">
+                    <p:cTn id="21" fill="hold">
                       <p:stCondLst>
                         <p:cond delay="indefinite"/>
                       </p:stCondLst>
                       <p:childTnLst>
                         <p:par>
-                          <p:cTn id="17" fill="hold">
+                          <p:cTn id="22" fill="hold">
                             <p:stCondLst>
                               <p:cond delay="0"/>
                             </p:stCondLst>
                             <p:childTnLst>
                               <p:par>
-                                <p:cTn id="18" presetID="1" presetClass="exit" presetSubtype="0" fill="hold" grpId="1" nodeType="clickEffect">
+                                <p:cTn id="23" presetID="1" presetClass="exit" presetSubtype="0" fill="hold" grpId="1" nodeType="clickEffect">
                                   <p:stCondLst>
                                     <p:cond delay="0"/>
                                   </p:stCondLst>
                                   <p:childTnLst>
                                     <p:set>
                                       <p:cBhvr>
-                                        <p:cTn id="19" dur="1" fill="hold">
+                                        <p:cTn id="24" dur="1" fill="hold">
                                           <p:stCondLst>
                                             <p:cond delay="0"/>
                                           </p:stCondLst>
@@ -18692,14 +18945,14 @@
                                 </p:cTn>
                               </p:par>
                               <p:par>
-                                <p:cTn id="20" presetID="1" presetClass="exit" presetSubtype="0" fill="hold" grpId="1" nodeType="withEffect">
+                                <p:cTn id="25" presetID="1" presetClass="exit" presetSubtype="0" fill="hold" grpId="1" nodeType="withEffect">
                                   <p:stCondLst>
                                     <p:cond delay="0"/>
                                   </p:stCondLst>
                                   <p:childTnLst>
                                     <p:set>
                                       <p:cBhvr>
-                                        <p:cTn id="21" dur="1" fill="hold">
+                                        <p:cTn id="26" dur="1" fill="hold">
                                           <p:stCondLst>
                                             <p:cond delay="0"/>
                                           </p:stCondLst>
@@ -18722,68 +18975,15 @@
                           </p:cTn>
                         </p:par>
                         <p:par>
-                          <p:cTn id="22" fill="hold">
-                            <p:stCondLst>
-                              <p:cond delay="0"/>
-                            </p:stCondLst>
-                            <p:childTnLst>
-                              <p:par>
-                                <p:cTn id="23" presetID="8" presetClass="entr" presetSubtype="16" fill="hold" grpId="0" nodeType="afterEffect">
-                                  <p:stCondLst>
-                                    <p:cond delay="0"/>
-                                  </p:stCondLst>
-                                  <p:childTnLst>
-                                    <p:set>
-                                      <p:cBhvr>
-                                        <p:cTn id="24" dur="1" fill="hold">
-                                          <p:stCondLst>
-                                            <p:cond delay="0"/>
-                                          </p:stCondLst>
-                                        </p:cTn>
-                                        <p:tgtEl>
-                                          <p:spTgt spid="165894"/>
-                                        </p:tgtEl>
-                                        <p:attrNameLst>
-                                          <p:attrName>style.visibility</p:attrName>
-                                        </p:attrNameLst>
-                                      </p:cBhvr>
-                                      <p:to>
-                                        <p:strVal val="visible"/>
-                                      </p:to>
-                                    </p:set>
-                                    <p:animEffect transition="in" filter="diamond(in)">
-                                      <p:cBhvr>
-                                        <p:cTn id="25" dur="500"/>
-                                        <p:tgtEl>
-                                          <p:spTgt spid="165894"/>
-                                        </p:tgtEl>
-                                      </p:cBhvr>
-                                    </p:animEffect>
-                                  </p:childTnLst>
-                                </p:cTn>
-                              </p:par>
-                            </p:childTnLst>
-                          </p:cTn>
-                        </p:par>
-                      </p:childTnLst>
-                    </p:cTn>
-                  </p:par>
-                  <p:par>
-                    <p:cTn id="26" fill="hold">
-                      <p:stCondLst>
-                        <p:cond delay="indefinite"/>
-                      </p:stCondLst>
-                      <p:childTnLst>
-                        <p:par>
                           <p:cTn id="27" fill="hold">
                             <p:stCondLst>
                               <p:cond delay="0"/>
                             </p:stCondLst>
                             <p:childTnLst>
                               <p:par>
-                                <p:cTn id="28" presetID="8" presetClass="entr" presetSubtype="16" fill="hold" grpId="0" nodeType="clickEffect">
+                                <p:cTn id="28" presetID="8" presetClass="entr" presetSubtype="16" fill="hold" grpId="0" nodeType="afterEffect">
                                   <p:stCondLst>
-                                    <p:cond delay="0"/>
+                                    <p:cond delay="500"/>
                                   </p:stCondLst>
                                   <p:childTnLst>
                                     <p:set>
@@ -18887,7 +19087,7 @@
                             </p:stCondLst>
                             <p:childTnLst>
                               <p:par>
-                                <p:cTn id="38" presetID="1" presetClass="entr" presetSubtype="0" fill="hold" grpId="0" nodeType="clickEffect">
+                                <p:cTn id="38" presetID="8" presetClass="entr" presetSubtype="16" fill="hold" grpId="0" nodeType="clickEffect">
                                   <p:stCondLst>
                                     <p:cond delay="0"/>
                                   </p:stCondLst>
@@ -18895,6 +19095,59 @@
                                     <p:set>
                                       <p:cBhvr>
                                         <p:cTn id="39" dur="1" fill="hold">
+                                          <p:stCondLst>
+                                            <p:cond delay="0"/>
+                                          </p:stCondLst>
+                                        </p:cTn>
+                                        <p:tgtEl>
+                                          <p:spTgt spid="13"/>
+                                        </p:tgtEl>
+                                        <p:attrNameLst>
+                                          <p:attrName>style.visibility</p:attrName>
+                                        </p:attrNameLst>
+                                      </p:cBhvr>
+                                      <p:to>
+                                        <p:strVal val="visible"/>
+                                      </p:to>
+                                    </p:set>
+                                    <p:animEffect transition="in" filter="diamond(in)">
+                                      <p:cBhvr>
+                                        <p:cTn id="40" dur="500"/>
+                                        <p:tgtEl>
+                                          <p:spTgt spid="13"/>
+                                        </p:tgtEl>
+                                      </p:cBhvr>
+                                    </p:animEffect>
+                                  </p:childTnLst>
+                                </p:cTn>
+                              </p:par>
+                            </p:childTnLst>
+                          </p:cTn>
+                        </p:par>
+                      </p:childTnLst>
+                    </p:cTn>
+                  </p:par>
+                  <p:par>
+                    <p:cTn id="41" fill="hold">
+                      <p:stCondLst>
+                        <p:cond delay="indefinite"/>
+                      </p:stCondLst>
+                      <p:childTnLst>
+                        <p:par>
+                          <p:cTn id="42" fill="hold">
+                            <p:stCondLst>
+                              <p:cond delay="0"/>
+                            </p:stCondLst>
+                            <p:childTnLst>
+                              <p:par>
+                                <p:cTn id="43" presetID="1" presetClass="entr" presetSubtype="0" fill="hold" grpId="0" nodeType="clickEffect">
+                                  <p:stCondLst>
+                                    <p:cond delay="0"/>
+                                  </p:stCondLst>
+                                  <p:childTnLst>
+                                    <p:set>
+                                      <p:cBhvr>
+                                        <p:cTn id="44" dur="1" fill="hold">
                                           <p:stCondLst>
                                             <p:cond delay="0"/>
                                           </p:stCondLst>
@@ -18954,6 +19207,7 @@
       <p:bldP spid="2" grpId="1" animBg="1"/>
       <p:bldP spid="12" grpId="0" animBg="1"/>
       <p:bldP spid="12" grpId="1" animBg="1"/>
+      <p:bldP spid="13" grpId="0" animBg="1"/>
     </p:bldLst>
   </p:timing>
 </p:sld>

</xml_diff>

<commit_message>
Updated Foundations Module Exercise, slides, etc.
</commit_message>
<xml_diff>
--- a/modules/LMFoundations/PPT.pptx
+++ b/modules/LMFoundations/PPT.pptx
@@ -5,42 +5,44 @@
     <p:sldMasterId id="2147483648" r:id="rId1"/>
   </p:sldMasterIdLst>
   <p:notesMasterIdLst>
-    <p:notesMasterId r:id="rId35"/>
+    <p:notesMasterId r:id="rId37"/>
   </p:notesMasterIdLst>
   <p:sldIdLst>
     <p:sldId id="256" r:id="rId2"/>
-    <p:sldId id="300" r:id="rId3"/>
-    <p:sldId id="301" r:id="rId4"/>
-    <p:sldId id="257" r:id="rId5"/>
-    <p:sldId id="291" r:id="rId6"/>
-    <p:sldId id="293" r:id="rId7"/>
-    <p:sldId id="297" r:id="rId8"/>
-    <p:sldId id="298" r:id="rId9"/>
-    <p:sldId id="299" r:id="rId10"/>
-    <p:sldId id="259" r:id="rId11"/>
-    <p:sldId id="260" r:id="rId12"/>
-    <p:sldId id="302" r:id="rId13"/>
-    <p:sldId id="303" r:id="rId14"/>
-    <p:sldId id="263" r:id="rId15"/>
-    <p:sldId id="284" r:id="rId16"/>
-    <p:sldId id="294" r:id="rId17"/>
-    <p:sldId id="295" r:id="rId18"/>
-    <p:sldId id="266" r:id="rId19"/>
-    <p:sldId id="267" r:id="rId20"/>
-    <p:sldId id="268" r:id="rId21"/>
-    <p:sldId id="269" r:id="rId22"/>
-    <p:sldId id="270" r:id="rId23"/>
-    <p:sldId id="271" r:id="rId24"/>
-    <p:sldId id="272" r:id="rId25"/>
-    <p:sldId id="273" r:id="rId26"/>
-    <p:sldId id="285" r:id="rId27"/>
-    <p:sldId id="275" r:id="rId28"/>
-    <p:sldId id="277" r:id="rId29"/>
-    <p:sldId id="278" r:id="rId30"/>
-    <p:sldId id="290" r:id="rId31"/>
-    <p:sldId id="296" r:id="rId32"/>
-    <p:sldId id="287" r:id="rId33"/>
-    <p:sldId id="280" r:id="rId34"/>
+    <p:sldId id="305" r:id="rId3"/>
+    <p:sldId id="300" r:id="rId4"/>
+    <p:sldId id="301" r:id="rId5"/>
+    <p:sldId id="257" r:id="rId6"/>
+    <p:sldId id="306" r:id="rId7"/>
+    <p:sldId id="291" r:id="rId8"/>
+    <p:sldId id="293" r:id="rId9"/>
+    <p:sldId id="297" r:id="rId10"/>
+    <p:sldId id="298" r:id="rId11"/>
+    <p:sldId id="299" r:id="rId12"/>
+    <p:sldId id="259" r:id="rId13"/>
+    <p:sldId id="260" r:id="rId14"/>
+    <p:sldId id="302" r:id="rId15"/>
+    <p:sldId id="303" r:id="rId16"/>
+    <p:sldId id="263" r:id="rId17"/>
+    <p:sldId id="284" r:id="rId18"/>
+    <p:sldId id="294" r:id="rId19"/>
+    <p:sldId id="295" r:id="rId20"/>
+    <p:sldId id="266" r:id="rId21"/>
+    <p:sldId id="267" r:id="rId22"/>
+    <p:sldId id="268" r:id="rId23"/>
+    <p:sldId id="269" r:id="rId24"/>
+    <p:sldId id="270" r:id="rId25"/>
+    <p:sldId id="271" r:id="rId26"/>
+    <p:sldId id="272" r:id="rId27"/>
+    <p:sldId id="273" r:id="rId28"/>
+    <p:sldId id="285" r:id="rId29"/>
+    <p:sldId id="275" r:id="rId30"/>
+    <p:sldId id="277" r:id="rId31"/>
+    <p:sldId id="278" r:id="rId32"/>
+    <p:sldId id="290" r:id="rId33"/>
+    <p:sldId id="296" r:id="rId34"/>
+    <p:sldId id="287" r:id="rId35"/>
+    <p:sldId id="280" r:id="rId36"/>
   </p:sldIdLst>
   <p:sldSz cx="9144000" cy="6858000" type="screen4x3"/>
   <p:notesSz cx="6858000" cy="9144000"/>
@@ -661,7 +663,7 @@
             <a:fld id="{0895F6ED-6644-4B80-8BAB-DF3A941B6440}" type="slidenum">
               <a:rPr lang="en-US"/>
               <a:pPr/>
-              <a:t>32</a:t>
+              <a:t>34</a:t>
             </a:fld>
             <a:endParaRPr lang="en-US"/>
           </a:p>
@@ -3574,6 +3576,328 @@
 </file>
 
 <file path=ppt/slides/slide10.xml><?xml version="1.0" encoding="utf-8"?>
+<p:sld xmlns:a="http://schemas.openxmlformats.org/drawingml/2006/main" xmlns:r="http://schemas.openxmlformats.org/officeDocument/2006/relationships" xmlns:p="http://schemas.openxmlformats.org/presentationml/2006/main" show="0">
+  <p:cSld>
+    <p:spTree>
+      <p:nvGrpSpPr>
+        <p:cNvPr id="1" name=""/>
+        <p:cNvGrpSpPr/>
+        <p:nvPr/>
+      </p:nvGrpSpPr>
+      <p:grpSpPr>
+        <a:xfrm>
+          <a:off x="0" y="0"/>
+          <a:ext cx="0" cy="0"/>
+          <a:chOff x="0" y="0"/>
+          <a:chExt cx="0" cy="0"/>
+        </a:xfrm>
+      </p:grpSpPr>
+      <p:sp>
+        <p:nvSpPr>
+          <p:cNvPr id="4" name="Footer Placeholder 3"/>
+          <p:cNvSpPr>
+            <a:spLocks noGrp="1"/>
+          </p:cNvSpPr>
+          <p:nvPr>
+            <p:ph type="ftr" sz="quarter" idx="10"/>
+          </p:nvPr>
+        </p:nvSpPr>
+        <p:spPr/>
+        <p:txBody>
+          <a:bodyPr/>
+          <a:lstStyle/>
+          <a:p>
+            <a:r>
+              <a:rPr lang="en-US" smtClean="0"/>
+              <a:t>LM Foundation</a:t>
+            </a:r>
+            <a:endParaRPr lang="en-US"/>
+          </a:p>
+        </p:txBody>
+      </p:sp>
+      <p:sp>
+        <p:nvSpPr>
+          <p:cNvPr id="5" name="Slide Number Placeholder 4"/>
+          <p:cNvSpPr>
+            <a:spLocks noGrp="1"/>
+          </p:cNvSpPr>
+          <p:nvPr>
+            <p:ph type="sldNum" sz="quarter" idx="11"/>
+          </p:nvPr>
+        </p:nvSpPr>
+        <p:spPr/>
+        <p:txBody>
+          <a:bodyPr/>
+          <a:lstStyle/>
+          <a:p>
+            <a:fld id="{2DF5461C-7FAD-4378-B074-D0FEBA4BBCD3}" type="slidenum">
+              <a:rPr lang="en-US" smtClean="0"/>
+              <a:pPr/>
+              <a:t>10</a:t>
+            </a:fld>
+            <a:endParaRPr lang="en-US"/>
+          </a:p>
+        </p:txBody>
+      </p:sp>
+      <p:sp>
+        <p:nvSpPr>
+          <p:cNvPr id="6" name="Title 1"/>
+          <p:cNvSpPr>
+            <a:spLocks noGrp="1"/>
+          </p:cNvSpPr>
+          <p:nvPr>
+            <p:ph type="title"/>
+          </p:nvPr>
+        </p:nvSpPr>
+        <p:spPr>
+          <a:xfrm>
+            <a:off x="65088" y="122238"/>
+            <a:ext cx="9012237" cy="868362"/>
+          </a:xfrm>
+        </p:spPr>
+        <p:txBody>
+          <a:bodyPr/>
+          <a:lstStyle/>
+          <a:p>
+            <a:r>
+              <a:rPr lang="en-US" dirty="0" smtClean="0"/>
+              <a:t>Which Test? Why?</a:t>
+            </a:r>
+            <a:endParaRPr lang="en-US" dirty="0"/>
+          </a:p>
+        </p:txBody>
+      </p:sp>
+      <p:pic>
+        <p:nvPicPr>
+          <p:cNvPr id="192516" name="Picture 4" descr="Susceptibility to allergen-driven AHR is associated a mixed TH17-TH2 immune response."/>
+          <p:cNvPicPr>
+            <a:picLocks noChangeAspect="1" noChangeArrowheads="1"/>
+          </p:cNvPicPr>
+          <p:nvPr/>
+        </p:nvPicPr>
+        <p:blipFill>
+          <a:blip r:embed="rId2">
+            <a:extLst>
+              <a:ext uri="{28A0092B-C50C-407E-A947-70E740481C1C}">
+                <a14:useLocalDpi xmlns:a14="http://schemas.microsoft.com/office/drawing/2010/main" val="0"/>
+              </a:ext>
+            </a:extLst>
+          </a:blip>
+          <a:srcRect/>
+          <a:stretch>
+            <a:fillRect/>
+          </a:stretch>
+        </p:blipFill>
+        <p:spPr bwMode="auto">
+          <a:xfrm>
+            <a:off x="990600" y="914400"/>
+            <a:ext cx="7239000" cy="5632035"/>
+          </a:xfrm>
+          <a:prstGeom prst="rect">
+            <a:avLst/>
+          </a:prstGeom>
+          <a:noFill/>
+          <a:extLst>
+            <a:ext uri="{909E8E84-426E-40DD-AFC4-6F175D3DCCD1}">
+              <a14:hiddenFill xmlns:a14="http://schemas.microsoft.com/office/drawing/2010/main">
+                <a:solidFill>
+                  <a:srgbClr val="FFFFFF"/>
+                </a:solidFill>
+              </a14:hiddenFill>
+            </a:ext>
+          </a:extLst>
+        </p:spPr>
+      </p:pic>
+    </p:spTree>
+    <p:extLst>
+      <p:ext uri="{BB962C8B-B14F-4D97-AF65-F5344CB8AC3E}">
+        <p14:creationId xmlns:p14="http://schemas.microsoft.com/office/powerpoint/2010/main" val="7949886"/>
+      </p:ext>
+    </p:extLst>
+  </p:cSld>
+  <p:clrMapOvr>
+    <a:masterClrMapping/>
+  </p:clrMapOvr>
+  <mc:AlternateContent xmlns:mc="http://schemas.openxmlformats.org/markup-compatibility/2006">
+    <mc:Choice xmlns:p14="http://schemas.microsoft.com/office/powerpoint/2010/main" Requires="p14">
+      <p:transition spd="slow" p14:dur="2000"/>
+    </mc:Choice>
+    <mc:Fallback>
+      <p:transition spd="slow"/>
+    </mc:Fallback>
+  </mc:AlternateContent>
+  <p:timing>
+    <p:tnLst>
+      <p:par>
+        <p:cTn id="1" dur="indefinite" restart="never" nodeType="tmRoot"/>
+      </p:par>
+    </p:tnLst>
+  </p:timing>
+</p:sld>
+</file>
+
+<file path=ppt/slides/slide11.xml><?xml version="1.0" encoding="utf-8"?>
+<p:sld xmlns:a="http://schemas.openxmlformats.org/drawingml/2006/main" xmlns:r="http://schemas.openxmlformats.org/officeDocument/2006/relationships" xmlns:p="http://schemas.openxmlformats.org/presentationml/2006/main" show="0">
+  <p:cSld>
+    <p:spTree>
+      <p:nvGrpSpPr>
+        <p:cNvPr id="1" name=""/>
+        <p:cNvGrpSpPr/>
+        <p:nvPr/>
+      </p:nvGrpSpPr>
+      <p:grpSpPr>
+        <a:xfrm>
+          <a:off x="0" y="0"/>
+          <a:ext cx="0" cy="0"/>
+          <a:chOff x="0" y="0"/>
+          <a:chExt cx="0" cy="0"/>
+        </a:xfrm>
+      </p:grpSpPr>
+      <p:sp>
+        <p:nvSpPr>
+          <p:cNvPr id="4" name="Footer Placeholder 3"/>
+          <p:cNvSpPr>
+            <a:spLocks noGrp="1"/>
+          </p:cNvSpPr>
+          <p:nvPr>
+            <p:ph type="ftr" sz="quarter" idx="10"/>
+          </p:nvPr>
+        </p:nvSpPr>
+        <p:spPr/>
+        <p:txBody>
+          <a:bodyPr/>
+          <a:lstStyle/>
+          <a:p>
+            <a:r>
+              <a:rPr lang="en-US" smtClean="0"/>
+              <a:t>LM Foundation</a:t>
+            </a:r>
+            <a:endParaRPr lang="en-US"/>
+          </a:p>
+        </p:txBody>
+      </p:sp>
+      <p:sp>
+        <p:nvSpPr>
+          <p:cNvPr id="5" name="Slide Number Placeholder 4"/>
+          <p:cNvSpPr>
+            <a:spLocks noGrp="1"/>
+          </p:cNvSpPr>
+          <p:nvPr>
+            <p:ph type="sldNum" sz="quarter" idx="11"/>
+          </p:nvPr>
+        </p:nvSpPr>
+        <p:spPr/>
+        <p:txBody>
+          <a:bodyPr/>
+          <a:lstStyle/>
+          <a:p>
+            <a:fld id="{2DF5461C-7FAD-4378-B074-D0FEBA4BBCD3}" type="slidenum">
+              <a:rPr lang="en-US" smtClean="0"/>
+              <a:pPr/>
+              <a:t>11</a:t>
+            </a:fld>
+            <a:endParaRPr lang="en-US"/>
+          </a:p>
+        </p:txBody>
+      </p:sp>
+      <p:sp>
+        <p:nvSpPr>
+          <p:cNvPr id="6" name="Title 1"/>
+          <p:cNvSpPr>
+            <a:spLocks noGrp="1"/>
+          </p:cNvSpPr>
+          <p:nvPr>
+            <p:ph type="title"/>
+          </p:nvPr>
+        </p:nvSpPr>
+        <p:spPr>
+          <a:xfrm>
+            <a:off x="65088" y="122238"/>
+            <a:ext cx="9012237" cy="868362"/>
+          </a:xfrm>
+        </p:spPr>
+        <p:txBody>
+          <a:bodyPr/>
+          <a:lstStyle/>
+          <a:p>
+            <a:r>
+              <a:rPr lang="en-US" dirty="0" smtClean="0"/>
+              <a:t>Which Test? Why?</a:t>
+            </a:r>
+            <a:endParaRPr lang="en-US" dirty="0"/>
+          </a:p>
+        </p:txBody>
+      </p:sp>
+      <p:pic>
+        <p:nvPicPr>
+          <p:cNvPr id="193538" name="Picture 2" descr="http://www.scielo.br/img/revistas/bjb/v63n2/a17fig01.gif"/>
+          <p:cNvPicPr>
+            <a:picLocks noChangeAspect="1" noChangeArrowheads="1"/>
+          </p:cNvPicPr>
+          <p:nvPr/>
+        </p:nvPicPr>
+        <p:blipFill>
+          <a:blip r:embed="rId2">
+            <a:extLst>
+              <a:ext uri="{28A0092B-C50C-407E-A947-70E740481C1C}">
+                <a14:useLocalDpi xmlns:a14="http://schemas.microsoft.com/office/drawing/2010/main" val="0"/>
+              </a:ext>
+            </a:extLst>
+          </a:blip>
+          <a:srcRect/>
+          <a:stretch>
+            <a:fillRect/>
+          </a:stretch>
+        </p:blipFill>
+        <p:spPr bwMode="auto">
+          <a:xfrm>
+            <a:off x="1981200" y="990600"/>
+            <a:ext cx="5715000" cy="5644793"/>
+          </a:xfrm>
+          <a:prstGeom prst="rect">
+            <a:avLst/>
+          </a:prstGeom>
+          <a:noFill/>
+          <a:extLst>
+            <a:ext uri="{909E8E84-426E-40DD-AFC4-6F175D3DCCD1}">
+              <a14:hiddenFill xmlns:a14="http://schemas.microsoft.com/office/drawing/2010/main">
+                <a:solidFill>
+                  <a:srgbClr val="FFFFFF"/>
+                </a:solidFill>
+              </a14:hiddenFill>
+            </a:ext>
+          </a:extLst>
+        </p:spPr>
+      </p:pic>
+    </p:spTree>
+    <p:extLst>
+      <p:ext uri="{BB962C8B-B14F-4D97-AF65-F5344CB8AC3E}">
+        <p14:creationId xmlns:p14="http://schemas.microsoft.com/office/powerpoint/2010/main" val="1804882695"/>
+      </p:ext>
+    </p:extLst>
+  </p:cSld>
+  <p:clrMapOvr>
+    <a:masterClrMapping/>
+  </p:clrMapOvr>
+  <mc:AlternateContent xmlns:mc="http://schemas.openxmlformats.org/markup-compatibility/2006">
+    <mc:Choice xmlns:p14="http://schemas.microsoft.com/office/powerpoint/2010/main" Requires="p14">
+      <p:transition spd="slow" p14:dur="2000"/>
+    </mc:Choice>
+    <mc:Fallback>
+      <p:transition spd="slow"/>
+    </mc:Fallback>
+  </mc:AlternateContent>
+  <p:timing>
+    <p:tnLst>
+      <p:par>
+        <p:cTn id="1" dur="indefinite" restart="never" nodeType="tmRoot"/>
+      </p:par>
+    </p:tnLst>
+  </p:timing>
+</p:sld>
+</file>
+
+<file path=ppt/slides/slide12.xml><?xml version="1.0" encoding="utf-8"?>
 <p:sld xmlns:a="http://schemas.openxmlformats.org/drawingml/2006/main" xmlns:r="http://schemas.openxmlformats.org/officeDocument/2006/relationships" xmlns:p="http://schemas.openxmlformats.org/presentationml/2006/main">
   <p:cSld>
     <p:spTree>
@@ -3630,7 +3954,7 @@
             <a:fld id="{BCE2B70E-1790-410C-8474-796ED8699327}" type="slidenum">
               <a:rPr lang="en-US"/>
               <a:pPr/>
-              <a:t>10</a:t>
+              <a:t>12</a:t>
             </a:fld>
             <a:endParaRPr lang="en-US"/>
           </a:p>
@@ -3841,7 +4165,7 @@
 </p:sld>
 </file>
 
-<file path=ppt/slides/slide11.xml><?xml version="1.0" encoding="utf-8"?>
+<file path=ppt/slides/slide13.xml><?xml version="1.0" encoding="utf-8"?>
 <p:sld xmlns:a="http://schemas.openxmlformats.org/drawingml/2006/main" xmlns:r="http://schemas.openxmlformats.org/officeDocument/2006/relationships" xmlns:p="http://schemas.openxmlformats.org/presentationml/2006/main">
   <p:cSld>
     <p:spTree>
@@ -3898,7 +4222,7 @@
             <a:fld id="{56FAE41D-D92A-4900-8FE6-0712747FCD6D}" type="slidenum">
               <a:rPr lang="en-US"/>
               <a:pPr/>
-              <a:t>11</a:t>
+              <a:t>13</a:t>
             </a:fld>
             <a:endParaRPr lang="en-US"/>
           </a:p>
@@ -4368,7 +4692,7 @@
 </p:sld>
 </file>
 
-<file path=ppt/slides/slide12.xml><?xml version="1.0" encoding="utf-8"?>
+<file path=ppt/slides/slide14.xml><?xml version="1.0" encoding="utf-8"?>
 <p:sld xmlns:a="http://schemas.openxmlformats.org/drawingml/2006/main" xmlns:r="http://schemas.openxmlformats.org/officeDocument/2006/relationships" xmlns:p="http://schemas.openxmlformats.org/presentationml/2006/main">
   <p:cSld>
     <p:spTree>
@@ -4449,7 +4773,7 @@
             <a:fld id="{2DF5461C-7FAD-4378-B074-D0FEBA4BBCD3}" type="slidenum">
               <a:rPr lang="en-US" smtClean="0"/>
               <a:pPr/>
-              <a:t>12</a:t>
+              <a:t>14</a:t>
             </a:fld>
             <a:endParaRPr lang="en-US"/>
           </a:p>
@@ -5428,7 +5752,7 @@
 </p:sld>
 </file>
 
-<file path=ppt/slides/slide13.xml><?xml version="1.0" encoding="utf-8"?>
+<file path=ppt/slides/slide15.xml><?xml version="1.0" encoding="utf-8"?>
 <p:sld xmlns:a="http://schemas.openxmlformats.org/drawingml/2006/main" xmlns:r="http://schemas.openxmlformats.org/officeDocument/2006/relationships" xmlns:p="http://schemas.openxmlformats.org/presentationml/2006/main">
   <p:cSld>
     <p:spTree>
@@ -5509,7 +5833,7 @@
             <a:fld id="{2DF5461C-7FAD-4378-B074-D0FEBA4BBCD3}" type="slidenum">
               <a:rPr lang="en-US" smtClean="0"/>
               <a:pPr/>
-              <a:t>13</a:t>
+              <a:t>15</a:t>
             </a:fld>
             <a:endParaRPr lang="en-US"/>
           </a:p>
@@ -6062,7 +6386,7 @@
 </p:sld>
 </file>
 
-<file path=ppt/slides/slide14.xml><?xml version="1.0" encoding="utf-8"?>
+<file path=ppt/slides/slide16.xml><?xml version="1.0" encoding="utf-8"?>
 <p:sld xmlns:a="http://schemas.openxmlformats.org/drawingml/2006/main" xmlns:r="http://schemas.openxmlformats.org/officeDocument/2006/relationships" xmlns:p="http://schemas.openxmlformats.org/presentationml/2006/main">
   <p:cSld>
     <p:spTree>
@@ -6119,7 +6443,7 @@
             <a:fld id="{FA590A10-0C3F-4A36-BFC9-3F06CDE6602F}" type="slidenum">
               <a:rPr lang="en-US"/>
               <a:pPr/>
-              <a:t>14</a:t>
+              <a:t>16</a:t>
             </a:fld>
             <a:endParaRPr lang="en-US"/>
           </a:p>
@@ -6448,7 +6772,7 @@
 </p:sld>
 </file>
 
-<file path=ppt/slides/slide15.xml><?xml version="1.0" encoding="utf-8"?>
+<file path=ppt/slides/slide17.xml><?xml version="1.0" encoding="utf-8"?>
 <p:sld xmlns:a="http://schemas.openxmlformats.org/drawingml/2006/main" xmlns:r="http://schemas.openxmlformats.org/officeDocument/2006/relationships" xmlns:p="http://schemas.openxmlformats.org/presentationml/2006/main">
   <p:cSld>
     <p:spTree>
@@ -6505,7 +6829,7 @@
             <a:fld id="{605CB4AD-3616-434C-B27B-28A3B2617624}" type="slidenum">
               <a:rPr lang="en-US"/>
               <a:pPr/>
-              <a:t>15</a:t>
+              <a:t>17</a:t>
             </a:fld>
             <a:endParaRPr lang="en-US"/>
           </a:p>
@@ -6868,7 +7192,7 @@
 </p:sld>
 </file>
 
-<file path=ppt/slides/slide16.xml><?xml version="1.0" encoding="utf-8"?>
+<file path=ppt/slides/slide18.xml><?xml version="1.0" encoding="utf-8"?>
 <p:sld xmlns:a="http://schemas.openxmlformats.org/drawingml/2006/main" xmlns:r="http://schemas.openxmlformats.org/officeDocument/2006/relationships" xmlns:p="http://schemas.openxmlformats.org/presentationml/2006/main">
   <p:cSld>
     <p:spTree>
@@ -6931,7 +7255,7 @@
             <a:fld id="{2DF5461C-7FAD-4378-B074-D0FEBA4BBCD3}" type="slidenum">
               <a:rPr lang="en-US" smtClean="0"/>
               <a:pPr/>
-              <a:t>16</a:t>
+              <a:t>18</a:t>
             </a:fld>
             <a:endParaRPr lang="en-US"/>
           </a:p>
@@ -7732,7 +8056,7 @@
 </p:sld>
 </file>
 
-<file path=ppt/slides/slide17.xml><?xml version="1.0" encoding="utf-8"?>
+<file path=ppt/slides/slide19.xml><?xml version="1.0" encoding="utf-8"?>
 <p:sld xmlns:a="http://schemas.openxmlformats.org/drawingml/2006/main" xmlns:r="http://schemas.openxmlformats.org/officeDocument/2006/relationships" xmlns:p="http://schemas.openxmlformats.org/presentationml/2006/main">
   <p:cSld>
     <p:spTree>
@@ -7977,7 +8301,7 @@
 </p:sld>
 </file>
 
-<file path=ppt/slides/slide18.xml><?xml version="1.0" encoding="utf-8"?>
+<file path=ppt/slides/slide2.xml><?xml version="1.0" encoding="utf-8"?>
 <p:sld xmlns:a="http://schemas.openxmlformats.org/drawingml/2006/main" xmlns:r="http://schemas.openxmlformats.org/officeDocument/2006/relationships" xmlns:p="http://schemas.openxmlformats.org/presentationml/2006/main">
   <p:cSld>
     <p:spTree>
@@ -7996,6 +8320,80 @@
       </p:grpSpPr>
       <p:sp>
         <p:nvSpPr>
+          <p:cNvPr id="2" name="Title 1"/>
+          <p:cNvSpPr>
+            <a:spLocks noGrp="1"/>
+          </p:cNvSpPr>
+          <p:nvPr>
+            <p:ph type="title"/>
+          </p:nvPr>
+        </p:nvSpPr>
+        <p:spPr/>
+        <p:txBody>
+          <a:bodyPr/>
+          <a:lstStyle/>
+          <a:p>
+            <a:r>
+              <a:rPr lang="en-US" dirty="0" smtClean="0"/>
+              <a:t>Class Exercise Handout</a:t>
+            </a:r>
+            <a:endParaRPr lang="en-US" dirty="0"/>
+          </a:p>
+        </p:txBody>
+      </p:sp>
+      <p:sp>
+        <p:nvSpPr>
+          <p:cNvPr id="3" name="Content Placeholder 2"/>
+          <p:cNvSpPr>
+            <a:spLocks noGrp="1"/>
+          </p:cNvSpPr>
+          <p:nvPr>
+            <p:ph idx="1"/>
+          </p:nvPr>
+        </p:nvSpPr>
+        <p:spPr/>
+        <p:txBody>
+          <a:bodyPr/>
+          <a:lstStyle/>
+          <a:p>
+            <a:r>
+              <a:rPr lang="en-US" dirty="0" smtClean="0"/>
+              <a:t>What Type of Variables?</a:t>
+            </a:r>
+          </a:p>
+          <a:p>
+            <a:pPr lvl="1"/>
+            <a:r>
+              <a:rPr lang="en-US" dirty="0" smtClean="0"/>
+              <a:t>Before you begin … what are your choices (main categories, subcategories)?</a:t>
+            </a:r>
+          </a:p>
+          <a:p>
+            <a:pPr lvl="1"/>
+            <a:endParaRPr lang="en-US" dirty="0" smtClean="0"/>
+          </a:p>
+          <a:p>
+            <a:pPr lvl="1"/>
+            <a:endParaRPr lang="en-US" dirty="0" smtClean="0"/>
+          </a:p>
+          <a:p>
+            <a:r>
+              <a:rPr lang="en-US" dirty="0" smtClean="0"/>
+              <a:t>What is the Response Variable?</a:t>
+            </a:r>
+          </a:p>
+          <a:p>
+            <a:pPr lvl="1"/>
+            <a:r>
+              <a:rPr lang="en-US" dirty="0" smtClean="0"/>
+              <a:t>Before your being … what is a response variable?</a:t>
+            </a:r>
+            <a:endParaRPr lang="en-US" dirty="0"/>
+          </a:p>
+        </p:txBody>
+      </p:sp>
+      <p:sp>
+        <p:nvSpPr>
           <p:cNvPr id="4" name="Footer Placeholder 3"/>
           <p:cNvSpPr>
             <a:spLocks noGrp="1"/>
@@ -8010,9 +8408,10 @@
           <a:lstStyle/>
           <a:p>
             <a:r>
-              <a:rPr lang="en-US"/>
+              <a:rPr lang="en-US" smtClean="0"/>
               <a:t>LM Foundation</a:t>
             </a:r>
+            <a:endParaRPr lang="en-US"/>
           </a:p>
         </p:txBody>
       </p:sp>
@@ -8031,10 +8430,199 @@
           <a:bodyPr/>
           <a:lstStyle/>
           <a:p>
+            <a:fld id="{2DF5461C-7FAD-4378-B074-D0FEBA4BBCD3}" type="slidenum">
+              <a:rPr lang="en-US" smtClean="0"/>
+              <a:pPr/>
+              <a:t>2</a:t>
+            </a:fld>
+            <a:endParaRPr lang="en-US"/>
+          </a:p>
+        </p:txBody>
+      </p:sp>
+    </p:spTree>
+    <p:extLst>
+      <p:ext uri="{BB962C8B-B14F-4D97-AF65-F5344CB8AC3E}">
+        <p14:creationId xmlns:p14="http://schemas.microsoft.com/office/powerpoint/2010/main" val="2514784691"/>
+      </p:ext>
+    </p:extLst>
+  </p:cSld>
+  <p:clrMapOvr>
+    <a:masterClrMapping/>
+  </p:clrMapOvr>
+  <p:timing>
+    <p:tnLst>
+      <p:par>
+        <p:cTn id="1" dur="indefinite" restart="never" nodeType="tmRoot">
+          <p:childTnLst>
+            <p:seq concurrent="1" nextAc="seek">
+              <p:cTn id="2" dur="indefinite" nodeType="mainSeq">
+                <p:childTnLst>
+                  <p:par>
+                    <p:cTn id="3" fill="hold">
+                      <p:stCondLst>
+                        <p:cond delay="indefinite"/>
+                      </p:stCondLst>
+                      <p:childTnLst>
+                        <p:par>
+                          <p:cTn id="4" fill="hold">
+                            <p:stCondLst>
+                              <p:cond delay="0"/>
+                            </p:stCondLst>
+                            <p:childTnLst>
+                              <p:par>
+                                <p:cTn id="5" presetID="1" presetClass="entr" presetSubtype="0" fill="hold" grpId="0" nodeType="clickEffect">
+                                  <p:stCondLst>
+                                    <p:cond delay="0"/>
+                                  </p:stCondLst>
+                                  <p:childTnLst>
+                                    <p:set>
+                                      <p:cBhvr>
+                                        <p:cTn id="6" dur="1" fill="hold">
+                                          <p:stCondLst>
+                                            <p:cond delay="0"/>
+                                          </p:stCondLst>
+                                        </p:cTn>
+                                        <p:tgtEl>
+                                          <p:spTgt spid="3">
+                                            <p:txEl>
+                                              <p:pRg st="4" end="4"/>
+                                            </p:txEl>
+                                          </p:spTgt>
+                                        </p:tgtEl>
+                                        <p:attrNameLst>
+                                          <p:attrName>style.visibility</p:attrName>
+                                        </p:attrNameLst>
+                                      </p:cBhvr>
+                                      <p:to>
+                                        <p:strVal val="visible"/>
+                                      </p:to>
+                                    </p:set>
+                                  </p:childTnLst>
+                                </p:cTn>
+                              </p:par>
+                              <p:par>
+                                <p:cTn id="7" presetID="1" presetClass="entr" presetSubtype="0" fill="hold" grpId="0" nodeType="withEffect">
+                                  <p:stCondLst>
+                                    <p:cond delay="0"/>
+                                  </p:stCondLst>
+                                  <p:childTnLst>
+                                    <p:set>
+                                      <p:cBhvr>
+                                        <p:cTn id="8" dur="1" fill="hold">
+                                          <p:stCondLst>
+                                            <p:cond delay="0"/>
+                                          </p:stCondLst>
+                                        </p:cTn>
+                                        <p:tgtEl>
+                                          <p:spTgt spid="3">
+                                            <p:txEl>
+                                              <p:pRg st="5" end="5"/>
+                                            </p:txEl>
+                                          </p:spTgt>
+                                        </p:tgtEl>
+                                        <p:attrNameLst>
+                                          <p:attrName>style.visibility</p:attrName>
+                                        </p:attrNameLst>
+                                      </p:cBhvr>
+                                      <p:to>
+                                        <p:strVal val="visible"/>
+                                      </p:to>
+                                    </p:set>
+                                  </p:childTnLst>
+                                </p:cTn>
+                              </p:par>
+                            </p:childTnLst>
+                          </p:cTn>
+                        </p:par>
+                      </p:childTnLst>
+                    </p:cTn>
+                  </p:par>
+                </p:childTnLst>
+              </p:cTn>
+              <p:prevCondLst>
+                <p:cond evt="onPrev" delay="0">
+                  <p:tgtEl>
+                    <p:sldTgt/>
+                  </p:tgtEl>
+                </p:cond>
+              </p:prevCondLst>
+              <p:nextCondLst>
+                <p:cond evt="onNext" delay="0">
+                  <p:tgtEl>
+                    <p:sldTgt/>
+                  </p:tgtEl>
+                </p:cond>
+              </p:nextCondLst>
+            </p:seq>
+          </p:childTnLst>
+        </p:cTn>
+      </p:par>
+    </p:tnLst>
+    <p:bldLst>
+      <p:bldP spid="3" grpId="0" uiExpand="1" build="p"/>
+    </p:bldLst>
+  </p:timing>
+</p:sld>
+</file>
+
+<file path=ppt/slides/slide20.xml><?xml version="1.0" encoding="utf-8"?>
+<p:sld xmlns:a="http://schemas.openxmlformats.org/drawingml/2006/main" xmlns:r="http://schemas.openxmlformats.org/officeDocument/2006/relationships" xmlns:p="http://schemas.openxmlformats.org/presentationml/2006/main">
+  <p:cSld>
+    <p:spTree>
+      <p:nvGrpSpPr>
+        <p:cNvPr id="1" name=""/>
+        <p:cNvGrpSpPr/>
+        <p:nvPr/>
+      </p:nvGrpSpPr>
+      <p:grpSpPr>
+        <a:xfrm>
+          <a:off x="0" y="0"/>
+          <a:ext cx="0" cy="0"/>
+          <a:chOff x="0" y="0"/>
+          <a:chExt cx="0" cy="0"/>
+        </a:xfrm>
+      </p:grpSpPr>
+      <p:sp>
+        <p:nvSpPr>
+          <p:cNvPr id="4" name="Footer Placeholder 3"/>
+          <p:cNvSpPr>
+            <a:spLocks noGrp="1"/>
+          </p:cNvSpPr>
+          <p:nvPr>
+            <p:ph type="ftr" sz="quarter" idx="10"/>
+          </p:nvPr>
+        </p:nvSpPr>
+        <p:spPr/>
+        <p:txBody>
+          <a:bodyPr/>
+          <a:lstStyle/>
+          <a:p>
+            <a:r>
+              <a:rPr lang="en-US"/>
+              <a:t>LM Foundation</a:t>
+            </a:r>
+          </a:p>
+        </p:txBody>
+      </p:sp>
+      <p:sp>
+        <p:nvSpPr>
+          <p:cNvPr id="5" name="Slide Number Placeholder 4"/>
+          <p:cNvSpPr>
+            <a:spLocks noGrp="1"/>
+          </p:cNvSpPr>
+          <p:nvPr>
+            <p:ph type="sldNum" sz="quarter" idx="11"/>
+          </p:nvPr>
+        </p:nvSpPr>
+        <p:spPr/>
+        <p:txBody>
+          <a:bodyPr/>
+          <a:lstStyle/>
+          <a:p>
             <a:fld id="{A463E65D-2EA1-4E1B-9B14-30F30247524D}" type="slidenum">
               <a:rPr lang="en-US"/>
               <a:pPr/>
-              <a:t>18</a:t>
+              <a:t>20</a:t>
             </a:fld>
             <a:endParaRPr lang="en-US"/>
           </a:p>
@@ -8532,7 +9120,7 @@
 </p:sld>
 </file>
 
-<file path=ppt/slides/slide19.xml><?xml version="1.0" encoding="utf-8"?>
+<file path=ppt/slides/slide21.xml><?xml version="1.0" encoding="utf-8"?>
 <p:sld xmlns:a="http://schemas.openxmlformats.org/drawingml/2006/main" xmlns:r="http://schemas.openxmlformats.org/officeDocument/2006/relationships" xmlns:p="http://schemas.openxmlformats.org/presentationml/2006/main">
   <p:cSld>
     <p:spTree>
@@ -8589,7 +9177,7 @@
             <a:fld id="{9613C366-1195-4713-B0B1-FC1AEC6E7B9E}" type="slidenum">
               <a:rPr lang="en-US"/>
               <a:pPr/>
-              <a:t>19</a:t>
+              <a:t>21</a:t>
             </a:fld>
             <a:endParaRPr lang="en-US"/>
           </a:p>
@@ -8979,7 +9567,7 @@
 </p:sld>
 </file>
 
-<file path=ppt/slides/slide2.xml><?xml version="1.0" encoding="utf-8"?>
+<file path=ppt/slides/slide22.xml><?xml version="1.0" encoding="utf-8"?>
 <p:sld xmlns:a="http://schemas.openxmlformats.org/drawingml/2006/main" xmlns:r="http://schemas.openxmlformats.org/officeDocument/2006/relationships" xmlns:p="http://schemas.openxmlformats.org/presentationml/2006/main">
   <p:cSld>
     <p:spTree>
@@ -8998,306 +9586,6 @@
       </p:grpSpPr>
       <p:sp>
         <p:nvSpPr>
-          <p:cNvPr id="2" name="Title 1"/>
-          <p:cNvSpPr>
-            <a:spLocks noGrp="1"/>
-          </p:cNvSpPr>
-          <p:nvPr>
-            <p:ph type="title"/>
-          </p:nvPr>
-        </p:nvSpPr>
-        <p:spPr/>
-        <p:txBody>
-          <a:bodyPr/>
-          <a:lstStyle/>
-          <a:p>
-            <a:r>
-              <a:rPr lang="en-US" dirty="0" smtClean="0"/>
-              <a:t>What Type of Variable?</a:t>
-            </a:r>
-            <a:endParaRPr lang="en-US" dirty="0"/>
-          </a:p>
-        </p:txBody>
-      </p:sp>
-      <p:sp>
-        <p:nvSpPr>
-          <p:cNvPr id="3" name="Content Placeholder 2"/>
-          <p:cNvSpPr>
-            <a:spLocks noGrp="1"/>
-          </p:cNvSpPr>
-          <p:nvPr>
-            <p:ph idx="1"/>
-          </p:nvPr>
-        </p:nvSpPr>
-        <p:spPr>
-          <a:xfrm>
-            <a:off x="457200" y="990600"/>
-            <a:ext cx="8229600" cy="5562600"/>
-          </a:xfrm>
-        </p:spPr>
-        <p:txBody>
-          <a:bodyPr/>
-          <a:lstStyle/>
-          <a:p>
-            <a:pPr marL="457200" indent="-457200">
-              <a:buFont typeface="+mj-lt"/>
-              <a:buAutoNum type="arabicPeriod"/>
-            </a:pPr>
-            <a:r>
-              <a:rPr lang="en-US" sz="2400" dirty="0" smtClean="0"/>
-              <a:t>Temperature (</a:t>
-            </a:r>
-            <a:r>
-              <a:rPr lang="en-US" sz="2400" i="1" baseline="30000" dirty="0" err="1" smtClean="0"/>
-              <a:t>o</a:t>
-            </a:r>
-            <a:r>
-              <a:rPr lang="en-US" sz="2400" i="1" dirty="0" err="1" smtClean="0"/>
-              <a:t>F</a:t>
-            </a:r>
-            <a:r>
-              <a:rPr lang="en-US" sz="2400" dirty="0" smtClean="0"/>
-              <a:t>)</a:t>
-            </a:r>
-          </a:p>
-          <a:p>
-            <a:pPr marL="457200" indent="-457200">
-              <a:buFont typeface="+mj-lt"/>
-              <a:buAutoNum type="arabicPeriod"/>
-            </a:pPr>
-            <a:r>
-              <a:rPr lang="en-US" sz="2400" dirty="0"/>
-              <a:t>Habitat complexity (</a:t>
-            </a:r>
-            <a:r>
-              <a:rPr lang="en-US" sz="2400" i="1" dirty="0"/>
-              <a:t>low, medium, high</a:t>
-            </a:r>
-            <a:r>
-              <a:rPr lang="en-US" sz="2400" dirty="0"/>
-              <a:t>)</a:t>
-            </a:r>
-          </a:p>
-          <a:p>
-            <a:pPr marL="457200" indent="-457200">
-              <a:buFont typeface="+mj-lt"/>
-              <a:buAutoNum type="arabicPeriod"/>
-            </a:pPr>
-            <a:r>
-              <a:rPr lang="en-US" sz="2400" dirty="0" smtClean="0"/>
-              <a:t>Home range size (</a:t>
-            </a:r>
-            <a:r>
-              <a:rPr lang="en-US" sz="2400" i="1" dirty="0" smtClean="0"/>
-              <a:t>m</a:t>
-            </a:r>
-            <a:r>
-              <a:rPr lang="en-US" sz="2400" i="1" baseline="30000" dirty="0" smtClean="0"/>
-              <a:t>2</a:t>
-            </a:r>
-            <a:r>
-              <a:rPr lang="en-US" sz="2400" dirty="0" smtClean="0"/>
-              <a:t>)</a:t>
-            </a:r>
-          </a:p>
-          <a:p>
-            <a:pPr marL="457200" indent="-457200">
-              <a:buFont typeface="+mj-lt"/>
-              <a:buAutoNum type="arabicPeriod"/>
-            </a:pPr>
-            <a:r>
-              <a:rPr lang="en-US" sz="2400" dirty="0" smtClean="0"/>
-              <a:t>Brood size</a:t>
-            </a:r>
-          </a:p>
-          <a:p>
-            <a:pPr marL="457200" indent="-457200">
-              <a:buFont typeface="+mj-lt"/>
-              <a:buAutoNum type="arabicPeriod"/>
-            </a:pPr>
-            <a:r>
-              <a:rPr lang="en-US" sz="2400" dirty="0" smtClean="0"/>
-              <a:t>Forest type (</a:t>
-            </a:r>
-            <a:r>
-              <a:rPr lang="en-US" sz="2400" i="1" dirty="0" smtClean="0"/>
-              <a:t>deciduous, mixed, coniferous</a:t>
-            </a:r>
-            <a:r>
-              <a:rPr lang="en-US" sz="2400" dirty="0" smtClean="0"/>
-              <a:t>)</a:t>
-            </a:r>
-          </a:p>
-          <a:p>
-            <a:pPr marL="457200" indent="-457200">
-              <a:buFont typeface="+mj-lt"/>
-              <a:buAutoNum type="arabicPeriod"/>
-            </a:pPr>
-            <a:r>
-              <a:rPr lang="en-US" sz="2400" dirty="0" smtClean="0"/>
-              <a:t>Number of docks (on a lake shoreline)</a:t>
-            </a:r>
-          </a:p>
-          <a:p>
-            <a:pPr marL="457200" indent="-457200">
-              <a:buFont typeface="+mj-lt"/>
-              <a:buAutoNum type="arabicPeriod"/>
-            </a:pPr>
-            <a:r>
-              <a:rPr lang="en-US" sz="2400" dirty="0" smtClean="0"/>
-              <a:t>Ecoregion (</a:t>
-            </a:r>
-            <a:r>
-              <a:rPr lang="en-US" sz="2400" i="1" dirty="0" smtClean="0"/>
-              <a:t>Northern Lakes &amp; Forests, North Central Hardwood Forests, </a:t>
-            </a:r>
-            <a:r>
-              <a:rPr lang="en-US" sz="2400" i="1" dirty="0" err="1" smtClean="0"/>
-              <a:t>Driftless</a:t>
-            </a:r>
-            <a:r>
-              <a:rPr lang="en-US" sz="2400" i="1" dirty="0" smtClean="0"/>
-              <a:t> Area, Southeastern Wisconsin Till Plains, Central Corn Belt Plains</a:t>
-            </a:r>
-            <a:r>
-              <a:rPr lang="en-US" sz="2400" dirty="0" smtClean="0"/>
-              <a:t>)</a:t>
-            </a:r>
-          </a:p>
-          <a:p>
-            <a:pPr marL="457200" indent="-457200">
-              <a:buFont typeface="+mj-lt"/>
-              <a:buAutoNum type="arabicPeriod"/>
-            </a:pPr>
-            <a:r>
-              <a:rPr lang="en-US" sz="2400" dirty="0" smtClean="0"/>
-              <a:t>Survived (</a:t>
-            </a:r>
-            <a:r>
-              <a:rPr lang="en-US" sz="2400" i="1" dirty="0" smtClean="0"/>
-              <a:t>yes, no</a:t>
-            </a:r>
-            <a:r>
-              <a:rPr lang="en-US" sz="2400" dirty="0" smtClean="0"/>
-              <a:t>)</a:t>
-            </a:r>
-          </a:p>
-          <a:p>
-            <a:pPr marL="457200" indent="-457200">
-              <a:buFont typeface="+mj-lt"/>
-              <a:buAutoNum type="arabicPeriod"/>
-            </a:pPr>
-            <a:r>
-              <a:rPr lang="en-US" sz="2400" dirty="0" smtClean="0"/>
-              <a:t>Age (</a:t>
-            </a:r>
-            <a:r>
-              <a:rPr lang="en-US" sz="2400" i="1" dirty="0" smtClean="0"/>
-              <a:t>years</a:t>
-            </a:r>
-            <a:r>
-              <a:rPr lang="en-US" sz="2400" dirty="0" smtClean="0"/>
-              <a:t>)</a:t>
-            </a:r>
-          </a:p>
-          <a:p>
-            <a:pPr marL="457200" indent="-457200">
-              <a:buFont typeface="+mj-lt"/>
-              <a:buAutoNum type="arabicPeriod"/>
-            </a:pPr>
-            <a:r>
-              <a:rPr lang="en-US" sz="2400" dirty="0" smtClean="0"/>
-              <a:t>Race</a:t>
-            </a:r>
-          </a:p>
-        </p:txBody>
-      </p:sp>
-      <p:sp>
-        <p:nvSpPr>
-          <p:cNvPr id="4" name="Footer Placeholder 3"/>
-          <p:cNvSpPr>
-            <a:spLocks noGrp="1"/>
-          </p:cNvSpPr>
-          <p:nvPr>
-            <p:ph type="ftr" sz="quarter" idx="10"/>
-          </p:nvPr>
-        </p:nvSpPr>
-        <p:spPr/>
-        <p:txBody>
-          <a:bodyPr/>
-          <a:lstStyle/>
-          <a:p>
-            <a:r>
-              <a:rPr lang="en-US" smtClean="0"/>
-              <a:t>LM Foundation</a:t>
-            </a:r>
-            <a:endParaRPr lang="en-US"/>
-          </a:p>
-        </p:txBody>
-      </p:sp>
-      <p:sp>
-        <p:nvSpPr>
-          <p:cNvPr id="5" name="Slide Number Placeholder 4"/>
-          <p:cNvSpPr>
-            <a:spLocks noGrp="1"/>
-          </p:cNvSpPr>
-          <p:nvPr>
-            <p:ph type="sldNum" sz="quarter" idx="11"/>
-          </p:nvPr>
-        </p:nvSpPr>
-        <p:spPr/>
-        <p:txBody>
-          <a:bodyPr/>
-          <a:lstStyle/>
-          <a:p>
-            <a:fld id="{2DF5461C-7FAD-4378-B074-D0FEBA4BBCD3}" type="slidenum">
-              <a:rPr lang="en-US" smtClean="0"/>
-              <a:pPr/>
-              <a:t>2</a:t>
-            </a:fld>
-            <a:endParaRPr lang="en-US"/>
-          </a:p>
-        </p:txBody>
-      </p:sp>
-    </p:spTree>
-    <p:extLst>
-      <p:ext uri="{BB962C8B-B14F-4D97-AF65-F5344CB8AC3E}">
-        <p14:creationId xmlns:p14="http://schemas.microsoft.com/office/powerpoint/2010/main" val="1878733255"/>
-      </p:ext>
-    </p:extLst>
-  </p:cSld>
-  <p:clrMapOvr>
-    <a:masterClrMapping/>
-  </p:clrMapOvr>
-  <p:timing>
-    <p:tnLst>
-      <p:par>
-        <p:cTn id="1" dur="indefinite" restart="never" nodeType="tmRoot"/>
-      </p:par>
-    </p:tnLst>
-  </p:timing>
-</p:sld>
-</file>
-
-<file path=ppt/slides/slide20.xml><?xml version="1.0" encoding="utf-8"?>
-<p:sld xmlns:a="http://schemas.openxmlformats.org/drawingml/2006/main" xmlns:r="http://schemas.openxmlformats.org/officeDocument/2006/relationships" xmlns:p="http://schemas.openxmlformats.org/presentationml/2006/main">
-  <p:cSld>
-    <p:spTree>
-      <p:nvGrpSpPr>
-        <p:cNvPr id="1" name=""/>
-        <p:cNvGrpSpPr/>
-        <p:nvPr/>
-      </p:nvGrpSpPr>
-      <p:grpSpPr>
-        <a:xfrm>
-          <a:off x="0" y="0"/>
-          <a:ext cx="0" cy="0"/>
-          <a:chOff x="0" y="0"/>
-          <a:chExt cx="0" cy="0"/>
-        </a:xfrm>
-      </p:grpSpPr>
-      <p:sp>
-        <p:nvSpPr>
           <p:cNvPr id="5" name="Footer Placeholder 3"/>
           <p:cNvSpPr>
             <a:spLocks noGrp="1"/>
@@ -9336,7 +9624,7 @@
             <a:fld id="{6D4E392F-33CE-4451-8767-C4BAE1EB71FE}" type="slidenum">
               <a:rPr lang="en-US"/>
               <a:pPr/>
-              <a:t>20</a:t>
+              <a:t>22</a:t>
             </a:fld>
             <a:endParaRPr lang="en-US"/>
           </a:p>
@@ -9970,7 +10258,7 @@
 </p:sld>
 </file>
 
-<file path=ppt/slides/slide21.xml><?xml version="1.0" encoding="utf-8"?>
+<file path=ppt/slides/slide23.xml><?xml version="1.0" encoding="utf-8"?>
 <p:sld xmlns:a="http://schemas.openxmlformats.org/drawingml/2006/main" xmlns:r="http://schemas.openxmlformats.org/officeDocument/2006/relationships" xmlns:p="http://schemas.openxmlformats.org/presentationml/2006/main">
   <p:cSld>
     <p:spTree>
@@ -10027,7 +10315,7 @@
             <a:fld id="{12EB9D16-29B1-4F7F-AA07-F203581A25AD}" type="slidenum">
               <a:rPr lang="en-US"/>
               <a:pPr/>
-              <a:t>21</a:t>
+              <a:t>23</a:t>
             </a:fld>
             <a:endParaRPr lang="en-US"/>
           </a:p>
@@ -10541,7 +10829,7 @@
 </p:sld>
 </file>
 
-<file path=ppt/slides/slide22.xml><?xml version="1.0" encoding="utf-8"?>
+<file path=ppt/slides/slide24.xml><?xml version="1.0" encoding="utf-8"?>
 <p:sld xmlns:a="http://schemas.openxmlformats.org/drawingml/2006/main" xmlns:r="http://schemas.openxmlformats.org/officeDocument/2006/relationships" xmlns:p="http://schemas.openxmlformats.org/presentationml/2006/main">
   <p:cSld>
     <p:spTree>
@@ -11137,7 +11425,7 @@
 </p:sld>
 </file>
 
-<file path=ppt/slides/slide23.xml><?xml version="1.0" encoding="utf-8"?>
+<file path=ppt/slides/slide25.xml><?xml version="1.0" encoding="utf-8"?>
 <p:sld xmlns:a="http://schemas.openxmlformats.org/drawingml/2006/main" xmlns:r="http://schemas.openxmlformats.org/officeDocument/2006/relationships" xmlns:p="http://schemas.openxmlformats.org/presentationml/2006/main">
   <p:cSld>
     <p:spTree>
@@ -11194,7 +11482,7 @@
             <a:fld id="{7A12174E-2EF4-4953-834D-C4B107D3AA58}" type="slidenum">
               <a:rPr lang="en-US"/>
               <a:pPr/>
-              <a:t>23</a:t>
+              <a:t>25</a:t>
             </a:fld>
             <a:endParaRPr lang="en-US"/>
           </a:p>
@@ -11607,7 +11895,7 @@
 </p:sld>
 </file>
 
-<file path=ppt/slides/slide24.xml><?xml version="1.0" encoding="utf-8"?>
+<file path=ppt/slides/slide26.xml><?xml version="1.0" encoding="utf-8"?>
 <p:sld xmlns:a="http://schemas.openxmlformats.org/drawingml/2006/main" xmlns:r="http://schemas.openxmlformats.org/officeDocument/2006/relationships" xmlns:p="http://schemas.openxmlformats.org/presentationml/2006/main">
   <p:cSld>
     <p:spTree>
@@ -11664,7 +11952,7 @@
             <a:fld id="{E52AC1AC-31F4-43AA-87D1-C177E97483AF}" type="slidenum">
               <a:rPr lang="en-US"/>
               <a:pPr/>
-              <a:t>24</a:t>
+              <a:t>26</a:t>
             </a:fld>
             <a:endParaRPr lang="en-US"/>
           </a:p>
@@ -12279,7 +12567,7 @@
 </p:sld>
 </file>
 
-<file path=ppt/slides/slide25.xml><?xml version="1.0" encoding="utf-8"?>
+<file path=ppt/slides/slide27.xml><?xml version="1.0" encoding="utf-8"?>
 <p:sld xmlns:a="http://schemas.openxmlformats.org/drawingml/2006/main" xmlns:r="http://schemas.openxmlformats.org/officeDocument/2006/relationships" xmlns:p="http://schemas.openxmlformats.org/presentationml/2006/main">
   <p:cSld>
     <p:spTree>
@@ -12336,7 +12624,7 @@
             <a:fld id="{7FFEE7CD-F77C-483C-BF05-EC7E8B8FD909}" type="slidenum">
               <a:rPr lang="en-US"/>
               <a:pPr/>
-              <a:t>25</a:t>
+              <a:t>27</a:t>
             </a:fld>
             <a:endParaRPr lang="en-US"/>
           </a:p>
@@ -12612,7 +12900,7 @@
 </p:sld>
 </file>
 
-<file path=ppt/slides/slide26.xml><?xml version="1.0" encoding="utf-8"?>
+<file path=ppt/slides/slide28.xml><?xml version="1.0" encoding="utf-8"?>
 <p:sld xmlns:a="http://schemas.openxmlformats.org/drawingml/2006/main" xmlns:r="http://schemas.openxmlformats.org/officeDocument/2006/relationships" xmlns:p="http://schemas.openxmlformats.org/presentationml/2006/main">
   <p:cSld>
     <p:spTree>
@@ -12669,7 +12957,7 @@
             <a:fld id="{94F38E73-BC61-4761-AD4E-0E8AD4EF18FB}" type="slidenum">
               <a:rPr lang="en-US"/>
               <a:pPr/>
-              <a:t>26</a:t>
+              <a:t>28</a:t>
             </a:fld>
             <a:endParaRPr lang="en-US"/>
           </a:p>
@@ -13174,7 +13462,7 @@
 </p:sld>
 </file>
 
-<file path=ppt/slides/slide27.xml><?xml version="1.0" encoding="utf-8"?>
+<file path=ppt/slides/slide29.xml><?xml version="1.0" encoding="utf-8"?>
 <p:sld xmlns:a="http://schemas.openxmlformats.org/drawingml/2006/main" xmlns:r="http://schemas.openxmlformats.org/officeDocument/2006/relationships" xmlns:p="http://schemas.openxmlformats.org/presentationml/2006/main">
   <p:cSld>
     <p:spTree>
@@ -13231,7 +13519,7 @@
             <a:fld id="{2CE40764-87BD-4F78-9E12-968AF57EE790}" type="slidenum">
               <a:rPr lang="en-US"/>
               <a:pPr/>
-              <a:t>27</a:t>
+              <a:t>29</a:t>
             </a:fld>
             <a:endParaRPr lang="en-US"/>
           </a:p>
@@ -13747,7 +14035,315 @@
 </p:sld>
 </file>
 
-<file path=ppt/slides/slide28.xml><?xml version="1.0" encoding="utf-8"?>
+<file path=ppt/slides/slide3.xml><?xml version="1.0" encoding="utf-8"?>
+<p:sld xmlns:a="http://schemas.openxmlformats.org/drawingml/2006/main" xmlns:r="http://schemas.openxmlformats.org/officeDocument/2006/relationships" xmlns:p="http://schemas.openxmlformats.org/presentationml/2006/main" show="0">
+  <p:cSld>
+    <p:spTree>
+      <p:nvGrpSpPr>
+        <p:cNvPr id="1" name=""/>
+        <p:cNvGrpSpPr/>
+        <p:nvPr/>
+      </p:nvGrpSpPr>
+      <p:grpSpPr>
+        <a:xfrm>
+          <a:off x="0" y="0"/>
+          <a:ext cx="0" cy="0"/>
+          <a:chOff x="0" y="0"/>
+          <a:chExt cx="0" cy="0"/>
+        </a:xfrm>
+      </p:grpSpPr>
+      <p:sp>
+        <p:nvSpPr>
+          <p:cNvPr id="2" name="Title 1"/>
+          <p:cNvSpPr>
+            <a:spLocks noGrp="1"/>
+          </p:cNvSpPr>
+          <p:nvPr>
+            <p:ph type="title"/>
+          </p:nvPr>
+        </p:nvSpPr>
+        <p:spPr/>
+        <p:txBody>
+          <a:bodyPr/>
+          <a:lstStyle/>
+          <a:p>
+            <a:r>
+              <a:rPr lang="en-US" dirty="0" smtClean="0"/>
+              <a:t>What Type of Variable?</a:t>
+            </a:r>
+            <a:endParaRPr lang="en-US" dirty="0"/>
+          </a:p>
+        </p:txBody>
+      </p:sp>
+      <p:sp>
+        <p:nvSpPr>
+          <p:cNvPr id="3" name="Content Placeholder 2"/>
+          <p:cNvSpPr>
+            <a:spLocks noGrp="1"/>
+          </p:cNvSpPr>
+          <p:nvPr>
+            <p:ph idx="1"/>
+          </p:nvPr>
+        </p:nvSpPr>
+        <p:spPr>
+          <a:xfrm>
+            <a:off x="457200" y="990600"/>
+            <a:ext cx="8229600" cy="5562600"/>
+          </a:xfrm>
+        </p:spPr>
+        <p:txBody>
+          <a:bodyPr/>
+          <a:lstStyle/>
+          <a:p>
+            <a:pPr marL="457200" indent="-457200">
+              <a:buFont typeface="+mj-lt"/>
+              <a:buAutoNum type="arabicPeriod"/>
+            </a:pPr>
+            <a:r>
+              <a:rPr lang="en-US" sz="2400" dirty="0" smtClean="0"/>
+              <a:t>Temperature (</a:t>
+            </a:r>
+            <a:r>
+              <a:rPr lang="en-US" sz="2400" i="1" baseline="30000" dirty="0" err="1" smtClean="0"/>
+              <a:t>o</a:t>
+            </a:r>
+            <a:r>
+              <a:rPr lang="en-US" sz="2400" i="1" dirty="0" err="1" smtClean="0"/>
+              <a:t>F</a:t>
+            </a:r>
+            <a:r>
+              <a:rPr lang="en-US" sz="2400" dirty="0" smtClean="0"/>
+              <a:t>)</a:t>
+            </a:r>
+          </a:p>
+          <a:p>
+            <a:pPr marL="457200" indent="-457200">
+              <a:buFont typeface="+mj-lt"/>
+              <a:buAutoNum type="arabicPeriod"/>
+            </a:pPr>
+            <a:r>
+              <a:rPr lang="en-US" sz="2400" dirty="0"/>
+              <a:t>Habitat complexity (</a:t>
+            </a:r>
+            <a:r>
+              <a:rPr lang="en-US" sz="2400" i="1" dirty="0"/>
+              <a:t>low, medium, high</a:t>
+            </a:r>
+            <a:r>
+              <a:rPr lang="en-US" sz="2400" dirty="0"/>
+              <a:t>)</a:t>
+            </a:r>
+          </a:p>
+          <a:p>
+            <a:pPr marL="457200" indent="-457200">
+              <a:buFont typeface="+mj-lt"/>
+              <a:buAutoNum type="arabicPeriod"/>
+            </a:pPr>
+            <a:r>
+              <a:rPr lang="en-US" sz="2400" dirty="0" smtClean="0"/>
+              <a:t>Home range size (</a:t>
+            </a:r>
+            <a:r>
+              <a:rPr lang="en-US" sz="2400" i="1" dirty="0" smtClean="0"/>
+              <a:t>m</a:t>
+            </a:r>
+            <a:r>
+              <a:rPr lang="en-US" sz="2400" i="1" baseline="30000" dirty="0" smtClean="0"/>
+              <a:t>2</a:t>
+            </a:r>
+            <a:r>
+              <a:rPr lang="en-US" sz="2400" dirty="0" smtClean="0"/>
+              <a:t>)</a:t>
+            </a:r>
+          </a:p>
+          <a:p>
+            <a:pPr marL="457200" indent="-457200">
+              <a:buFont typeface="+mj-lt"/>
+              <a:buAutoNum type="arabicPeriod"/>
+            </a:pPr>
+            <a:r>
+              <a:rPr lang="en-US" sz="2400" dirty="0" smtClean="0"/>
+              <a:t>Brood size</a:t>
+            </a:r>
+          </a:p>
+          <a:p>
+            <a:pPr marL="457200" indent="-457200">
+              <a:buFont typeface="+mj-lt"/>
+              <a:buAutoNum type="arabicPeriod"/>
+            </a:pPr>
+            <a:r>
+              <a:rPr lang="en-US" sz="2400" dirty="0" smtClean="0"/>
+              <a:t>Forest type (</a:t>
+            </a:r>
+            <a:r>
+              <a:rPr lang="en-US" sz="2400" i="1" dirty="0" smtClean="0"/>
+              <a:t>deciduous, mixed, coniferous</a:t>
+            </a:r>
+            <a:r>
+              <a:rPr lang="en-US" sz="2400" dirty="0" smtClean="0"/>
+              <a:t>)</a:t>
+            </a:r>
+          </a:p>
+          <a:p>
+            <a:pPr marL="457200" indent="-457200">
+              <a:buFont typeface="+mj-lt"/>
+              <a:buAutoNum type="arabicPeriod"/>
+            </a:pPr>
+            <a:r>
+              <a:rPr lang="en-US" sz="2400" dirty="0" smtClean="0"/>
+              <a:t>Number of docks (on a lake shoreline)</a:t>
+            </a:r>
+          </a:p>
+          <a:p>
+            <a:pPr marL="457200" indent="-457200">
+              <a:buFont typeface="+mj-lt"/>
+              <a:buAutoNum type="arabicPeriod"/>
+            </a:pPr>
+            <a:r>
+              <a:rPr lang="en-US" sz="2400" dirty="0" smtClean="0"/>
+              <a:t>Ecoregion (</a:t>
+            </a:r>
+            <a:r>
+              <a:rPr lang="en-US" sz="2400" i="1" dirty="0" smtClean="0"/>
+              <a:t>Northern Lakes &amp; Forests, North Central Hardwood Forests, </a:t>
+            </a:r>
+            <a:r>
+              <a:rPr lang="en-US" sz="2400" i="1" dirty="0" err="1" smtClean="0"/>
+              <a:t>Driftless</a:t>
+            </a:r>
+            <a:r>
+              <a:rPr lang="en-US" sz="2400" i="1" dirty="0" smtClean="0"/>
+              <a:t> Area, Southeastern Wisconsin Till Plains, Central Corn Belt Plains</a:t>
+            </a:r>
+            <a:r>
+              <a:rPr lang="en-US" sz="2400" dirty="0" smtClean="0"/>
+              <a:t>)</a:t>
+            </a:r>
+          </a:p>
+          <a:p>
+            <a:pPr marL="457200" indent="-457200">
+              <a:buFont typeface="+mj-lt"/>
+              <a:buAutoNum type="arabicPeriod"/>
+            </a:pPr>
+            <a:r>
+              <a:rPr lang="en-US" sz="2400" dirty="0" smtClean="0"/>
+              <a:t>Survived (</a:t>
+            </a:r>
+            <a:r>
+              <a:rPr lang="en-US" sz="2400" i="1" dirty="0" smtClean="0"/>
+              <a:t>yes, no</a:t>
+            </a:r>
+            <a:r>
+              <a:rPr lang="en-US" sz="2400" dirty="0" smtClean="0"/>
+              <a:t>)</a:t>
+            </a:r>
+          </a:p>
+          <a:p>
+            <a:pPr marL="457200" indent="-457200">
+              <a:buFont typeface="+mj-lt"/>
+              <a:buAutoNum type="arabicPeriod"/>
+            </a:pPr>
+            <a:r>
+              <a:rPr lang="en-US" sz="2400" dirty="0" smtClean="0"/>
+              <a:t>Age (</a:t>
+            </a:r>
+            <a:r>
+              <a:rPr lang="en-US" sz="2400" i="1" dirty="0" smtClean="0"/>
+              <a:t>years</a:t>
+            </a:r>
+            <a:r>
+              <a:rPr lang="en-US" sz="2400" dirty="0" smtClean="0"/>
+              <a:t>)</a:t>
+            </a:r>
+          </a:p>
+          <a:p>
+            <a:pPr marL="457200" indent="-457200">
+              <a:buFont typeface="+mj-lt"/>
+              <a:buAutoNum type="arabicPeriod"/>
+            </a:pPr>
+            <a:r>
+              <a:rPr lang="en-US" sz="2400" dirty="0" smtClean="0"/>
+              <a:t>Race</a:t>
+            </a:r>
+          </a:p>
+        </p:txBody>
+      </p:sp>
+      <p:sp>
+        <p:nvSpPr>
+          <p:cNvPr id="4" name="Footer Placeholder 3"/>
+          <p:cNvSpPr>
+            <a:spLocks noGrp="1"/>
+          </p:cNvSpPr>
+          <p:nvPr>
+            <p:ph type="ftr" sz="quarter" idx="10"/>
+          </p:nvPr>
+        </p:nvSpPr>
+        <p:spPr/>
+        <p:txBody>
+          <a:bodyPr/>
+          <a:lstStyle/>
+          <a:p>
+            <a:r>
+              <a:rPr lang="en-US" smtClean="0"/>
+              <a:t>LM Foundation</a:t>
+            </a:r>
+            <a:endParaRPr lang="en-US"/>
+          </a:p>
+        </p:txBody>
+      </p:sp>
+      <p:sp>
+        <p:nvSpPr>
+          <p:cNvPr id="5" name="Slide Number Placeholder 4"/>
+          <p:cNvSpPr>
+            <a:spLocks noGrp="1"/>
+          </p:cNvSpPr>
+          <p:nvPr>
+            <p:ph type="sldNum" sz="quarter" idx="11"/>
+          </p:nvPr>
+        </p:nvSpPr>
+        <p:spPr/>
+        <p:txBody>
+          <a:bodyPr/>
+          <a:lstStyle/>
+          <a:p>
+            <a:fld id="{2DF5461C-7FAD-4378-B074-D0FEBA4BBCD3}" type="slidenum">
+              <a:rPr lang="en-US" smtClean="0"/>
+              <a:pPr/>
+              <a:t>3</a:t>
+            </a:fld>
+            <a:endParaRPr lang="en-US"/>
+          </a:p>
+        </p:txBody>
+      </p:sp>
+    </p:spTree>
+    <p:extLst>
+      <p:ext uri="{BB962C8B-B14F-4D97-AF65-F5344CB8AC3E}">
+        <p14:creationId xmlns:p14="http://schemas.microsoft.com/office/powerpoint/2010/main" val="1878733255"/>
+      </p:ext>
+    </p:extLst>
+  </p:cSld>
+  <p:clrMapOvr>
+    <a:masterClrMapping/>
+  </p:clrMapOvr>
+  <mc:AlternateContent xmlns:mc="http://schemas.openxmlformats.org/markup-compatibility/2006">
+    <mc:Choice xmlns:p14="http://schemas.microsoft.com/office/powerpoint/2010/main" Requires="p14">
+      <p:transition spd="slow" p14:dur="2000"/>
+    </mc:Choice>
+    <mc:Fallback>
+      <p:transition spd="slow"/>
+    </mc:Fallback>
+  </mc:AlternateContent>
+  <p:timing>
+    <p:tnLst>
+      <p:par>
+        <p:cTn id="1" dur="indefinite" restart="never" nodeType="tmRoot"/>
+      </p:par>
+    </p:tnLst>
+  </p:timing>
+</p:sld>
+</file>
+
+<file path=ppt/slides/slide30.xml><?xml version="1.0" encoding="utf-8"?>
 <p:sld xmlns:a="http://schemas.openxmlformats.org/drawingml/2006/main" xmlns:r="http://schemas.openxmlformats.org/officeDocument/2006/relationships" xmlns:p="http://schemas.openxmlformats.org/presentationml/2006/main">
   <p:cSld>
     <p:spTree>
@@ -13804,7 +14400,7 @@
             <a:fld id="{DD9CC574-88AD-40FA-8ED6-F551EFB4A3C3}" type="slidenum">
               <a:rPr lang="en-US"/>
               <a:pPr/>
-              <a:t>28</a:t>
+              <a:t>30</a:t>
             </a:fld>
             <a:endParaRPr lang="en-US"/>
           </a:p>
@@ -13958,7 +14554,7 @@
           <a:graphicData uri="http://schemas.openxmlformats.org/presentationml/2006/ole">
             <mc:AlternateContent xmlns:mc="http://schemas.openxmlformats.org/markup-compatibility/2006">
               <mc:Choice xmlns:v="urn:schemas-microsoft-com:vml" Requires="v">
-                <p:oleObj spid="_x0000_s186404" name="Equation" r:id="rId3" imgW="571320" imgH="393480" progId="Equation.3">
+                <p:oleObj spid="_x0000_s186405" name="Equation" r:id="rId3" imgW="571320" imgH="393480" progId="Equation.3">
                   <p:embed/>
                 </p:oleObj>
               </mc:Choice>
@@ -14286,7 +14882,7 @@
 </p:sld>
 </file>
 
-<file path=ppt/slides/slide29.xml><?xml version="1.0" encoding="utf-8"?>
+<file path=ppt/slides/slide31.xml><?xml version="1.0" encoding="utf-8"?>
 <p:sld xmlns:a="http://schemas.openxmlformats.org/drawingml/2006/main" xmlns:r="http://schemas.openxmlformats.org/officeDocument/2006/relationships" xmlns:p="http://schemas.openxmlformats.org/presentationml/2006/main">
   <p:cSld>
     <p:spTree>
@@ -14343,7 +14939,7 @@
             <a:fld id="{7DA78E91-CD95-4792-B7BC-F8EBCD42464E}" type="slidenum">
               <a:rPr lang="en-US"/>
               <a:pPr/>
-              <a:t>29</a:t>
+              <a:t>31</a:t>
             </a:fld>
             <a:endParaRPr lang="en-US"/>
           </a:p>
@@ -14529,7 +15125,7 @@
           <a:graphicData uri="http://schemas.openxmlformats.org/presentationml/2006/ole">
             <mc:AlternateContent xmlns:mc="http://schemas.openxmlformats.org/markup-compatibility/2006">
               <mc:Choice xmlns:v="urn:schemas-microsoft-com:vml" Requires="v">
-                <p:oleObj spid="_x0000_s190492" name="Equation" r:id="rId4" imgW="838080" imgH="444240" progId="Equation.3">
+                <p:oleObj spid="_x0000_s190493" name="Equation" r:id="rId4" imgW="838080" imgH="444240" progId="Equation.3">
                   <p:embed/>
                 </p:oleObj>
               </mc:Choice>
@@ -14798,7 +15394,7 @@
 </p:sld>
 </file>
 
-<file path=ppt/slides/slide3.xml><?xml version="1.0" encoding="utf-8"?>
+<file path=ppt/slides/slide32.xml><?xml version="1.0" encoding="utf-8"?>
 <p:sld xmlns:a="http://schemas.openxmlformats.org/drawingml/2006/main" xmlns:r="http://schemas.openxmlformats.org/officeDocument/2006/relationships" xmlns:p="http://schemas.openxmlformats.org/presentationml/2006/main">
   <p:cSld>
     <p:spTree>
@@ -14817,22 +15413,31 @@
       </p:grpSpPr>
       <p:sp>
         <p:nvSpPr>
-          <p:cNvPr id="2" name="Title 1"/>
+          <p:cNvPr id="188418" name="Rectangle 2"/>
           <p:cNvSpPr>
-            <a:spLocks noGrp="1"/>
+            <a:spLocks noGrp="1" noChangeArrowheads="1"/>
           </p:cNvSpPr>
           <p:nvPr>
             <p:ph type="title"/>
           </p:nvPr>
         </p:nvSpPr>
-        <p:spPr/>
+        <p:spPr>
+          <a:xfrm>
+            <a:off x="65088" y="274638"/>
+            <a:ext cx="9012237" cy="868362"/>
+          </a:xfrm>
+        </p:spPr>
         <p:txBody>
           <a:bodyPr/>
           <a:lstStyle/>
           <a:p>
             <a:r>
+              <a:rPr lang="en-US" dirty="0"/>
+              <a:t>Fit vs. Complexity </a:t>
+            </a:r>
+            <a:r>
               <a:rPr lang="en-US" dirty="0" smtClean="0"/>
-              <a:t>Which is the response variable?</a:t>
+              <a:t>– p-value</a:t>
             </a:r>
             <a:endParaRPr lang="en-US" dirty="0"/>
           </a:p>
@@ -14840,9 +15445,9 @@
       </p:sp>
       <p:sp>
         <p:nvSpPr>
-          <p:cNvPr id="3" name="Content Placeholder 2"/>
+          <p:cNvPr id="188419" name="Rectangle 3"/>
           <p:cNvSpPr>
-            <a:spLocks noGrp="1"/>
+            <a:spLocks noGrp="1" noChangeArrowheads="1"/>
           </p:cNvSpPr>
           <p:nvPr>
             <p:ph idx="1"/>
@@ -14850,103 +15455,133 @@
         </p:nvSpPr>
         <p:spPr>
           <a:xfrm>
-            <a:off x="457200" y="1143000"/>
-            <a:ext cx="8534400" cy="4724400"/>
+            <a:off x="0" y="1295400"/>
+            <a:ext cx="4800600" cy="4953000"/>
           </a:xfrm>
         </p:spPr>
         <p:txBody>
           <a:bodyPr/>
           <a:lstStyle/>
           <a:p>
-            <a:pPr marL="457200" indent="-457200">
+            <a:pPr>
               <a:spcAft>
                 <a:spcPts val="600"/>
               </a:spcAft>
-              <a:buFont typeface="+mj-lt"/>
-              <a:buAutoNum type="arabicPeriod"/>
             </a:pPr>
             <a:r>
-              <a:rPr lang="en-US" sz="2400" dirty="0" smtClean="0"/>
-              <a:t>Can length be used to predict weight?</a:t>
-            </a:r>
-          </a:p>
-          <a:p>
-            <a:pPr marL="457200" indent="-457200">
+              <a:rPr lang="en-US" dirty="0" smtClean="0"/>
+              <a:t>Large p-value?</a:t>
+            </a:r>
+          </a:p>
+          <a:p>
+            <a:pPr>
               <a:spcAft>
                 <a:spcPts val="600"/>
               </a:spcAft>
-              <a:buFont typeface="+mj-lt"/>
-              <a:buAutoNum type="arabicPeriod"/>
             </a:pPr>
             <a:r>
-              <a:rPr lang="en-US" sz="2400" dirty="0" smtClean="0"/>
-              <a:t>How is weight affected by typical daily ration?</a:t>
-            </a:r>
-          </a:p>
-          <a:p>
-            <a:pPr marL="457200" indent="-457200">
+              <a:rPr lang="en-US" dirty="0"/>
+              <a:t>S</a:t>
+            </a:r>
+            <a:r>
+              <a:rPr lang="en-US" dirty="0" smtClean="0"/>
+              <a:t>mall F</a:t>
+            </a:r>
+          </a:p>
+          <a:p>
+            <a:pPr>
               <a:spcAft>
                 <a:spcPts val="600"/>
               </a:spcAft>
-              <a:buFont typeface="+mj-lt"/>
-              <a:buAutoNum type="arabicPeriod"/>
             </a:pPr>
             <a:r>
-              <a:rPr lang="en-US" sz="2400" dirty="0" smtClean="0"/>
-              <a:t>Does metabolic rate differ by sex of rabbit?</a:t>
-            </a:r>
-          </a:p>
-          <a:p>
-            <a:pPr marL="457200" indent="-457200">
+              <a:rPr lang="en-US" dirty="0" smtClean="0"/>
+              <a:t>Small </a:t>
+            </a:r>
+            <a:r>
+              <a:rPr lang="en-US" dirty="0" err="1"/>
+              <a:t>MS</a:t>
+            </a:r>
+            <a:r>
+              <a:rPr lang="en-US" baseline="-25000" dirty="0" err="1"/>
+              <a:t>Among</a:t>
+            </a:r>
+            <a:r>
+              <a:rPr lang="en-US" dirty="0"/>
+              <a:t> relative to </a:t>
+            </a:r>
+            <a:r>
+              <a:rPr lang="en-US" dirty="0" err="1" smtClean="0"/>
+              <a:t>MS</a:t>
+            </a:r>
+            <a:r>
+              <a:rPr lang="en-US" baseline="-25000" dirty="0" err="1" smtClean="0"/>
+              <a:t>Within</a:t>
+            </a:r>
+            <a:endParaRPr lang="en-US" baseline="-25000" dirty="0" smtClean="0"/>
+          </a:p>
+          <a:p>
+            <a:pPr>
               <a:spcAft>
                 <a:spcPts val="600"/>
               </a:spcAft>
-              <a:buFont typeface="+mj-lt"/>
-              <a:buAutoNum type="arabicPeriod"/>
             </a:pPr>
             <a:r>
-              <a:rPr lang="en-US" sz="2400" dirty="0" smtClean="0"/>
-              <a:t>Is gas mileages significantly affected by weight of the car?</a:t>
-            </a:r>
-          </a:p>
-          <a:p>
-            <a:pPr marL="457200" indent="-457200">
+              <a:rPr lang="en-US" dirty="0" smtClean="0"/>
+              <a:t>Small </a:t>
+            </a:r>
+            <a:r>
+              <a:rPr lang="en-US" dirty="0" err="1" smtClean="0"/>
+              <a:t>SS</a:t>
+            </a:r>
+            <a:r>
+              <a:rPr lang="en-US" baseline="-25000" dirty="0" err="1" smtClean="0"/>
+              <a:t>Among</a:t>
+            </a:r>
+            <a:endParaRPr lang="en-US" dirty="0"/>
+          </a:p>
+          <a:p>
+            <a:pPr>
               <a:spcAft>
                 <a:spcPts val="600"/>
               </a:spcAft>
-              <a:buFont typeface="+mj-lt"/>
-              <a:buAutoNum type="arabicPeriod"/>
             </a:pPr>
             <a:r>
-              <a:rPr lang="en-US" sz="2400" dirty="0" smtClean="0"/>
-              <a:t>Is there a relationship between how much money a person makes and their satisfaction with deer harvest regulations?</a:t>
-            </a:r>
-          </a:p>
-          <a:p>
-            <a:pPr marL="457200" indent="-457200">
+              <a:rPr lang="en-US" dirty="0" smtClean="0"/>
+              <a:t>Full </a:t>
+            </a:r>
+            <a:r>
+              <a:rPr lang="en-US" dirty="0"/>
+              <a:t>model </a:t>
+            </a:r>
+            <a:r>
+              <a:rPr lang="en-US" dirty="0" smtClean="0"/>
+              <a:t>not </a:t>
+            </a:r>
+            <a:r>
+              <a:rPr lang="en-US" dirty="0"/>
+              <a:t>“</a:t>
+            </a:r>
+            <a:r>
+              <a:rPr lang="en-US" dirty="0" smtClean="0"/>
+              <a:t>better”</a:t>
+            </a:r>
+          </a:p>
+          <a:p>
+            <a:pPr>
               <a:spcAft>
                 <a:spcPts val="600"/>
               </a:spcAft>
-              <a:buFont typeface="+mj-lt"/>
-              <a:buAutoNum type="arabicPeriod"/>
             </a:pPr>
             <a:r>
-              <a:rPr lang="en-US" sz="2400" dirty="0" smtClean="0"/>
-              <a:t>How is the uptake of heavy metals affected by the sex and age (young, middle, old) of the individual?</a:t>
-            </a:r>
-          </a:p>
-          <a:p>
-            <a:pPr marL="457200" indent="-457200">
-              <a:spcAft>
-                <a:spcPts val="600"/>
-              </a:spcAft>
-              <a:buFont typeface="+mj-lt"/>
-              <a:buAutoNum type="arabicPeriod"/>
-            </a:pPr>
-            <a:r>
-              <a:rPr lang="en-US" sz="2400" dirty="0" smtClean="0"/>
-              <a:t>Is there a relationship between how much money a person makes and how much they weigh?</a:t>
-            </a:r>
+              <a:rPr lang="en-US" dirty="0"/>
+              <a:t>G</a:t>
+            </a:r>
+            <a:r>
+              <a:rPr lang="en-US" dirty="0" smtClean="0"/>
+              <a:t>roup means do not differ</a:t>
+            </a:r>
+            <a:endParaRPr lang="en-US" dirty="0"/>
           </a:p>
         </p:txBody>
       </p:sp>
@@ -14966,10 +15601,9 @@
           <a:lstStyle/>
           <a:p>
             <a:r>
-              <a:rPr lang="en-US" smtClean="0"/>
+              <a:rPr lang="en-US"/>
               <a:t>LM Foundation</a:t>
             </a:r>
-            <a:endParaRPr lang="en-US"/>
           </a:p>
         </p:txBody>
       </p:sp>
@@ -14988,267 +15622,10 @@
           <a:bodyPr/>
           <a:lstStyle/>
           <a:p>
-            <a:fld id="{2DF5461C-7FAD-4378-B074-D0FEBA4BBCD3}" type="slidenum">
-              <a:rPr lang="en-US" smtClean="0"/>
-              <a:pPr/>
-              <a:t>3</a:t>
-            </a:fld>
-            <a:endParaRPr lang="en-US"/>
-          </a:p>
-        </p:txBody>
-      </p:sp>
-    </p:spTree>
-    <p:extLst>
-      <p:ext uri="{BB962C8B-B14F-4D97-AF65-F5344CB8AC3E}">
-        <p14:creationId xmlns:p14="http://schemas.microsoft.com/office/powerpoint/2010/main" val="2745146503"/>
-      </p:ext>
-    </p:extLst>
-  </p:cSld>
-  <p:clrMapOvr>
-    <a:masterClrMapping/>
-  </p:clrMapOvr>
-  <p:timing>
-    <p:tnLst>
-      <p:par>
-        <p:cTn id="1" dur="indefinite" restart="never" nodeType="tmRoot"/>
-      </p:par>
-    </p:tnLst>
-  </p:timing>
-</p:sld>
-</file>
-
-<file path=ppt/slides/slide30.xml><?xml version="1.0" encoding="utf-8"?>
-<p:sld xmlns:a="http://schemas.openxmlformats.org/drawingml/2006/main" xmlns:r="http://schemas.openxmlformats.org/officeDocument/2006/relationships" xmlns:p="http://schemas.openxmlformats.org/presentationml/2006/main">
-  <p:cSld>
-    <p:spTree>
-      <p:nvGrpSpPr>
-        <p:cNvPr id="1" name=""/>
-        <p:cNvGrpSpPr/>
-        <p:nvPr/>
-      </p:nvGrpSpPr>
-      <p:grpSpPr>
-        <a:xfrm>
-          <a:off x="0" y="0"/>
-          <a:ext cx="0" cy="0"/>
-          <a:chOff x="0" y="0"/>
-          <a:chExt cx="0" cy="0"/>
-        </a:xfrm>
-      </p:grpSpPr>
-      <p:sp>
-        <p:nvSpPr>
-          <p:cNvPr id="188418" name="Rectangle 2"/>
-          <p:cNvSpPr>
-            <a:spLocks noGrp="1" noChangeArrowheads="1"/>
-          </p:cNvSpPr>
-          <p:nvPr>
-            <p:ph type="title"/>
-          </p:nvPr>
-        </p:nvSpPr>
-        <p:spPr>
-          <a:xfrm>
-            <a:off x="65088" y="274638"/>
-            <a:ext cx="9012237" cy="868362"/>
-          </a:xfrm>
-        </p:spPr>
-        <p:txBody>
-          <a:bodyPr/>
-          <a:lstStyle/>
-          <a:p>
-            <a:r>
-              <a:rPr lang="en-US" dirty="0"/>
-              <a:t>Fit vs. Complexity </a:t>
-            </a:r>
-            <a:r>
-              <a:rPr lang="en-US" dirty="0" smtClean="0"/>
-              <a:t>– p-value</a:t>
-            </a:r>
-            <a:endParaRPr lang="en-US" dirty="0"/>
-          </a:p>
-        </p:txBody>
-      </p:sp>
-      <p:sp>
-        <p:nvSpPr>
-          <p:cNvPr id="188419" name="Rectangle 3"/>
-          <p:cNvSpPr>
-            <a:spLocks noGrp="1" noChangeArrowheads="1"/>
-          </p:cNvSpPr>
-          <p:nvPr>
-            <p:ph idx="1"/>
-          </p:nvPr>
-        </p:nvSpPr>
-        <p:spPr>
-          <a:xfrm>
-            <a:off x="0" y="1295400"/>
-            <a:ext cx="4800600" cy="4953000"/>
-          </a:xfrm>
-        </p:spPr>
-        <p:txBody>
-          <a:bodyPr/>
-          <a:lstStyle/>
-          <a:p>
-            <a:pPr>
-              <a:spcAft>
-                <a:spcPts val="600"/>
-              </a:spcAft>
-            </a:pPr>
-            <a:r>
-              <a:rPr lang="en-US" dirty="0" smtClean="0"/>
-              <a:t>Large p-value?</a:t>
-            </a:r>
-          </a:p>
-          <a:p>
-            <a:pPr>
-              <a:spcAft>
-                <a:spcPts val="600"/>
-              </a:spcAft>
-            </a:pPr>
-            <a:r>
-              <a:rPr lang="en-US" dirty="0"/>
-              <a:t>S</a:t>
-            </a:r>
-            <a:r>
-              <a:rPr lang="en-US" dirty="0" smtClean="0"/>
-              <a:t>mall F</a:t>
-            </a:r>
-          </a:p>
-          <a:p>
-            <a:pPr>
-              <a:spcAft>
-                <a:spcPts val="600"/>
-              </a:spcAft>
-            </a:pPr>
-            <a:r>
-              <a:rPr lang="en-US" dirty="0" smtClean="0"/>
-              <a:t>Small </a:t>
-            </a:r>
-            <a:r>
-              <a:rPr lang="en-US" dirty="0" err="1"/>
-              <a:t>MS</a:t>
-            </a:r>
-            <a:r>
-              <a:rPr lang="en-US" baseline="-25000" dirty="0" err="1"/>
-              <a:t>Among</a:t>
-            </a:r>
-            <a:r>
-              <a:rPr lang="en-US" dirty="0"/>
-              <a:t> relative to </a:t>
-            </a:r>
-            <a:r>
-              <a:rPr lang="en-US" dirty="0" err="1" smtClean="0"/>
-              <a:t>MS</a:t>
-            </a:r>
-            <a:r>
-              <a:rPr lang="en-US" baseline="-25000" dirty="0" err="1" smtClean="0"/>
-              <a:t>Within</a:t>
-            </a:r>
-            <a:endParaRPr lang="en-US" baseline="-25000" dirty="0" smtClean="0"/>
-          </a:p>
-          <a:p>
-            <a:pPr>
-              <a:spcAft>
-                <a:spcPts val="600"/>
-              </a:spcAft>
-            </a:pPr>
-            <a:r>
-              <a:rPr lang="en-US" dirty="0" smtClean="0"/>
-              <a:t>Small </a:t>
-            </a:r>
-            <a:r>
-              <a:rPr lang="en-US" dirty="0" err="1" smtClean="0"/>
-              <a:t>SS</a:t>
-            </a:r>
-            <a:r>
-              <a:rPr lang="en-US" baseline="-25000" dirty="0" err="1" smtClean="0"/>
-              <a:t>Among</a:t>
-            </a:r>
-            <a:endParaRPr lang="en-US" dirty="0"/>
-          </a:p>
-          <a:p>
-            <a:pPr>
-              <a:spcAft>
-                <a:spcPts val="600"/>
-              </a:spcAft>
-            </a:pPr>
-            <a:r>
-              <a:rPr lang="en-US" dirty="0" smtClean="0"/>
-              <a:t>Full </a:t>
-            </a:r>
-            <a:r>
-              <a:rPr lang="en-US" dirty="0"/>
-              <a:t>model </a:t>
-            </a:r>
-            <a:r>
-              <a:rPr lang="en-US" dirty="0" smtClean="0"/>
-              <a:t>not </a:t>
-            </a:r>
-            <a:r>
-              <a:rPr lang="en-US" dirty="0"/>
-              <a:t>“</a:t>
-            </a:r>
-            <a:r>
-              <a:rPr lang="en-US" dirty="0" smtClean="0"/>
-              <a:t>better”</a:t>
-            </a:r>
-          </a:p>
-          <a:p>
-            <a:pPr>
-              <a:spcAft>
-                <a:spcPts val="600"/>
-              </a:spcAft>
-            </a:pPr>
-            <a:r>
-              <a:rPr lang="en-US" dirty="0"/>
-              <a:t>G</a:t>
-            </a:r>
-            <a:r>
-              <a:rPr lang="en-US" dirty="0" smtClean="0"/>
-              <a:t>roup means do not differ</a:t>
-            </a:r>
-            <a:endParaRPr lang="en-US" dirty="0"/>
-          </a:p>
-        </p:txBody>
-      </p:sp>
-      <p:sp>
-        <p:nvSpPr>
-          <p:cNvPr id="4" name="Footer Placeholder 3"/>
-          <p:cNvSpPr>
-            <a:spLocks noGrp="1"/>
-          </p:cNvSpPr>
-          <p:nvPr>
-            <p:ph type="ftr" sz="quarter" idx="10"/>
-          </p:nvPr>
-        </p:nvSpPr>
-        <p:spPr/>
-        <p:txBody>
-          <a:bodyPr/>
-          <a:lstStyle/>
-          <a:p>
-            <a:r>
-              <a:rPr lang="en-US"/>
-              <a:t>LM Foundation</a:t>
-            </a:r>
-          </a:p>
-        </p:txBody>
-      </p:sp>
-      <p:sp>
-        <p:nvSpPr>
-          <p:cNvPr id="5" name="Slide Number Placeholder 4"/>
-          <p:cNvSpPr>
-            <a:spLocks noGrp="1"/>
-          </p:cNvSpPr>
-          <p:nvPr>
-            <p:ph type="sldNum" sz="quarter" idx="11"/>
-          </p:nvPr>
-        </p:nvSpPr>
-        <p:spPr/>
-        <p:txBody>
-          <a:bodyPr/>
-          <a:lstStyle/>
-          <a:p>
             <a:fld id="{86C321A5-D51C-4DBE-9513-3F40B97FB75D}" type="slidenum">
               <a:rPr lang="en-US"/>
               <a:pPr/>
-              <a:t>30</a:t>
+              <a:t>32</a:t>
             </a:fld>
             <a:endParaRPr lang="en-US"/>
           </a:p>
@@ -15309,7 +15686,7 @@
           <a:graphicData uri="http://schemas.openxmlformats.org/presentationml/2006/ole">
             <mc:AlternateContent xmlns:mc="http://schemas.openxmlformats.org/markup-compatibility/2006">
               <mc:Choice xmlns:v="urn:schemas-microsoft-com:vml" Requires="v">
-                <p:oleObj spid="_x0000_s189502" name="Equation" r:id="rId4" imgW="838080" imgH="444240" progId="Equation.3">
+                <p:oleObj spid="_x0000_s189504" name="Equation" r:id="rId4" imgW="838080" imgH="444240" progId="Equation.3">
                   <p:embed/>
                 </p:oleObj>
               </mc:Choice>
@@ -15425,7 +15802,7 @@
           <a:graphicData uri="http://schemas.openxmlformats.org/presentationml/2006/ole">
             <mc:AlternateContent xmlns:mc="http://schemas.openxmlformats.org/markup-compatibility/2006">
               <mc:Choice xmlns:v="urn:schemas-microsoft-com:vml" Requires="v">
-                <p:oleObj spid="_x0000_s189503" name="Equation" r:id="rId7" imgW="1168200" imgH="457200" progId="Equation.3">
+                <p:oleObj spid="_x0000_s189505" name="Equation" r:id="rId7" imgW="1168200" imgH="457200" progId="Equation.3">
                   <p:embed/>
                 </p:oleObj>
               </mc:Choice>
@@ -16059,7 +16436,7 @@
 </p:sld>
 </file>
 
-<file path=ppt/slides/slide31.xml><?xml version="1.0" encoding="utf-8"?>
+<file path=ppt/slides/slide33.xml><?xml version="1.0" encoding="utf-8"?>
 <p:sld xmlns:a="http://schemas.openxmlformats.org/drawingml/2006/main" xmlns:r="http://schemas.openxmlformats.org/officeDocument/2006/relationships" xmlns:p="http://schemas.openxmlformats.org/presentationml/2006/main">
   <p:cSld>
     <p:spTree>
@@ -16282,7 +16659,7 @@
             <a:fld id="{86C321A5-D51C-4DBE-9513-3F40B97FB75D}" type="slidenum">
               <a:rPr lang="en-US"/>
               <a:pPr/>
-              <a:t>31</a:t>
+              <a:t>33</a:t>
             </a:fld>
             <a:endParaRPr lang="en-US"/>
           </a:p>
@@ -16852,7 +17229,7 @@
 </p:sld>
 </file>
 
-<file path=ppt/slides/slide32.xml><?xml version="1.0" encoding="utf-8"?>
+<file path=ppt/slides/slide34.xml><?xml version="1.0" encoding="utf-8"?>
 <p:sld xmlns:a="http://schemas.openxmlformats.org/drawingml/2006/main" xmlns:r="http://schemas.openxmlformats.org/officeDocument/2006/relationships" xmlns:p="http://schemas.openxmlformats.org/presentationml/2006/main">
   <p:cSld>
     <p:spTree>
@@ -16909,7 +17286,7 @@
             <a:fld id="{56D5F94E-8960-465E-B857-832C70378C5A}" type="slidenum">
               <a:rPr lang="en-US"/>
               <a:pPr/>
-              <a:t>32</a:t>
+              <a:t>34</a:t>
             </a:fld>
             <a:endParaRPr lang="en-US"/>
           </a:p>
@@ -16990,7 +17367,20 @@
                 <a:latin typeface="Courier New" pitchFamily="49" charset="0"/>
                 <a:cs typeface="Courier New" pitchFamily="49" charset="0"/>
               </a:rPr>
-              <a:t>summary</a:t>
+              <a:t>summary()</a:t>
+            </a:r>
+          </a:p>
+          <a:p>
+            <a:pPr lvl="1"/>
+            <a:r>
+              <a:rPr lang="en-US" b="1" smtClean="0">
+                <a:solidFill>
+                  <a:srgbClr val="FF0000"/>
+                </a:solidFill>
+                <a:latin typeface="Courier New" pitchFamily="49" charset="0"/>
+                <a:cs typeface="Courier New" pitchFamily="49" charset="0"/>
+              </a:rPr>
+              <a:t>coef</a:t>
             </a:r>
             <a:r>
               <a:rPr lang="en-US" b="1" dirty="0" smtClean="0">
@@ -17002,36 +17392,6 @@
               </a:rPr>
               <a:t>()</a:t>
             </a:r>
-          </a:p>
-          <a:p>
-            <a:pPr lvl="1"/>
-            <a:r>
-              <a:rPr lang="en-US" b="1" smtClean="0">
-                <a:solidFill>
-                  <a:srgbClr val="FF0000"/>
-                </a:solidFill>
-                <a:latin typeface="Courier New" pitchFamily="49" charset="0"/>
-                <a:cs typeface="Courier New" pitchFamily="49" charset="0"/>
-              </a:rPr>
-              <a:t>coef</a:t>
-            </a:r>
-            <a:r>
-              <a:rPr lang="en-US" b="1" dirty="0" smtClean="0">
-                <a:solidFill>
-                  <a:srgbClr val="FF0000"/>
-                </a:solidFill>
-                <a:latin typeface="Courier New" pitchFamily="49" charset="0"/>
-                <a:cs typeface="Courier New" pitchFamily="49" charset="0"/>
-              </a:rPr>
-              <a:t>()</a:t>
-            </a:r>
-            <a:endParaRPr lang="en-US" b="1" dirty="0" smtClean="0">
-              <a:solidFill>
-                <a:srgbClr val="FF0000"/>
-              </a:solidFill>
-              <a:latin typeface="Courier New" pitchFamily="49" charset="0"/>
-              <a:cs typeface="Courier New" pitchFamily="49" charset="0"/>
-            </a:endParaRPr>
           </a:p>
           <a:p>
             <a:pPr lvl="1"/>
@@ -17124,7 +17484,7 @@
 </p:sld>
 </file>
 
-<file path=ppt/slides/slide33.xml><?xml version="1.0" encoding="utf-8"?>
+<file path=ppt/slides/slide35.xml><?xml version="1.0" encoding="utf-8"?>
 <p:sld xmlns:a="http://schemas.openxmlformats.org/drawingml/2006/main" xmlns:r="http://schemas.openxmlformats.org/officeDocument/2006/relationships" xmlns:p="http://schemas.openxmlformats.org/presentationml/2006/main">
   <p:cSld>
     <p:spTree>
@@ -17159,7 +17519,7 @@
             <a:fld id="{69D7B0D6-DB4A-4EB6-A95E-79586D88CC6B}" type="slidenum">
               <a:rPr lang="en-US"/>
               <a:pPr/>
-              <a:t>33</a:t>
+              <a:t>35</a:t>
             </a:fld>
             <a:endParaRPr lang="en-US"/>
           </a:p>
@@ -18136,6 +18496,233 @@
 </file>
 
 <file path=ppt/slides/slide4.xml><?xml version="1.0" encoding="utf-8"?>
+<p:sld xmlns:a="http://schemas.openxmlformats.org/drawingml/2006/main" xmlns:r="http://schemas.openxmlformats.org/officeDocument/2006/relationships" xmlns:p="http://schemas.openxmlformats.org/presentationml/2006/main" show="0">
+  <p:cSld>
+    <p:spTree>
+      <p:nvGrpSpPr>
+        <p:cNvPr id="1" name=""/>
+        <p:cNvGrpSpPr/>
+        <p:nvPr/>
+      </p:nvGrpSpPr>
+      <p:grpSpPr>
+        <a:xfrm>
+          <a:off x="0" y="0"/>
+          <a:ext cx="0" cy="0"/>
+          <a:chOff x="0" y="0"/>
+          <a:chExt cx="0" cy="0"/>
+        </a:xfrm>
+      </p:grpSpPr>
+      <p:sp>
+        <p:nvSpPr>
+          <p:cNvPr id="2" name="Title 1"/>
+          <p:cNvSpPr>
+            <a:spLocks noGrp="1"/>
+          </p:cNvSpPr>
+          <p:nvPr>
+            <p:ph type="title"/>
+          </p:nvPr>
+        </p:nvSpPr>
+        <p:spPr/>
+        <p:txBody>
+          <a:bodyPr/>
+          <a:lstStyle/>
+          <a:p>
+            <a:r>
+              <a:rPr lang="en-US" dirty="0" smtClean="0"/>
+              <a:t>Which is the response variable?</a:t>
+            </a:r>
+            <a:endParaRPr lang="en-US" dirty="0"/>
+          </a:p>
+        </p:txBody>
+      </p:sp>
+      <p:sp>
+        <p:nvSpPr>
+          <p:cNvPr id="3" name="Content Placeholder 2"/>
+          <p:cNvSpPr>
+            <a:spLocks noGrp="1"/>
+          </p:cNvSpPr>
+          <p:nvPr>
+            <p:ph idx="1"/>
+          </p:nvPr>
+        </p:nvSpPr>
+        <p:spPr>
+          <a:xfrm>
+            <a:off x="457200" y="1143000"/>
+            <a:ext cx="8534400" cy="4724400"/>
+          </a:xfrm>
+        </p:spPr>
+        <p:txBody>
+          <a:bodyPr/>
+          <a:lstStyle/>
+          <a:p>
+            <a:pPr marL="457200" indent="-457200">
+              <a:spcAft>
+                <a:spcPts val="600"/>
+              </a:spcAft>
+              <a:buFont typeface="+mj-lt"/>
+              <a:buAutoNum type="arabicPeriod"/>
+            </a:pPr>
+            <a:r>
+              <a:rPr lang="en-US" sz="2400" dirty="0" smtClean="0"/>
+              <a:t>Can length be used to predict weight?</a:t>
+            </a:r>
+          </a:p>
+          <a:p>
+            <a:pPr marL="457200" indent="-457200">
+              <a:spcAft>
+                <a:spcPts val="600"/>
+              </a:spcAft>
+              <a:buFont typeface="+mj-lt"/>
+              <a:buAutoNum type="arabicPeriod"/>
+            </a:pPr>
+            <a:r>
+              <a:rPr lang="en-US" sz="2400" dirty="0" smtClean="0"/>
+              <a:t>How is weight affected by typical daily ration?</a:t>
+            </a:r>
+          </a:p>
+          <a:p>
+            <a:pPr marL="457200" indent="-457200">
+              <a:spcAft>
+                <a:spcPts val="600"/>
+              </a:spcAft>
+              <a:buFont typeface="+mj-lt"/>
+              <a:buAutoNum type="arabicPeriod"/>
+            </a:pPr>
+            <a:r>
+              <a:rPr lang="en-US" sz="2400" dirty="0" smtClean="0"/>
+              <a:t>Does metabolic rate differ by sex of rabbit?</a:t>
+            </a:r>
+          </a:p>
+          <a:p>
+            <a:pPr marL="457200" indent="-457200">
+              <a:spcAft>
+                <a:spcPts val="600"/>
+              </a:spcAft>
+              <a:buFont typeface="+mj-lt"/>
+              <a:buAutoNum type="arabicPeriod"/>
+            </a:pPr>
+            <a:r>
+              <a:rPr lang="en-US" sz="2400" dirty="0" smtClean="0"/>
+              <a:t>Is gas mileages significantly affected by weight of the car?</a:t>
+            </a:r>
+          </a:p>
+          <a:p>
+            <a:pPr marL="457200" indent="-457200">
+              <a:spcAft>
+                <a:spcPts val="600"/>
+              </a:spcAft>
+              <a:buFont typeface="+mj-lt"/>
+              <a:buAutoNum type="arabicPeriod"/>
+            </a:pPr>
+            <a:r>
+              <a:rPr lang="en-US" sz="2400" dirty="0" smtClean="0"/>
+              <a:t>Is there a relationship between how much money a person makes and their satisfaction with deer harvest regulations?</a:t>
+            </a:r>
+          </a:p>
+          <a:p>
+            <a:pPr marL="457200" indent="-457200">
+              <a:spcAft>
+                <a:spcPts val="600"/>
+              </a:spcAft>
+              <a:buFont typeface="+mj-lt"/>
+              <a:buAutoNum type="arabicPeriod"/>
+            </a:pPr>
+            <a:r>
+              <a:rPr lang="en-US" sz="2400" dirty="0" smtClean="0"/>
+              <a:t>How is the uptake of heavy metals affected by the sex and age (young, middle, old) of the individual?</a:t>
+            </a:r>
+          </a:p>
+          <a:p>
+            <a:pPr marL="457200" indent="-457200">
+              <a:spcAft>
+                <a:spcPts val="600"/>
+              </a:spcAft>
+              <a:buFont typeface="+mj-lt"/>
+              <a:buAutoNum type="arabicPeriod"/>
+            </a:pPr>
+            <a:r>
+              <a:rPr lang="en-US" sz="2400" dirty="0" smtClean="0"/>
+              <a:t>Is there a relationship between how much money a person makes and how much they weigh?</a:t>
+            </a:r>
+          </a:p>
+        </p:txBody>
+      </p:sp>
+      <p:sp>
+        <p:nvSpPr>
+          <p:cNvPr id="4" name="Footer Placeholder 3"/>
+          <p:cNvSpPr>
+            <a:spLocks noGrp="1"/>
+          </p:cNvSpPr>
+          <p:nvPr>
+            <p:ph type="ftr" sz="quarter" idx="10"/>
+          </p:nvPr>
+        </p:nvSpPr>
+        <p:spPr/>
+        <p:txBody>
+          <a:bodyPr/>
+          <a:lstStyle/>
+          <a:p>
+            <a:r>
+              <a:rPr lang="en-US" smtClean="0"/>
+              <a:t>LM Foundation</a:t>
+            </a:r>
+            <a:endParaRPr lang="en-US"/>
+          </a:p>
+        </p:txBody>
+      </p:sp>
+      <p:sp>
+        <p:nvSpPr>
+          <p:cNvPr id="5" name="Slide Number Placeholder 4"/>
+          <p:cNvSpPr>
+            <a:spLocks noGrp="1"/>
+          </p:cNvSpPr>
+          <p:nvPr>
+            <p:ph type="sldNum" sz="quarter" idx="11"/>
+          </p:nvPr>
+        </p:nvSpPr>
+        <p:spPr/>
+        <p:txBody>
+          <a:bodyPr/>
+          <a:lstStyle/>
+          <a:p>
+            <a:fld id="{2DF5461C-7FAD-4378-B074-D0FEBA4BBCD3}" type="slidenum">
+              <a:rPr lang="en-US" smtClean="0"/>
+              <a:pPr/>
+              <a:t>4</a:t>
+            </a:fld>
+            <a:endParaRPr lang="en-US"/>
+          </a:p>
+        </p:txBody>
+      </p:sp>
+    </p:spTree>
+    <p:extLst>
+      <p:ext uri="{BB962C8B-B14F-4D97-AF65-F5344CB8AC3E}">
+        <p14:creationId xmlns:p14="http://schemas.microsoft.com/office/powerpoint/2010/main" val="2745146503"/>
+      </p:ext>
+    </p:extLst>
+  </p:cSld>
+  <p:clrMapOvr>
+    <a:masterClrMapping/>
+  </p:clrMapOvr>
+  <mc:AlternateContent xmlns:mc="http://schemas.openxmlformats.org/markup-compatibility/2006">
+    <mc:Choice xmlns:p14="http://schemas.microsoft.com/office/powerpoint/2010/main" Requires="p14">
+      <p:transition spd="slow" p14:dur="2000"/>
+    </mc:Choice>
+    <mc:Fallback>
+      <p:transition spd="slow"/>
+    </mc:Fallback>
+  </mc:AlternateContent>
+  <p:timing>
+    <p:tnLst>
+      <p:par>
+        <p:cTn id="1" dur="indefinite" restart="never" nodeType="tmRoot"/>
+      </p:par>
+    </p:tnLst>
+  </p:timing>
+</p:sld>
+</file>
+
+<file path=ppt/slides/slide5.xml><?xml version="1.0" encoding="utf-8"?>
 <p:sld xmlns:a="http://schemas.openxmlformats.org/drawingml/2006/main" xmlns:r="http://schemas.openxmlformats.org/officeDocument/2006/relationships" xmlns:p="http://schemas.openxmlformats.org/presentationml/2006/main">
   <p:cSld>
     <p:spTree>
@@ -18256,7 +18843,7 @@
             <a:fld id="{134DEA66-E5EC-44D3-A573-9BEAE4CB6F70}" type="slidenum">
               <a:rPr lang="en-US"/>
               <a:pPr/>
-              <a:t>4</a:t>
+              <a:t>5</a:t>
             </a:fld>
             <a:endParaRPr lang="en-US"/>
           </a:p>
@@ -19213,239 +19800,6 @@
 </p:sld>
 </file>
 
-<file path=ppt/slides/slide5.xml><?xml version="1.0" encoding="utf-8"?>
-<p:sld xmlns:a="http://schemas.openxmlformats.org/drawingml/2006/main" xmlns:r="http://schemas.openxmlformats.org/officeDocument/2006/relationships" xmlns:p="http://schemas.openxmlformats.org/presentationml/2006/main">
-  <p:cSld>
-    <p:spTree>
-      <p:nvGrpSpPr>
-        <p:cNvPr id="1" name=""/>
-        <p:cNvGrpSpPr/>
-        <p:nvPr/>
-      </p:nvGrpSpPr>
-      <p:grpSpPr>
-        <a:xfrm>
-          <a:off x="0" y="0"/>
-          <a:ext cx="0" cy="0"/>
-          <a:chOff x="0" y="0"/>
-          <a:chExt cx="0" cy="0"/>
-        </a:xfrm>
-      </p:grpSpPr>
-      <p:sp>
-        <p:nvSpPr>
-          <p:cNvPr id="2" name="Title 1"/>
-          <p:cNvSpPr>
-            <a:spLocks noGrp="1"/>
-          </p:cNvSpPr>
-          <p:nvPr>
-            <p:ph type="title"/>
-          </p:nvPr>
-        </p:nvSpPr>
-        <p:spPr/>
-        <p:txBody>
-          <a:bodyPr/>
-          <a:lstStyle/>
-          <a:p>
-            <a:r>
-              <a:rPr lang="en-US" dirty="0" smtClean="0"/>
-              <a:t>Which Test? Why?</a:t>
-            </a:r>
-            <a:endParaRPr lang="en-US" dirty="0"/>
-          </a:p>
-        </p:txBody>
-      </p:sp>
-      <p:sp>
-        <p:nvSpPr>
-          <p:cNvPr id="3" name="Content Placeholder 2"/>
-          <p:cNvSpPr>
-            <a:spLocks noGrp="1"/>
-          </p:cNvSpPr>
-          <p:nvPr>
-            <p:ph idx="1"/>
-          </p:nvPr>
-        </p:nvSpPr>
-        <p:spPr>
-          <a:xfrm>
-            <a:off x="457200" y="990600"/>
-            <a:ext cx="8229600" cy="5562600"/>
-          </a:xfrm>
-        </p:spPr>
-        <p:txBody>
-          <a:bodyPr/>
-          <a:lstStyle/>
-          <a:p>
-            <a:pPr marL="457200" indent="-457200">
-              <a:buFont typeface="+mj-lt"/>
-              <a:buAutoNum type="arabicPeriod"/>
-            </a:pPr>
-            <a:r>
-              <a:rPr lang="en-US" sz="2400" dirty="0" smtClean="0"/>
-              <a:t>Does bird species diversity (number of species) decline as you move away from the equator (increase latitude)?</a:t>
-            </a:r>
-          </a:p>
-          <a:p>
-            <a:pPr>
-              <a:buFont typeface="+mj-lt"/>
-              <a:buAutoNum type="arabicPeriod"/>
-            </a:pPr>
-            <a:endParaRPr lang="en-US" sz="1100" dirty="0" smtClean="0"/>
-          </a:p>
-          <a:p>
-            <a:pPr marL="457200" indent="-457200">
-              <a:buFont typeface="+mj-lt"/>
-              <a:buAutoNum type="arabicPeriod"/>
-            </a:pPr>
-            <a:r>
-              <a:rPr lang="en-US" sz="2400" dirty="0"/>
-              <a:t>Does </a:t>
-            </a:r>
-            <a:r>
-              <a:rPr lang="en-US" sz="2400" dirty="0" smtClean="0"/>
-              <a:t>the mean </a:t>
-            </a:r>
-            <a:r>
-              <a:rPr lang="en-US" sz="2400" dirty="0"/>
-              <a:t>length of the anterior adductor muscle </a:t>
-            </a:r>
-            <a:r>
-              <a:rPr lang="en-US" sz="2400" dirty="0" smtClean="0"/>
-              <a:t>scar on a mussel species differ among five locations?</a:t>
-            </a:r>
-          </a:p>
-          <a:p>
-            <a:pPr>
-              <a:buFont typeface="+mj-lt"/>
-              <a:buAutoNum type="arabicPeriod"/>
-            </a:pPr>
-            <a:endParaRPr lang="en-US" sz="1050" dirty="0"/>
-          </a:p>
-          <a:p>
-            <a:pPr marL="457200" indent="-457200">
-              <a:buFont typeface="+mj-lt"/>
-              <a:buAutoNum type="arabicPeriod"/>
-            </a:pPr>
-            <a:r>
-              <a:rPr lang="en-US" sz="2400" dirty="0" smtClean="0"/>
-              <a:t>Does whether or not an otter captures a bluegill depend on the total length of the bluegill?</a:t>
-            </a:r>
-          </a:p>
-          <a:p>
-            <a:pPr>
-              <a:buFont typeface="+mj-lt"/>
-              <a:buAutoNum type="arabicPeriod"/>
-            </a:pPr>
-            <a:endParaRPr lang="en-US" sz="1050" dirty="0" smtClean="0"/>
-          </a:p>
-          <a:p>
-            <a:pPr marL="457200" indent="-457200">
-              <a:buFont typeface="+mj-lt"/>
-              <a:buAutoNum type="arabicPeriod"/>
-            </a:pPr>
-            <a:r>
-              <a:rPr lang="en-US" sz="2400" dirty="0"/>
-              <a:t>Is there a difference in fat reserves (thickness in mm) </a:t>
-            </a:r>
-            <a:r>
-              <a:rPr lang="en-US" sz="2400" dirty="0" smtClean="0"/>
-              <a:t>between </a:t>
-            </a:r>
-            <a:r>
-              <a:rPr lang="en-US" sz="2400" dirty="0"/>
-              <a:t>wild and domestic seals, sex of the seal, or the interaction between the seal type and sex?</a:t>
-            </a:r>
-          </a:p>
-          <a:p>
-            <a:pPr>
-              <a:buFont typeface="+mj-lt"/>
-              <a:buAutoNum type="arabicPeriod"/>
-            </a:pPr>
-            <a:endParaRPr lang="en-US" sz="1050" dirty="0"/>
-          </a:p>
-          <a:p>
-            <a:pPr marL="457200" indent="-457200">
-              <a:buFont typeface="+mj-lt"/>
-              <a:buAutoNum type="arabicPeriod"/>
-            </a:pPr>
-            <a:r>
-              <a:rPr lang="en-US" sz="2400" dirty="0"/>
-              <a:t>Does the relationship between the number of times the word gender was used in a journal volume and the year of the volume differ among three different journals?</a:t>
-            </a:r>
-          </a:p>
-          <a:p>
-            <a:pPr marL="457200" indent="-457200">
-              <a:buFont typeface="+mj-lt"/>
-              <a:buAutoNum type="arabicPeriod"/>
-            </a:pPr>
-            <a:endParaRPr lang="en-US" sz="2400" dirty="0"/>
-          </a:p>
-        </p:txBody>
-      </p:sp>
-      <p:sp>
-        <p:nvSpPr>
-          <p:cNvPr id="4" name="Footer Placeholder 3"/>
-          <p:cNvSpPr>
-            <a:spLocks noGrp="1"/>
-          </p:cNvSpPr>
-          <p:nvPr>
-            <p:ph type="ftr" sz="quarter" idx="10"/>
-          </p:nvPr>
-        </p:nvSpPr>
-        <p:spPr/>
-        <p:txBody>
-          <a:bodyPr/>
-          <a:lstStyle/>
-          <a:p>
-            <a:r>
-              <a:rPr lang="en-US" smtClean="0"/>
-              <a:t>LM Foundation</a:t>
-            </a:r>
-            <a:endParaRPr lang="en-US"/>
-          </a:p>
-        </p:txBody>
-      </p:sp>
-      <p:sp>
-        <p:nvSpPr>
-          <p:cNvPr id="5" name="Slide Number Placeholder 4"/>
-          <p:cNvSpPr>
-            <a:spLocks noGrp="1"/>
-          </p:cNvSpPr>
-          <p:nvPr>
-            <p:ph type="sldNum" sz="quarter" idx="11"/>
-          </p:nvPr>
-        </p:nvSpPr>
-        <p:spPr/>
-        <p:txBody>
-          <a:bodyPr/>
-          <a:lstStyle/>
-          <a:p>
-            <a:fld id="{2DF5461C-7FAD-4378-B074-D0FEBA4BBCD3}" type="slidenum">
-              <a:rPr lang="en-US" smtClean="0"/>
-              <a:pPr/>
-              <a:t>5</a:t>
-            </a:fld>
-            <a:endParaRPr lang="en-US"/>
-          </a:p>
-        </p:txBody>
-      </p:sp>
-    </p:spTree>
-    <p:extLst>
-      <p:ext uri="{BB962C8B-B14F-4D97-AF65-F5344CB8AC3E}">
-        <p14:creationId xmlns:p14="http://schemas.microsoft.com/office/powerpoint/2010/main" val="3672377563"/>
-      </p:ext>
-    </p:extLst>
-  </p:cSld>
-  <p:clrMapOvr>
-    <a:masterClrMapping/>
-  </p:clrMapOvr>
-  <p:timing>
-    <p:tnLst>
-      <p:par>
-        <p:cTn id="1" dur="indefinite" restart="never" nodeType="tmRoot"/>
-      </p:par>
-    </p:tnLst>
-  </p:timing>
-</p:sld>
-</file>
-
 <file path=ppt/slides/slide6.xml><?xml version="1.0" encoding="utf-8"?>
 <p:sld xmlns:a="http://schemas.openxmlformats.org/drawingml/2006/main" xmlns:r="http://schemas.openxmlformats.org/officeDocument/2006/relationships" xmlns:p="http://schemas.openxmlformats.org/presentationml/2006/main">
   <p:cSld>
@@ -19480,7 +19834,7 @@
           <a:p>
             <a:r>
               <a:rPr lang="en-US" dirty="0" smtClean="0"/>
-              <a:t>Which Test? Why?</a:t>
+              <a:t>Class Exercise Handout</a:t>
             </a:r>
             <a:endParaRPr lang="en-US" dirty="0"/>
           </a:p>
@@ -19496,59 +19850,37 @@
             <p:ph idx="1"/>
           </p:nvPr>
         </p:nvSpPr>
-        <p:spPr>
-          <a:xfrm>
-            <a:off x="457200" y="1143000"/>
-            <a:ext cx="8534400" cy="5334000"/>
-          </a:xfrm>
-        </p:spPr>
+        <p:spPr/>
         <p:txBody>
           <a:bodyPr/>
           <a:lstStyle/>
           <a:p>
-            <a:pPr marL="514350" indent="-514350">
-              <a:buFont typeface="+mj-lt"/>
-              <a:buAutoNum type="arabicPeriod"/>
-            </a:pPr>
-            <a:r>
-              <a:rPr lang="en-US" sz="2800" dirty="0" smtClean="0"/>
-              <a:t>Does the relationship between resting heart rate and body weight differ among groups of subjects that had or had not ingested caffeine?</a:t>
-            </a:r>
-          </a:p>
-          <a:p>
-            <a:pPr>
-              <a:buFont typeface="+mj-lt"/>
-              <a:buAutoNum type="arabicPeriod"/>
-            </a:pPr>
-            <a:endParaRPr lang="en-US" sz="1400" dirty="0"/>
-          </a:p>
-          <a:p>
-            <a:pPr marL="514350" indent="-514350">
-              <a:buFont typeface="+mj-lt"/>
-              <a:buAutoNum type="arabicPeriod"/>
-            </a:pPr>
-            <a:r>
-              <a:rPr lang="en-US" sz="2800" dirty="0" smtClean="0"/>
-              <a:t>Does the mean alcohol by volume differ among five different types of beer (pale ales, IPAs, lagers, stouts, and porters)?</a:t>
-            </a:r>
-          </a:p>
-          <a:p>
-            <a:pPr>
-              <a:buFont typeface="+mj-lt"/>
-              <a:buAutoNum type="arabicPeriod"/>
-            </a:pPr>
-            <a:endParaRPr lang="en-US" sz="1200" dirty="0" smtClean="0"/>
-          </a:p>
-          <a:p>
-            <a:pPr marL="514350" indent="-514350">
-              <a:buFont typeface="+mj-lt"/>
-              <a:buAutoNum type="arabicPeriod"/>
-            </a:pPr>
-            <a:r>
-              <a:rPr lang="en-US" sz="2800" dirty="0" smtClean="0"/>
-              <a:t>Does mean alcohol by volume change depending on the weight of malt extract used in the brewing process?</a:t>
-            </a:r>
-            <a:endParaRPr lang="en-US" sz="2800" dirty="0"/>
+            <a:r>
+              <a:rPr lang="en-US" dirty="0" smtClean="0"/>
+              <a:t>Which Test? Why?</a:t>
+            </a:r>
+          </a:p>
+          <a:p>
+            <a:pPr lvl="1"/>
+            <a:r>
+              <a:rPr lang="en-US" dirty="0" smtClean="0"/>
+              <a:t>Identify response variable and explanatory variable(s)</a:t>
+            </a:r>
+          </a:p>
+          <a:p>
+            <a:pPr lvl="1"/>
+            <a:r>
+              <a:rPr lang="en-US" dirty="0" smtClean="0"/>
+              <a:t>Determine which type of variable each is.</a:t>
+            </a:r>
+          </a:p>
+          <a:p>
+            <a:pPr lvl="1"/>
+            <a:r>
+              <a:rPr lang="en-US" dirty="0" smtClean="0"/>
+              <a:t>Use table to identify method to use.</a:t>
+            </a:r>
+            <a:endParaRPr lang="en-US" dirty="0"/>
           </a:p>
         </p:txBody>
       </p:sp>
@@ -19602,7 +19934,7 @@
     </p:spTree>
     <p:extLst>
       <p:ext uri="{BB962C8B-B14F-4D97-AF65-F5344CB8AC3E}">
-        <p14:creationId xmlns:p14="http://schemas.microsoft.com/office/powerpoint/2010/main" val="4022065946"/>
+        <p14:creationId xmlns:p14="http://schemas.microsoft.com/office/powerpoint/2010/main" val="2505848561"/>
       </p:ext>
     </p:extLst>
   </p:cSld>
@@ -19620,7 +19952,7 @@
 </file>
 
 <file path=ppt/slides/slide7.xml><?xml version="1.0" encoding="utf-8"?>
-<p:sld xmlns:a="http://schemas.openxmlformats.org/drawingml/2006/main" xmlns:r="http://schemas.openxmlformats.org/officeDocument/2006/relationships" xmlns:p="http://schemas.openxmlformats.org/presentationml/2006/main">
+<p:sld xmlns:a="http://schemas.openxmlformats.org/drawingml/2006/main" xmlns:r="http://schemas.openxmlformats.org/officeDocument/2006/relationships" xmlns:p="http://schemas.openxmlformats.org/presentationml/2006/main" show="0">
   <p:cSld>
     <p:spTree>
       <p:nvGrpSpPr>
@@ -19638,6 +19970,155 @@
       </p:grpSpPr>
       <p:sp>
         <p:nvSpPr>
+          <p:cNvPr id="2" name="Title 1"/>
+          <p:cNvSpPr>
+            <a:spLocks noGrp="1"/>
+          </p:cNvSpPr>
+          <p:nvPr>
+            <p:ph type="title"/>
+          </p:nvPr>
+        </p:nvSpPr>
+        <p:spPr/>
+        <p:txBody>
+          <a:bodyPr/>
+          <a:lstStyle/>
+          <a:p>
+            <a:r>
+              <a:rPr lang="en-US" dirty="0" smtClean="0"/>
+              <a:t>Which Test? Why?</a:t>
+            </a:r>
+            <a:endParaRPr lang="en-US" dirty="0"/>
+          </a:p>
+        </p:txBody>
+      </p:sp>
+      <p:sp>
+        <p:nvSpPr>
+          <p:cNvPr id="3" name="Content Placeholder 2"/>
+          <p:cNvSpPr>
+            <a:spLocks noGrp="1"/>
+          </p:cNvSpPr>
+          <p:nvPr>
+            <p:ph idx="1"/>
+          </p:nvPr>
+        </p:nvSpPr>
+        <p:spPr>
+          <a:xfrm>
+            <a:off x="457200" y="990600"/>
+            <a:ext cx="8229600" cy="5562600"/>
+          </a:xfrm>
+        </p:spPr>
+        <p:txBody>
+          <a:bodyPr/>
+          <a:lstStyle/>
+          <a:p>
+            <a:pPr marL="457200" indent="-457200">
+              <a:buFont typeface="+mj-lt"/>
+              <a:buAutoNum type="arabicPeriod"/>
+            </a:pPr>
+            <a:r>
+              <a:rPr lang="en-US" sz="2400" dirty="0" smtClean="0"/>
+              <a:t>Does bird species diversity (number of species) decline as you move away from the equator (increase latitude)?</a:t>
+            </a:r>
+          </a:p>
+          <a:p>
+            <a:pPr>
+              <a:buFont typeface="+mj-lt"/>
+              <a:buAutoNum type="arabicPeriod"/>
+            </a:pPr>
+            <a:endParaRPr lang="en-US" sz="1100" dirty="0" smtClean="0"/>
+          </a:p>
+          <a:p>
+            <a:pPr marL="457200" indent="-457200">
+              <a:buFont typeface="+mj-lt"/>
+              <a:buAutoNum type="arabicPeriod"/>
+            </a:pPr>
+            <a:r>
+              <a:rPr lang="en-US" sz="2400" dirty="0"/>
+              <a:t>Does </a:t>
+            </a:r>
+            <a:r>
+              <a:rPr lang="en-US" sz="2400" dirty="0" smtClean="0"/>
+              <a:t>the mean </a:t>
+            </a:r>
+            <a:r>
+              <a:rPr lang="en-US" sz="2400" dirty="0"/>
+              <a:t>length of the anterior adductor muscle </a:t>
+            </a:r>
+            <a:r>
+              <a:rPr lang="en-US" sz="2400" dirty="0" smtClean="0"/>
+              <a:t>scar on a mussel species differ among five locations?</a:t>
+            </a:r>
+          </a:p>
+          <a:p>
+            <a:pPr>
+              <a:buFont typeface="+mj-lt"/>
+              <a:buAutoNum type="arabicPeriod"/>
+            </a:pPr>
+            <a:endParaRPr lang="en-US" sz="1050" dirty="0"/>
+          </a:p>
+          <a:p>
+            <a:pPr marL="457200" indent="-457200">
+              <a:buFont typeface="+mj-lt"/>
+              <a:buAutoNum type="arabicPeriod"/>
+            </a:pPr>
+            <a:r>
+              <a:rPr lang="en-US" sz="2400" dirty="0" smtClean="0"/>
+              <a:t>Does whether or not an otter captures a bluegill depend on the total length of the bluegill?</a:t>
+            </a:r>
+          </a:p>
+          <a:p>
+            <a:pPr>
+              <a:buFont typeface="+mj-lt"/>
+              <a:buAutoNum type="arabicPeriod"/>
+            </a:pPr>
+            <a:endParaRPr lang="en-US" sz="1050" dirty="0" smtClean="0"/>
+          </a:p>
+          <a:p>
+            <a:pPr marL="457200" indent="-457200">
+              <a:buFont typeface="+mj-lt"/>
+              <a:buAutoNum type="arabicPeriod"/>
+            </a:pPr>
+            <a:r>
+              <a:rPr lang="en-US" sz="2400" dirty="0"/>
+              <a:t>Is there a difference in fat reserves (thickness in mm) </a:t>
+            </a:r>
+            <a:r>
+              <a:rPr lang="en-US" sz="2400" dirty="0" smtClean="0"/>
+              <a:t>between </a:t>
+            </a:r>
+            <a:r>
+              <a:rPr lang="en-US" sz="2400" dirty="0"/>
+              <a:t>wild and domestic seals, sex of the seal, or the interaction between the seal type and sex?</a:t>
+            </a:r>
+          </a:p>
+          <a:p>
+            <a:pPr>
+              <a:buFont typeface="+mj-lt"/>
+              <a:buAutoNum type="arabicPeriod"/>
+            </a:pPr>
+            <a:endParaRPr lang="en-US" sz="1050" dirty="0"/>
+          </a:p>
+          <a:p>
+            <a:pPr marL="457200" indent="-457200">
+              <a:buFont typeface="+mj-lt"/>
+              <a:buAutoNum type="arabicPeriod"/>
+            </a:pPr>
+            <a:r>
+              <a:rPr lang="en-US" sz="2400" dirty="0"/>
+              <a:t>Does the relationship between the number of times the word gender was used in a journal volume and the year of the volume differ among three different journals?</a:t>
+            </a:r>
+          </a:p>
+          <a:p>
+            <a:pPr marL="457200" indent="-457200">
+              <a:buFont typeface="+mj-lt"/>
+              <a:buAutoNum type="arabicPeriod"/>
+            </a:pPr>
+            <a:endParaRPr lang="en-US" sz="2400" dirty="0"/>
+          </a:p>
+        </p:txBody>
+      </p:sp>
+      <p:sp>
+        <p:nvSpPr>
           <p:cNvPr id="4" name="Footer Placeholder 3"/>
           <p:cNvSpPr>
             <a:spLocks noGrp="1"/>
@@ -19678,6 +20159,279 @@
               <a:rPr lang="en-US" smtClean="0"/>
               <a:pPr/>
               <a:t>7</a:t>
+            </a:fld>
+            <a:endParaRPr lang="en-US"/>
+          </a:p>
+        </p:txBody>
+      </p:sp>
+    </p:spTree>
+    <p:extLst>
+      <p:ext uri="{BB962C8B-B14F-4D97-AF65-F5344CB8AC3E}">
+        <p14:creationId xmlns:p14="http://schemas.microsoft.com/office/powerpoint/2010/main" val="3672377563"/>
+      </p:ext>
+    </p:extLst>
+  </p:cSld>
+  <p:clrMapOvr>
+    <a:masterClrMapping/>
+  </p:clrMapOvr>
+  <mc:AlternateContent xmlns:mc="http://schemas.openxmlformats.org/markup-compatibility/2006">
+    <mc:Choice xmlns:p14="http://schemas.microsoft.com/office/powerpoint/2010/main" Requires="p14">
+      <p:transition spd="slow" p14:dur="2000"/>
+    </mc:Choice>
+    <mc:Fallback>
+      <p:transition spd="slow"/>
+    </mc:Fallback>
+  </mc:AlternateContent>
+  <p:timing>
+    <p:tnLst>
+      <p:par>
+        <p:cTn id="1" dur="indefinite" restart="never" nodeType="tmRoot"/>
+      </p:par>
+    </p:tnLst>
+  </p:timing>
+</p:sld>
+</file>
+
+<file path=ppt/slides/slide8.xml><?xml version="1.0" encoding="utf-8"?>
+<p:sld xmlns:a="http://schemas.openxmlformats.org/drawingml/2006/main" xmlns:r="http://schemas.openxmlformats.org/officeDocument/2006/relationships" xmlns:p="http://schemas.openxmlformats.org/presentationml/2006/main" show="0">
+  <p:cSld>
+    <p:spTree>
+      <p:nvGrpSpPr>
+        <p:cNvPr id="1" name=""/>
+        <p:cNvGrpSpPr/>
+        <p:nvPr/>
+      </p:nvGrpSpPr>
+      <p:grpSpPr>
+        <a:xfrm>
+          <a:off x="0" y="0"/>
+          <a:ext cx="0" cy="0"/>
+          <a:chOff x="0" y="0"/>
+          <a:chExt cx="0" cy="0"/>
+        </a:xfrm>
+      </p:grpSpPr>
+      <p:sp>
+        <p:nvSpPr>
+          <p:cNvPr id="2" name="Title 1"/>
+          <p:cNvSpPr>
+            <a:spLocks noGrp="1"/>
+          </p:cNvSpPr>
+          <p:nvPr>
+            <p:ph type="title"/>
+          </p:nvPr>
+        </p:nvSpPr>
+        <p:spPr/>
+        <p:txBody>
+          <a:bodyPr/>
+          <a:lstStyle/>
+          <a:p>
+            <a:r>
+              <a:rPr lang="en-US" dirty="0" smtClean="0"/>
+              <a:t>Which Test? Why?</a:t>
+            </a:r>
+            <a:endParaRPr lang="en-US" dirty="0"/>
+          </a:p>
+        </p:txBody>
+      </p:sp>
+      <p:sp>
+        <p:nvSpPr>
+          <p:cNvPr id="3" name="Content Placeholder 2"/>
+          <p:cNvSpPr>
+            <a:spLocks noGrp="1"/>
+          </p:cNvSpPr>
+          <p:nvPr>
+            <p:ph idx="1"/>
+          </p:nvPr>
+        </p:nvSpPr>
+        <p:spPr>
+          <a:xfrm>
+            <a:off x="457200" y="1143000"/>
+            <a:ext cx="8534400" cy="5334000"/>
+          </a:xfrm>
+        </p:spPr>
+        <p:txBody>
+          <a:bodyPr/>
+          <a:lstStyle/>
+          <a:p>
+            <a:pPr marL="514350" indent="-514350">
+              <a:buFont typeface="+mj-lt"/>
+              <a:buAutoNum type="arabicPeriod"/>
+            </a:pPr>
+            <a:r>
+              <a:rPr lang="en-US" sz="2800" dirty="0" smtClean="0"/>
+              <a:t>Does the relationship between resting heart rate and body weight differ among groups of subjects that had or had not ingested caffeine?</a:t>
+            </a:r>
+          </a:p>
+          <a:p>
+            <a:pPr>
+              <a:buFont typeface="+mj-lt"/>
+              <a:buAutoNum type="arabicPeriod"/>
+            </a:pPr>
+            <a:endParaRPr lang="en-US" sz="1400" dirty="0"/>
+          </a:p>
+          <a:p>
+            <a:pPr marL="514350" indent="-514350">
+              <a:buFont typeface="+mj-lt"/>
+              <a:buAutoNum type="arabicPeriod"/>
+            </a:pPr>
+            <a:r>
+              <a:rPr lang="en-US" sz="2800" dirty="0" smtClean="0"/>
+              <a:t>Does the mean alcohol by volume differ among five different types of beer (pale ales, IPAs, lagers, stouts, and porters)?</a:t>
+            </a:r>
+          </a:p>
+          <a:p>
+            <a:pPr>
+              <a:buFont typeface="+mj-lt"/>
+              <a:buAutoNum type="arabicPeriod"/>
+            </a:pPr>
+            <a:endParaRPr lang="en-US" sz="1200" dirty="0" smtClean="0"/>
+          </a:p>
+          <a:p>
+            <a:pPr marL="514350" indent="-514350">
+              <a:buFont typeface="+mj-lt"/>
+              <a:buAutoNum type="arabicPeriod"/>
+            </a:pPr>
+            <a:r>
+              <a:rPr lang="en-US" sz="2800" dirty="0" smtClean="0"/>
+              <a:t>Does mean alcohol by volume change depending on the weight of malt extract used in the brewing process?</a:t>
+            </a:r>
+            <a:endParaRPr lang="en-US" sz="2800" dirty="0"/>
+          </a:p>
+        </p:txBody>
+      </p:sp>
+      <p:sp>
+        <p:nvSpPr>
+          <p:cNvPr id="4" name="Footer Placeholder 3"/>
+          <p:cNvSpPr>
+            <a:spLocks noGrp="1"/>
+          </p:cNvSpPr>
+          <p:nvPr>
+            <p:ph type="ftr" sz="quarter" idx="10"/>
+          </p:nvPr>
+        </p:nvSpPr>
+        <p:spPr/>
+        <p:txBody>
+          <a:bodyPr/>
+          <a:lstStyle/>
+          <a:p>
+            <a:r>
+              <a:rPr lang="en-US" smtClean="0"/>
+              <a:t>LM Foundation</a:t>
+            </a:r>
+            <a:endParaRPr lang="en-US"/>
+          </a:p>
+        </p:txBody>
+      </p:sp>
+      <p:sp>
+        <p:nvSpPr>
+          <p:cNvPr id="5" name="Slide Number Placeholder 4"/>
+          <p:cNvSpPr>
+            <a:spLocks noGrp="1"/>
+          </p:cNvSpPr>
+          <p:nvPr>
+            <p:ph type="sldNum" sz="quarter" idx="11"/>
+          </p:nvPr>
+        </p:nvSpPr>
+        <p:spPr/>
+        <p:txBody>
+          <a:bodyPr/>
+          <a:lstStyle/>
+          <a:p>
+            <a:fld id="{2DF5461C-7FAD-4378-B074-D0FEBA4BBCD3}" type="slidenum">
+              <a:rPr lang="en-US" smtClean="0"/>
+              <a:pPr/>
+              <a:t>8</a:t>
+            </a:fld>
+            <a:endParaRPr lang="en-US"/>
+          </a:p>
+        </p:txBody>
+      </p:sp>
+    </p:spTree>
+    <p:extLst>
+      <p:ext uri="{BB962C8B-B14F-4D97-AF65-F5344CB8AC3E}">
+        <p14:creationId xmlns:p14="http://schemas.microsoft.com/office/powerpoint/2010/main" val="4022065946"/>
+      </p:ext>
+    </p:extLst>
+  </p:cSld>
+  <p:clrMapOvr>
+    <a:masterClrMapping/>
+  </p:clrMapOvr>
+  <mc:AlternateContent xmlns:mc="http://schemas.openxmlformats.org/markup-compatibility/2006">
+    <mc:Choice xmlns:p14="http://schemas.microsoft.com/office/powerpoint/2010/main" Requires="p14">
+      <p:transition spd="slow" p14:dur="2000"/>
+    </mc:Choice>
+    <mc:Fallback>
+      <p:transition spd="slow"/>
+    </mc:Fallback>
+  </mc:AlternateContent>
+  <p:timing>
+    <p:tnLst>
+      <p:par>
+        <p:cTn id="1" dur="indefinite" restart="never" nodeType="tmRoot"/>
+      </p:par>
+    </p:tnLst>
+  </p:timing>
+</p:sld>
+</file>
+
+<file path=ppt/slides/slide9.xml><?xml version="1.0" encoding="utf-8"?>
+<p:sld xmlns:a="http://schemas.openxmlformats.org/drawingml/2006/main" xmlns:r="http://schemas.openxmlformats.org/officeDocument/2006/relationships" xmlns:p="http://schemas.openxmlformats.org/presentationml/2006/main" show="0">
+  <p:cSld>
+    <p:spTree>
+      <p:nvGrpSpPr>
+        <p:cNvPr id="1" name=""/>
+        <p:cNvGrpSpPr/>
+        <p:nvPr/>
+      </p:nvGrpSpPr>
+      <p:grpSpPr>
+        <a:xfrm>
+          <a:off x="0" y="0"/>
+          <a:ext cx="0" cy="0"/>
+          <a:chOff x="0" y="0"/>
+          <a:chExt cx="0" cy="0"/>
+        </a:xfrm>
+      </p:grpSpPr>
+      <p:sp>
+        <p:nvSpPr>
+          <p:cNvPr id="4" name="Footer Placeholder 3"/>
+          <p:cNvSpPr>
+            <a:spLocks noGrp="1"/>
+          </p:cNvSpPr>
+          <p:nvPr>
+            <p:ph type="ftr" sz="quarter" idx="10"/>
+          </p:nvPr>
+        </p:nvSpPr>
+        <p:spPr/>
+        <p:txBody>
+          <a:bodyPr/>
+          <a:lstStyle/>
+          <a:p>
+            <a:r>
+              <a:rPr lang="en-US" smtClean="0"/>
+              <a:t>LM Foundation</a:t>
+            </a:r>
+            <a:endParaRPr lang="en-US"/>
+          </a:p>
+        </p:txBody>
+      </p:sp>
+      <p:sp>
+        <p:nvSpPr>
+          <p:cNvPr id="5" name="Slide Number Placeholder 4"/>
+          <p:cNvSpPr>
+            <a:spLocks noGrp="1"/>
+          </p:cNvSpPr>
+          <p:nvPr>
+            <p:ph type="sldNum" sz="quarter" idx="11"/>
+          </p:nvPr>
+        </p:nvSpPr>
+        <p:spPr/>
+        <p:txBody>
+          <a:bodyPr/>
+          <a:lstStyle/>
+          <a:p>
+            <a:fld id="{2DF5461C-7FAD-4378-B074-D0FEBA4BBCD3}" type="slidenum">
+              <a:rPr lang="en-US" smtClean="0"/>
+              <a:pPr/>
+              <a:t>9</a:t>
             </a:fld>
             <a:endParaRPr lang="en-US"/>
           </a:p>
@@ -19762,312 +20516,14 @@
   <p:clrMapOvr>
     <a:masterClrMapping/>
   </p:clrMapOvr>
-  <p:timing>
-    <p:tnLst>
-      <p:par>
-        <p:cTn id="1" dur="indefinite" restart="never" nodeType="tmRoot"/>
-      </p:par>
-    </p:tnLst>
-  </p:timing>
-</p:sld>
-</file>
-
-<file path=ppt/slides/slide8.xml><?xml version="1.0" encoding="utf-8"?>
-<p:sld xmlns:a="http://schemas.openxmlformats.org/drawingml/2006/main" xmlns:r="http://schemas.openxmlformats.org/officeDocument/2006/relationships" xmlns:p="http://schemas.openxmlformats.org/presentationml/2006/main">
-  <p:cSld>
-    <p:spTree>
-      <p:nvGrpSpPr>
-        <p:cNvPr id="1" name=""/>
-        <p:cNvGrpSpPr/>
-        <p:nvPr/>
-      </p:nvGrpSpPr>
-      <p:grpSpPr>
-        <a:xfrm>
-          <a:off x="0" y="0"/>
-          <a:ext cx="0" cy="0"/>
-          <a:chOff x="0" y="0"/>
-          <a:chExt cx="0" cy="0"/>
-        </a:xfrm>
-      </p:grpSpPr>
-      <p:sp>
-        <p:nvSpPr>
-          <p:cNvPr id="4" name="Footer Placeholder 3"/>
-          <p:cNvSpPr>
-            <a:spLocks noGrp="1"/>
-          </p:cNvSpPr>
-          <p:nvPr>
-            <p:ph type="ftr" sz="quarter" idx="10"/>
-          </p:nvPr>
-        </p:nvSpPr>
-        <p:spPr/>
-        <p:txBody>
-          <a:bodyPr/>
-          <a:lstStyle/>
-          <a:p>
-            <a:r>
-              <a:rPr lang="en-US" smtClean="0"/>
-              <a:t>LM Foundation</a:t>
-            </a:r>
-            <a:endParaRPr lang="en-US"/>
-          </a:p>
-        </p:txBody>
-      </p:sp>
-      <p:sp>
-        <p:nvSpPr>
-          <p:cNvPr id="5" name="Slide Number Placeholder 4"/>
-          <p:cNvSpPr>
-            <a:spLocks noGrp="1"/>
-          </p:cNvSpPr>
-          <p:nvPr>
-            <p:ph type="sldNum" sz="quarter" idx="11"/>
-          </p:nvPr>
-        </p:nvSpPr>
-        <p:spPr/>
-        <p:txBody>
-          <a:bodyPr/>
-          <a:lstStyle/>
-          <a:p>
-            <a:fld id="{2DF5461C-7FAD-4378-B074-D0FEBA4BBCD3}" type="slidenum">
-              <a:rPr lang="en-US" smtClean="0"/>
-              <a:pPr/>
-              <a:t>8</a:t>
-            </a:fld>
-            <a:endParaRPr lang="en-US"/>
-          </a:p>
-        </p:txBody>
-      </p:sp>
-      <p:sp>
-        <p:nvSpPr>
-          <p:cNvPr id="6" name="Title 1"/>
-          <p:cNvSpPr>
-            <a:spLocks noGrp="1"/>
-          </p:cNvSpPr>
-          <p:nvPr>
-            <p:ph type="title"/>
-          </p:nvPr>
-        </p:nvSpPr>
-        <p:spPr>
-          <a:xfrm>
-            <a:off x="65088" y="122238"/>
-            <a:ext cx="9012237" cy="868362"/>
-          </a:xfrm>
-        </p:spPr>
-        <p:txBody>
-          <a:bodyPr/>
-          <a:lstStyle/>
-          <a:p>
-            <a:r>
-              <a:rPr lang="en-US" dirty="0" smtClean="0"/>
-              <a:t>Which Test? Why?</a:t>
-            </a:r>
-            <a:endParaRPr lang="en-US" dirty="0"/>
-          </a:p>
-        </p:txBody>
-      </p:sp>
-      <p:pic>
-        <p:nvPicPr>
-          <p:cNvPr id="192516" name="Picture 4" descr="Susceptibility to allergen-driven AHR is associated a mixed TH17-TH2 immune response."/>
-          <p:cNvPicPr>
-            <a:picLocks noChangeAspect="1" noChangeArrowheads="1"/>
-          </p:cNvPicPr>
-          <p:nvPr/>
-        </p:nvPicPr>
-        <p:blipFill>
-          <a:blip r:embed="rId2">
-            <a:extLst>
-              <a:ext uri="{28A0092B-C50C-407E-A947-70E740481C1C}">
-                <a14:useLocalDpi xmlns:a14="http://schemas.microsoft.com/office/drawing/2010/main" val="0"/>
-              </a:ext>
-            </a:extLst>
-          </a:blip>
-          <a:srcRect/>
-          <a:stretch>
-            <a:fillRect/>
-          </a:stretch>
-        </p:blipFill>
-        <p:spPr bwMode="auto">
-          <a:xfrm>
-            <a:off x="990600" y="914400"/>
-            <a:ext cx="7239000" cy="5632035"/>
-          </a:xfrm>
-          <a:prstGeom prst="rect">
-            <a:avLst/>
-          </a:prstGeom>
-          <a:noFill/>
-          <a:extLst>
-            <a:ext uri="{909E8E84-426E-40DD-AFC4-6F175D3DCCD1}">
-              <a14:hiddenFill xmlns:a14="http://schemas.microsoft.com/office/drawing/2010/main">
-                <a:solidFill>
-                  <a:srgbClr val="FFFFFF"/>
-                </a:solidFill>
-              </a14:hiddenFill>
-            </a:ext>
-          </a:extLst>
-        </p:spPr>
-      </p:pic>
-    </p:spTree>
-    <p:extLst>
-      <p:ext uri="{BB962C8B-B14F-4D97-AF65-F5344CB8AC3E}">
-        <p14:creationId xmlns:p14="http://schemas.microsoft.com/office/powerpoint/2010/main" val="7949886"/>
-      </p:ext>
-    </p:extLst>
-  </p:cSld>
-  <p:clrMapOvr>
-    <a:masterClrMapping/>
-  </p:clrMapOvr>
-  <p:timing>
-    <p:tnLst>
-      <p:par>
-        <p:cTn id="1" dur="indefinite" restart="never" nodeType="tmRoot"/>
-      </p:par>
-    </p:tnLst>
-  </p:timing>
-</p:sld>
-</file>
-
-<file path=ppt/slides/slide9.xml><?xml version="1.0" encoding="utf-8"?>
-<p:sld xmlns:a="http://schemas.openxmlformats.org/drawingml/2006/main" xmlns:r="http://schemas.openxmlformats.org/officeDocument/2006/relationships" xmlns:p="http://schemas.openxmlformats.org/presentationml/2006/main">
-  <p:cSld>
-    <p:spTree>
-      <p:nvGrpSpPr>
-        <p:cNvPr id="1" name=""/>
-        <p:cNvGrpSpPr/>
-        <p:nvPr/>
-      </p:nvGrpSpPr>
-      <p:grpSpPr>
-        <a:xfrm>
-          <a:off x="0" y="0"/>
-          <a:ext cx="0" cy="0"/>
-          <a:chOff x="0" y="0"/>
-          <a:chExt cx="0" cy="0"/>
-        </a:xfrm>
-      </p:grpSpPr>
-      <p:sp>
-        <p:nvSpPr>
-          <p:cNvPr id="4" name="Footer Placeholder 3"/>
-          <p:cNvSpPr>
-            <a:spLocks noGrp="1"/>
-          </p:cNvSpPr>
-          <p:nvPr>
-            <p:ph type="ftr" sz="quarter" idx="10"/>
-          </p:nvPr>
-        </p:nvSpPr>
-        <p:spPr/>
-        <p:txBody>
-          <a:bodyPr/>
-          <a:lstStyle/>
-          <a:p>
-            <a:r>
-              <a:rPr lang="en-US" smtClean="0"/>
-              <a:t>LM Foundation</a:t>
-            </a:r>
-            <a:endParaRPr lang="en-US"/>
-          </a:p>
-        </p:txBody>
-      </p:sp>
-      <p:sp>
-        <p:nvSpPr>
-          <p:cNvPr id="5" name="Slide Number Placeholder 4"/>
-          <p:cNvSpPr>
-            <a:spLocks noGrp="1"/>
-          </p:cNvSpPr>
-          <p:nvPr>
-            <p:ph type="sldNum" sz="quarter" idx="11"/>
-          </p:nvPr>
-        </p:nvSpPr>
-        <p:spPr/>
-        <p:txBody>
-          <a:bodyPr/>
-          <a:lstStyle/>
-          <a:p>
-            <a:fld id="{2DF5461C-7FAD-4378-B074-D0FEBA4BBCD3}" type="slidenum">
-              <a:rPr lang="en-US" smtClean="0"/>
-              <a:pPr/>
-              <a:t>9</a:t>
-            </a:fld>
-            <a:endParaRPr lang="en-US"/>
-          </a:p>
-        </p:txBody>
-      </p:sp>
-      <p:sp>
-        <p:nvSpPr>
-          <p:cNvPr id="6" name="Title 1"/>
-          <p:cNvSpPr>
-            <a:spLocks noGrp="1"/>
-          </p:cNvSpPr>
-          <p:nvPr>
-            <p:ph type="title"/>
-          </p:nvPr>
-        </p:nvSpPr>
-        <p:spPr>
-          <a:xfrm>
-            <a:off x="65088" y="122238"/>
-            <a:ext cx="9012237" cy="868362"/>
-          </a:xfrm>
-        </p:spPr>
-        <p:txBody>
-          <a:bodyPr/>
-          <a:lstStyle/>
-          <a:p>
-            <a:r>
-              <a:rPr lang="en-US" dirty="0" smtClean="0"/>
-              <a:t>Which Test? Why?</a:t>
-            </a:r>
-            <a:endParaRPr lang="en-US" dirty="0"/>
-          </a:p>
-        </p:txBody>
-      </p:sp>
-      <p:pic>
-        <p:nvPicPr>
-          <p:cNvPr id="193538" name="Picture 2" descr="http://www.scielo.br/img/revistas/bjb/v63n2/a17fig01.gif"/>
-          <p:cNvPicPr>
-            <a:picLocks noChangeAspect="1" noChangeArrowheads="1"/>
-          </p:cNvPicPr>
-          <p:nvPr/>
-        </p:nvPicPr>
-        <p:blipFill>
-          <a:blip r:embed="rId2">
-            <a:extLst>
-              <a:ext uri="{28A0092B-C50C-407E-A947-70E740481C1C}">
-                <a14:useLocalDpi xmlns:a14="http://schemas.microsoft.com/office/drawing/2010/main" val="0"/>
-              </a:ext>
-            </a:extLst>
-          </a:blip>
-          <a:srcRect/>
-          <a:stretch>
-            <a:fillRect/>
-          </a:stretch>
-        </p:blipFill>
-        <p:spPr bwMode="auto">
-          <a:xfrm>
-            <a:off x="1981200" y="990600"/>
-            <a:ext cx="5715000" cy="5644793"/>
-          </a:xfrm>
-          <a:prstGeom prst="rect">
-            <a:avLst/>
-          </a:prstGeom>
-          <a:noFill/>
-          <a:extLst>
-            <a:ext uri="{909E8E84-426E-40DD-AFC4-6F175D3DCCD1}">
-              <a14:hiddenFill xmlns:a14="http://schemas.microsoft.com/office/drawing/2010/main">
-                <a:solidFill>
-                  <a:srgbClr val="FFFFFF"/>
-                </a:solidFill>
-              </a14:hiddenFill>
-            </a:ext>
-          </a:extLst>
-        </p:spPr>
-      </p:pic>
-    </p:spTree>
-    <p:extLst>
-      <p:ext uri="{BB962C8B-B14F-4D97-AF65-F5344CB8AC3E}">
-        <p14:creationId xmlns:p14="http://schemas.microsoft.com/office/powerpoint/2010/main" val="1804882695"/>
-      </p:ext>
-    </p:extLst>
-  </p:cSld>
-  <p:clrMapOvr>
-    <a:masterClrMapping/>
-  </p:clrMapOvr>
+  <mc:AlternateContent xmlns:mc="http://schemas.openxmlformats.org/markup-compatibility/2006">
+    <mc:Choice xmlns:p14="http://schemas.microsoft.com/office/powerpoint/2010/main" Requires="p14">
+      <p:transition spd="slow" p14:dur="2000"/>
+    </mc:Choice>
+    <mc:Fallback>
+      <p:transition spd="slow"/>
+    </mc:Fallback>
+  </mc:AlternateContent>
   <p:timing>
     <p:tnLst>
       <p:par>

</xml_diff>